<commit_message>
docs(v0.5.0): add demo chapter in presentation
</commit_message>
<xml_diff>
--- a/documents/Presentación de Perfil - Modelo Generador CSS.pptx
+++ b/documents/Presentación de Perfil - Modelo Generador CSS.pptx
@@ -298,7 +298,7 @@
           <a:p>
             <a:fld id="{353ECDC7-B053-49E7-A4E4-B30D314B072F}" type="datetimeFigureOut">
               <a:rPr lang="es-BO" smtClean="0"/>
-              <a:t>27/5/2024</a:t>
+              <a:t>29/5/2024</a:t>
             </a:fld>
             <a:endParaRPr lang="es-BO"/>
           </a:p>
@@ -498,7 +498,7 @@
           <a:p>
             <a:fld id="{353ECDC7-B053-49E7-A4E4-B30D314B072F}" type="datetimeFigureOut">
               <a:rPr lang="es-BO" smtClean="0"/>
-              <a:t>27/5/2024</a:t>
+              <a:t>29/5/2024</a:t>
             </a:fld>
             <a:endParaRPr lang="es-BO"/>
           </a:p>
@@ -708,7 +708,7 @@
           <a:p>
             <a:fld id="{353ECDC7-B053-49E7-A4E4-B30D314B072F}" type="datetimeFigureOut">
               <a:rPr lang="es-BO" smtClean="0"/>
-              <a:t>27/5/2024</a:t>
+              <a:t>29/5/2024</a:t>
             </a:fld>
             <a:endParaRPr lang="es-BO"/>
           </a:p>
@@ -908,7 +908,7 @@
           <a:p>
             <a:fld id="{353ECDC7-B053-49E7-A4E4-B30D314B072F}" type="datetimeFigureOut">
               <a:rPr lang="es-BO" smtClean="0"/>
-              <a:t>27/5/2024</a:t>
+              <a:t>29/5/2024</a:t>
             </a:fld>
             <a:endParaRPr lang="es-BO"/>
           </a:p>
@@ -1184,7 +1184,7 @@
           <a:p>
             <a:fld id="{353ECDC7-B053-49E7-A4E4-B30D314B072F}" type="datetimeFigureOut">
               <a:rPr lang="es-BO" smtClean="0"/>
-              <a:t>27/5/2024</a:t>
+              <a:t>29/5/2024</a:t>
             </a:fld>
             <a:endParaRPr lang="es-BO"/>
           </a:p>
@@ -1452,7 +1452,7 @@
           <a:p>
             <a:fld id="{353ECDC7-B053-49E7-A4E4-B30D314B072F}" type="datetimeFigureOut">
               <a:rPr lang="es-BO" smtClean="0"/>
-              <a:t>27/5/2024</a:t>
+              <a:t>29/5/2024</a:t>
             </a:fld>
             <a:endParaRPr lang="es-BO"/>
           </a:p>
@@ -1867,7 +1867,7 @@
           <a:p>
             <a:fld id="{353ECDC7-B053-49E7-A4E4-B30D314B072F}" type="datetimeFigureOut">
               <a:rPr lang="es-BO" smtClean="0"/>
-              <a:t>27/5/2024</a:t>
+              <a:t>29/5/2024</a:t>
             </a:fld>
             <a:endParaRPr lang="es-BO"/>
           </a:p>
@@ -2009,7 +2009,7 @@
           <a:p>
             <a:fld id="{353ECDC7-B053-49E7-A4E4-B30D314B072F}" type="datetimeFigureOut">
               <a:rPr lang="es-BO" smtClean="0"/>
-              <a:t>27/5/2024</a:t>
+              <a:t>29/5/2024</a:t>
             </a:fld>
             <a:endParaRPr lang="es-BO"/>
           </a:p>
@@ -2122,7 +2122,7 @@
           <a:p>
             <a:fld id="{353ECDC7-B053-49E7-A4E4-B30D314B072F}" type="datetimeFigureOut">
               <a:rPr lang="es-BO" smtClean="0"/>
-              <a:t>27/5/2024</a:t>
+              <a:t>29/5/2024</a:t>
             </a:fld>
             <a:endParaRPr lang="es-BO"/>
           </a:p>
@@ -2435,7 +2435,7 @@
           <a:p>
             <a:fld id="{353ECDC7-B053-49E7-A4E4-B30D314B072F}" type="datetimeFigureOut">
               <a:rPr lang="es-BO" smtClean="0"/>
-              <a:t>27/5/2024</a:t>
+              <a:t>29/5/2024</a:t>
             </a:fld>
             <a:endParaRPr lang="es-BO"/>
           </a:p>
@@ -2724,7 +2724,7 @@
           <a:p>
             <a:fld id="{353ECDC7-B053-49E7-A4E4-B30D314B072F}" type="datetimeFigureOut">
               <a:rPr lang="es-BO" smtClean="0"/>
-              <a:t>27/5/2024</a:t>
+              <a:t>29/5/2024</a:t>
             </a:fld>
             <a:endParaRPr lang="es-BO"/>
           </a:p>
@@ -2983,7 +2983,7 @@
           <a:p>
             <a:fld id="{353ECDC7-B053-49E7-A4E4-B30D314B072F}" type="datetimeFigureOut">
               <a:rPr lang="es-BO" smtClean="0"/>
-              <a:t>27/5/2024</a:t>
+              <a:t>29/5/2024</a:t>
             </a:fld>
             <a:endParaRPr lang="es-BO"/>
           </a:p>
@@ -26617,7 +26617,181 @@
         </p:nvSpPr>
         <p:spPr>
           <a:xfrm>
-            <a:off x="5094519" y="4990984"/>
+            <a:off x="5130130" y="4984741"/>
+            <a:ext cx="1087157" cy="461665"/>
+          </a:xfrm>
+          <a:prstGeom prst="rect">
+            <a:avLst/>
+          </a:prstGeom>
+          <a:noFill/>
+        </p:spPr>
+        <p:txBody>
+          <a:bodyPr wrap="none" rtlCol="0">
+            <a:spAutoFit/>
+          </a:bodyPr>
+          <a:lstStyle/>
+          <a:p>
+            <a:r>
+              <a:rPr lang="es-CO" sz="2400" dirty="0">
+                <a:solidFill>
+                  <a:schemeClr val="tx2">
+                    <a:lumMod val="40000"/>
+                    <a:lumOff val="60000"/>
+                  </a:schemeClr>
+                </a:solidFill>
+                <a:latin typeface="Raleway Black" pitchFamily="2" charset="0"/>
+                <a:ea typeface="Open Sans SemiBold" panose="020B0706030804020204" pitchFamily="34" charset="0"/>
+                <a:cs typeface="Open Sans SemiBold" panose="020B0706030804020204" pitchFamily="34" charset="0"/>
+              </a:rPr>
+              <a:t>DEMO</a:t>
+            </a:r>
+            <a:endParaRPr lang="en-US" sz="2400" dirty="0">
+              <a:solidFill>
+                <a:schemeClr val="tx2">
+                  <a:lumMod val="40000"/>
+                  <a:lumOff val="60000"/>
+                </a:schemeClr>
+              </a:solidFill>
+              <a:latin typeface="Raleway Black" pitchFamily="2" charset="0"/>
+              <a:ea typeface="Open Sans SemiBold" panose="020B0706030804020204" pitchFamily="34" charset="0"/>
+              <a:cs typeface="Open Sans SemiBold" panose="020B0706030804020204" pitchFamily="34" charset="0"/>
+            </a:endParaRPr>
+          </a:p>
+        </p:txBody>
+      </p:sp>
+      <p:grpSp>
+        <p:nvGrpSpPr>
+          <p:cNvPr id="6" name="Grupo 5">
+            <a:extLst>
+              <a:ext uri="{FF2B5EF4-FFF2-40B4-BE49-F238E27FC236}">
+                <a16:creationId xmlns:a16="http://schemas.microsoft.com/office/drawing/2014/main" id="{D012F70C-BA36-97ED-F524-D43F077B034B}"/>
+              </a:ext>
+            </a:extLst>
+          </p:cNvPr>
+          <p:cNvGrpSpPr/>
+          <p:nvPr/>
+        </p:nvGrpSpPr>
+        <p:grpSpPr>
+          <a:xfrm flipV="1">
+            <a:off x="2521731" y="4486860"/>
+            <a:ext cx="2142690" cy="21"/>
+            <a:chOff x="5651178" y="3550854"/>
+            <a:chExt cx="2142690" cy="20"/>
+          </a:xfrm>
+          <a:effectLst>
+            <a:glow rad="127000">
+              <a:schemeClr val="accent1">
+                <a:lumMod val="60000"/>
+                <a:lumOff val="40000"/>
+              </a:schemeClr>
+            </a:glow>
+          </a:effectLst>
+        </p:grpSpPr>
+        <p:cxnSp>
+          <p:nvCxnSpPr>
+            <p:cNvPr id="9" name="Conector recto 8">
+              <a:extLst>
+                <a:ext uri="{FF2B5EF4-FFF2-40B4-BE49-F238E27FC236}">
+                  <a16:creationId xmlns:a16="http://schemas.microsoft.com/office/drawing/2014/main" id="{75A4A1B9-E1C0-538D-8657-EFC735D47C60}"/>
+                </a:ext>
+              </a:extLst>
+            </p:cNvPr>
+            <p:cNvCxnSpPr>
+              <a:cxnSpLocks/>
+            </p:cNvCxnSpPr>
+            <p:nvPr/>
+          </p:nvCxnSpPr>
+          <p:spPr>
+            <a:xfrm>
+              <a:off x="5651178" y="3550854"/>
+              <a:ext cx="1161102" cy="0"/>
+            </a:xfrm>
+            <a:prstGeom prst="line">
+              <a:avLst/>
+            </a:prstGeom>
+            <a:ln w="28575">
+              <a:solidFill>
+                <a:schemeClr val="bg1"/>
+              </a:solidFill>
+              <a:headEnd type="oval"/>
+            </a:ln>
+          </p:spPr>
+          <p:style>
+            <a:lnRef idx="1">
+              <a:schemeClr val="accent2"/>
+            </a:lnRef>
+            <a:fillRef idx="0">
+              <a:schemeClr val="accent2"/>
+            </a:fillRef>
+            <a:effectRef idx="0">
+              <a:schemeClr val="accent2"/>
+            </a:effectRef>
+            <a:fontRef idx="minor">
+              <a:schemeClr val="tx1"/>
+            </a:fontRef>
+          </p:style>
+        </p:cxnSp>
+        <p:cxnSp>
+          <p:nvCxnSpPr>
+            <p:cNvPr id="10" name="Conector recto 9">
+              <a:extLst>
+                <a:ext uri="{FF2B5EF4-FFF2-40B4-BE49-F238E27FC236}">
+                  <a16:creationId xmlns:a16="http://schemas.microsoft.com/office/drawing/2014/main" id="{A4520C4B-28C5-9262-CE91-8B76A9B247AD}"/>
+                </a:ext>
+              </a:extLst>
+            </p:cNvPr>
+            <p:cNvCxnSpPr>
+              <a:cxnSpLocks/>
+            </p:cNvCxnSpPr>
+            <p:nvPr/>
+          </p:nvCxnSpPr>
+          <p:spPr>
+            <a:xfrm flipV="1">
+              <a:off x="6812280" y="3550874"/>
+              <a:ext cx="981588" cy="0"/>
+            </a:xfrm>
+            <a:prstGeom prst="line">
+              <a:avLst/>
+            </a:prstGeom>
+            <a:ln w="28575">
+              <a:solidFill>
+                <a:schemeClr val="bg1"/>
+              </a:solidFill>
+              <a:headEnd type="oval"/>
+              <a:tailEnd type="oval"/>
+            </a:ln>
+          </p:spPr>
+          <p:style>
+            <a:lnRef idx="1">
+              <a:schemeClr val="accent2"/>
+            </a:lnRef>
+            <a:fillRef idx="0">
+              <a:schemeClr val="accent2"/>
+            </a:fillRef>
+            <a:effectRef idx="0">
+              <a:schemeClr val="accent2"/>
+            </a:effectRef>
+            <a:fontRef idx="minor">
+              <a:schemeClr val="tx1"/>
+            </a:fontRef>
+          </p:style>
+        </p:cxnSp>
+      </p:grpSp>
+      <p:sp>
+        <p:nvSpPr>
+          <p:cNvPr id="24" name="CuadroTexto 23">
+            <a:extLst>
+              <a:ext uri="{FF2B5EF4-FFF2-40B4-BE49-F238E27FC236}">
+                <a16:creationId xmlns:a16="http://schemas.microsoft.com/office/drawing/2014/main" id="{E63DCA5A-D0AA-E976-465C-6224EB16C12D}"/>
+              </a:ext>
+            </a:extLst>
+          </p:cNvPr>
+          <p:cNvSpPr txBox="1"/>
+          <p:nvPr/>
+        </p:nvSpPr>
+        <p:spPr>
+          <a:xfrm>
+            <a:off x="5103105" y="4256027"/>
             <a:ext cx="1433406" cy="461665"/>
           </a:xfrm>
           <a:prstGeom prst="rect">
@@ -26669,13 +26843,13 @@
   <p:clrMapOvr>
     <a:masterClrMapping/>
   </p:clrMapOvr>
-  <mc:AlternateContent xmlns:mc="http://schemas.openxmlformats.org/markup-compatibility/2006">
-    <mc:Choice xmlns:p159="http://schemas.microsoft.com/office/powerpoint/2015/09/main" Requires="p159">
+  <mc:AlternateContent xmlns:mc="http://schemas.openxmlformats.org/markup-compatibility/2006" xmlns:p159="http://schemas.microsoft.com/office/powerpoint/2015/09/main">
+    <mc:Choice Requires="p159">
       <p:transition xmlns:p14="http://schemas.microsoft.com/office/powerpoint/2010/main" spd="slow" p14:dur="2000">
         <p159:morph option="byObject"/>
       </p:transition>
     </mc:Choice>
-    <mc:Fallback>
+    <mc:Fallback xmlns="">
       <p:transition spd="slow">
         <p:fade/>
       </p:transition>

</xml_diff>

<commit_message>
docs(v0.6.6): add final changes in presentation
</commit_message>
<xml_diff>
--- a/documents/Presentación de Perfil - Modelo Generador CSS.pptx
+++ b/documents/Presentación de Perfil - Modelo Generador CSS.pptx
@@ -5,7 +5,7 @@
     <p:sldMasterId id="2147483648" r:id="rId1"/>
   </p:sldMasterIdLst>
   <p:notesMasterIdLst>
-    <p:notesMasterId r:id="rId54"/>
+    <p:notesMasterId r:id="rId55"/>
   </p:notesMasterIdLst>
   <p:sldIdLst>
     <p:sldId id="256" r:id="rId2"/>
@@ -54,12 +54,13 @@
     <p:sldId id="362" r:id="rId45"/>
     <p:sldId id="363" r:id="rId46"/>
     <p:sldId id="380" r:id="rId47"/>
-    <p:sldId id="375" r:id="rId48"/>
-    <p:sldId id="373" r:id="rId49"/>
-    <p:sldId id="378" r:id="rId50"/>
-    <p:sldId id="377" r:id="rId51"/>
-    <p:sldId id="278" r:id="rId52"/>
-    <p:sldId id="376" r:id="rId53"/>
+    <p:sldId id="381" r:id="rId48"/>
+    <p:sldId id="375" r:id="rId49"/>
+    <p:sldId id="373" r:id="rId50"/>
+    <p:sldId id="378" r:id="rId51"/>
+    <p:sldId id="377" r:id="rId52"/>
+    <p:sldId id="278" r:id="rId53"/>
+    <p:sldId id="376" r:id="rId54"/>
   </p:sldIdLst>
   <p:sldSz cx="12192000" cy="6858000"/>
   <p:notesSz cx="6858000" cy="9144000"/>
@@ -260,7 +261,7 @@
           <a:p>
             <a:fld id="{0CE5AC1C-3879-49AC-930D-5E36BA111EA3}" type="datetimeFigureOut">
               <a:rPr lang="es-ES" smtClean="0"/>
-              <a:t>24/06/2024</a:t>
+              <a:t>28/06/2024</a:t>
             </a:fld>
             <a:endParaRPr lang="es-ES"/>
           </a:p>
@@ -928,7 +929,7 @@
           <a:p>
             <a:fld id="{353ECDC7-B053-49E7-A4E4-B30D314B072F}" type="datetimeFigureOut">
               <a:rPr lang="es-BO" smtClean="0"/>
-              <a:t>24/6/2024</a:t>
+              <a:t>28/6/2024</a:t>
             </a:fld>
             <a:endParaRPr lang="es-BO"/>
           </a:p>
@@ -1128,7 +1129,7 @@
           <a:p>
             <a:fld id="{353ECDC7-B053-49E7-A4E4-B30D314B072F}" type="datetimeFigureOut">
               <a:rPr lang="es-BO" smtClean="0"/>
-              <a:t>24/6/2024</a:t>
+              <a:t>28/6/2024</a:t>
             </a:fld>
             <a:endParaRPr lang="es-BO"/>
           </a:p>
@@ -1338,7 +1339,7 @@
           <a:p>
             <a:fld id="{353ECDC7-B053-49E7-A4E4-B30D314B072F}" type="datetimeFigureOut">
               <a:rPr lang="es-BO" smtClean="0"/>
-              <a:t>24/6/2024</a:t>
+              <a:t>28/6/2024</a:t>
             </a:fld>
             <a:endParaRPr lang="es-BO"/>
           </a:p>
@@ -1538,7 +1539,7 @@
           <a:p>
             <a:fld id="{353ECDC7-B053-49E7-A4E4-B30D314B072F}" type="datetimeFigureOut">
               <a:rPr lang="es-BO" smtClean="0"/>
-              <a:t>24/6/2024</a:t>
+              <a:t>28/6/2024</a:t>
             </a:fld>
             <a:endParaRPr lang="es-BO"/>
           </a:p>
@@ -1814,7 +1815,7 @@
           <a:p>
             <a:fld id="{353ECDC7-B053-49E7-A4E4-B30D314B072F}" type="datetimeFigureOut">
               <a:rPr lang="es-BO" smtClean="0"/>
-              <a:t>24/6/2024</a:t>
+              <a:t>28/6/2024</a:t>
             </a:fld>
             <a:endParaRPr lang="es-BO"/>
           </a:p>
@@ -2082,7 +2083,7 @@
           <a:p>
             <a:fld id="{353ECDC7-B053-49E7-A4E4-B30D314B072F}" type="datetimeFigureOut">
               <a:rPr lang="es-BO" smtClean="0"/>
-              <a:t>24/6/2024</a:t>
+              <a:t>28/6/2024</a:t>
             </a:fld>
             <a:endParaRPr lang="es-BO"/>
           </a:p>
@@ -2497,7 +2498,7 @@
           <a:p>
             <a:fld id="{353ECDC7-B053-49E7-A4E4-B30D314B072F}" type="datetimeFigureOut">
               <a:rPr lang="es-BO" smtClean="0"/>
-              <a:t>24/6/2024</a:t>
+              <a:t>28/6/2024</a:t>
             </a:fld>
             <a:endParaRPr lang="es-BO"/>
           </a:p>
@@ -2639,7 +2640,7 @@
           <a:p>
             <a:fld id="{353ECDC7-B053-49E7-A4E4-B30D314B072F}" type="datetimeFigureOut">
               <a:rPr lang="es-BO" smtClean="0"/>
-              <a:t>24/6/2024</a:t>
+              <a:t>28/6/2024</a:t>
             </a:fld>
             <a:endParaRPr lang="es-BO"/>
           </a:p>
@@ -2752,7 +2753,7 @@
           <a:p>
             <a:fld id="{353ECDC7-B053-49E7-A4E4-B30D314B072F}" type="datetimeFigureOut">
               <a:rPr lang="es-BO" smtClean="0"/>
-              <a:t>24/6/2024</a:t>
+              <a:t>28/6/2024</a:t>
             </a:fld>
             <a:endParaRPr lang="es-BO"/>
           </a:p>
@@ -3065,7 +3066,7 @@
           <a:p>
             <a:fld id="{353ECDC7-B053-49E7-A4E4-B30D314B072F}" type="datetimeFigureOut">
               <a:rPr lang="es-BO" smtClean="0"/>
-              <a:t>24/6/2024</a:t>
+              <a:t>28/6/2024</a:t>
             </a:fld>
             <a:endParaRPr lang="es-BO"/>
           </a:p>
@@ -3354,7 +3355,7 @@
           <a:p>
             <a:fld id="{353ECDC7-B053-49E7-A4E4-B30D314B072F}" type="datetimeFigureOut">
               <a:rPr lang="es-BO" smtClean="0"/>
-              <a:t>24/6/2024</a:t>
+              <a:t>28/6/2024</a:t>
             </a:fld>
             <a:endParaRPr lang="es-BO"/>
           </a:p>
@@ -3613,7 +3614,7 @@
           <a:p>
             <a:fld id="{353ECDC7-B053-49E7-A4E4-B30D314B072F}" type="datetimeFigureOut">
               <a:rPr lang="es-BO" smtClean="0"/>
-              <a:t>24/6/2024</a:t>
+              <a:t>28/6/2024</a:t>
             </a:fld>
             <a:endParaRPr lang="es-BO"/>
           </a:p>
@@ -21425,7 +21426,7 @@
         </p:nvSpPr>
         <p:spPr>
           <a:xfrm rot="6213016">
-            <a:off x="10987570" y="5393155"/>
+            <a:off x="10982566" y="5953681"/>
             <a:ext cx="1298862" cy="1266716"/>
           </a:xfrm>
           <a:prstGeom prst="frame">
@@ -21495,7 +21496,7 @@
         </p:nvSpPr>
         <p:spPr>
           <a:xfrm rot="14378614">
-            <a:off x="-217466" y="5203011"/>
+            <a:off x="-261160" y="6083488"/>
             <a:ext cx="1298862" cy="1266716"/>
           </a:xfrm>
           <a:prstGeom prst="frame">
@@ -21667,8 +21668,8 @@
         </p:blipFill>
         <p:spPr>
           <a:xfrm>
-            <a:off x="633444" y="3119771"/>
-            <a:ext cx="1552304" cy="1552304"/>
+            <a:off x="998268" y="2532175"/>
+            <a:ext cx="960150" cy="960150"/>
           </a:xfrm>
           <a:prstGeom prst="rect">
             <a:avLst/>
@@ -21697,7 +21698,7 @@
         </p:blipFill>
         <p:spPr>
           <a:xfrm>
-            <a:off x="2301448" y="3568803"/>
+            <a:off x="2382818" y="3514150"/>
             <a:ext cx="807195" cy="807195"/>
           </a:xfrm>
           <a:prstGeom prst="rect">
@@ -21804,6 +21805,36 @@
           <a:ln>
             <a:noFill/>
           </a:ln>
+        </p:spPr>
+      </p:pic>
+      <p:pic>
+        <p:nvPicPr>
+          <p:cNvPr id="2" name="Imagen 1">
+            <a:extLst>
+              <a:ext uri="{FF2B5EF4-FFF2-40B4-BE49-F238E27FC236}">
+                <a16:creationId xmlns:a16="http://schemas.microsoft.com/office/drawing/2014/main" id="{B1FB3D8B-6929-3550-3673-16B4ED0EEFB3}"/>
+              </a:ext>
+            </a:extLst>
+          </p:cNvPr>
+          <p:cNvPicPr>
+            <a:picLocks noChangeAspect="1"/>
+          </p:cNvPicPr>
+          <p:nvPr/>
+        </p:nvPicPr>
+        <p:blipFill>
+          <a:blip r:embed="rId5"/>
+          <a:stretch>
+            <a:fillRect/>
+          </a:stretch>
+        </p:blipFill>
+        <p:spPr>
+          <a:xfrm>
+            <a:off x="998268" y="3863500"/>
+            <a:ext cx="1059877" cy="1059877"/>
+          </a:xfrm>
+          <a:prstGeom prst="rect">
+            <a:avLst/>
+          </a:prstGeom>
         </p:spPr>
       </p:pic>
     </p:spTree>
@@ -22139,8 +22170,8 @@
         </p:nvSpPr>
         <p:spPr>
           <a:xfrm>
-            <a:off x="677063" y="848594"/>
-            <a:ext cx="10550261" cy="4062651"/>
+            <a:off x="820868" y="1229391"/>
+            <a:ext cx="10550261" cy="3231654"/>
           </a:xfrm>
           <a:prstGeom prst="rect">
             <a:avLst/>
@@ -22219,33 +22250,33 @@
                 <a:ea typeface="Open Sans SemiBold" panose="020B0706030804020204" pitchFamily="34" charset="0"/>
                 <a:cs typeface="Open Sans SemiBold" panose="020B0706030804020204" pitchFamily="34" charset="0"/>
               </a:rPr>
-              <a:t>,</a:t>
-            </a:r>
-          </a:p>
-          <a:p>
-            <a:pPr algn="just"/>
+              <a:t>, aprende </a:t>
+            </a:r>
             <a:r>
               <a:rPr lang="es-MX" dirty="0">
                 <a:solidFill>
-                  <a:schemeClr val="bg1"/>
+                  <a:srgbClr val="EB9734"/>
                 </a:solidFill>
                 <a:latin typeface="Raleway Black" pitchFamily="2" charset="0"/>
                 <a:ea typeface="Open Sans SemiBold" panose="020B0706030804020204" pitchFamily="34" charset="0"/>
                 <a:cs typeface="Open Sans SemiBold" panose="020B0706030804020204" pitchFamily="34" charset="0"/>
               </a:rPr>
-              <a:t>aprende </a:t>
+              <a:t>las relaciones y patrones entre el código HTML y sus estilos correspondientes en CSS</a:t>
             </a:r>
             <a:r>
               <a:rPr lang="es-MX" dirty="0">
                 <a:solidFill>
-                  <a:srgbClr val="EB9734"/>
+                  <a:schemeClr val="bg1"/>
                 </a:solidFill>
                 <a:latin typeface="Raleway Black" pitchFamily="2" charset="0"/>
                 <a:ea typeface="Open Sans SemiBold" panose="020B0706030804020204" pitchFamily="34" charset="0"/>
                 <a:cs typeface="Open Sans SemiBold" panose="020B0706030804020204" pitchFamily="34" charset="0"/>
               </a:rPr>
-              <a:t>las relaciones y patrones entre el código HTML y sus estilos correspondientes en CSS</a:t>
-            </a:r>
+              <a:t>. </a:t>
+            </a:r>
+          </a:p>
+          <a:p>
+            <a:pPr algn="just"/>
             <a:r>
               <a:rPr lang="es-MX" dirty="0">
                 <a:solidFill>
@@ -22255,32 +22286,29 @@
                 <a:ea typeface="Open Sans SemiBold" panose="020B0706030804020204" pitchFamily="34" charset="0"/>
                 <a:cs typeface="Open Sans SemiBold" panose="020B0706030804020204" pitchFamily="34" charset="0"/>
               </a:rPr>
-              <a:t>. </a:t>
-            </a:r>
-          </a:p>
-          <a:p>
-            <a:pPr algn="just"/>
+              <a:t>Durante el entrenamiento, el modelo </a:t>
+            </a:r>
             <a:r>
               <a:rPr lang="es-MX" dirty="0">
                 <a:solidFill>
-                  <a:schemeClr val="bg1"/>
+                  <a:srgbClr val="EB9734"/>
                 </a:solidFill>
                 <a:latin typeface="Raleway Black" pitchFamily="2" charset="0"/>
                 <a:ea typeface="Open Sans SemiBold" panose="020B0706030804020204" pitchFamily="34" charset="0"/>
                 <a:cs typeface="Open Sans SemiBold" panose="020B0706030804020204" pitchFamily="34" charset="0"/>
               </a:rPr>
-              <a:t>Durante el entrenamiento, el modelo </a:t>
+              <a:t>recibe pares de ejemplos donde el HTML está emparejado con su CSS correspondiente.</a:t>
             </a:r>
             <a:r>
               <a:rPr lang="es-MX" dirty="0">
                 <a:solidFill>
-                  <a:srgbClr val="EB9734"/>
+                  <a:schemeClr val="bg1"/>
                 </a:solidFill>
                 <a:latin typeface="Raleway Black" pitchFamily="2" charset="0"/>
                 <a:ea typeface="Open Sans SemiBold" panose="020B0706030804020204" pitchFamily="34" charset="0"/>
                 <a:cs typeface="Open Sans SemiBold" panose="020B0706030804020204" pitchFamily="34" charset="0"/>
               </a:rPr>
-              <a:t>recibe pares de ejemplos donde el HTML está emparejado</a:t>
+              <a:t> </a:t>
             </a:r>
           </a:p>
           <a:p>
@@ -22288,16 +22316,16 @@
             <a:r>
               <a:rPr lang="es-MX" dirty="0">
                 <a:solidFill>
-                  <a:srgbClr val="EB9734"/>
+                  <a:schemeClr val="bg1"/>
                 </a:solidFill>
                 <a:latin typeface="Raleway Black" pitchFamily="2" charset="0"/>
                 <a:ea typeface="Open Sans SemiBold" panose="020B0706030804020204" pitchFamily="34" charset="0"/>
                 <a:cs typeface="Open Sans SemiBold" panose="020B0706030804020204" pitchFamily="34" charset="0"/>
               </a:rPr>
-              <a:t>con su CSS correspondiente.</a:t>
-            </a:r>
-            <a:r>
-              <a:rPr lang="es-MX" dirty="0">
+              <a:t>Utilizando la arquitectura de </a:t>
+            </a:r>
+            <a:r>
+              <a:rPr lang="es-MX" dirty="0" err="1">
                 <a:solidFill>
                   <a:schemeClr val="bg1"/>
                 </a:solidFill>
@@ -22305,10 +22333,10 @@
                 <a:ea typeface="Open Sans SemiBold" panose="020B0706030804020204" pitchFamily="34" charset="0"/>
                 <a:cs typeface="Open Sans SemiBold" panose="020B0706030804020204" pitchFamily="34" charset="0"/>
               </a:rPr>
-              <a:t> Utilizando la arquitectura de </a:t>
-            </a:r>
-            <a:r>
-              <a:rPr lang="es-MX" dirty="0" err="1">
+              <a:t>transformers</a:t>
+            </a:r>
+            <a:r>
+              <a:rPr lang="es-MX" dirty="0">
                 <a:solidFill>
                   <a:schemeClr val="bg1"/>
                 </a:solidFill>
@@ -22316,58 +22344,30 @@
                 <a:ea typeface="Open Sans SemiBold" panose="020B0706030804020204" pitchFamily="34" charset="0"/>
                 <a:cs typeface="Open Sans SemiBold" panose="020B0706030804020204" pitchFamily="34" charset="0"/>
               </a:rPr>
-              <a:t>transformers</a:t>
+              <a:t>, el modelo puede </a:t>
             </a:r>
             <a:r>
               <a:rPr lang="es-MX" dirty="0">
                 <a:solidFill>
-                  <a:schemeClr val="bg1"/>
+                  <a:srgbClr val="EB9734"/>
                 </a:solidFill>
                 <a:latin typeface="Raleway Black" pitchFamily="2" charset="0"/>
                 <a:ea typeface="Open Sans SemiBold" panose="020B0706030804020204" pitchFamily="34" charset="0"/>
                 <a:cs typeface="Open Sans SemiBold" panose="020B0706030804020204" pitchFamily="34" charset="0"/>
               </a:rPr>
-              <a:t>, el modelo puede </a:t>
+              <a:t>entender el contexto y la estructura del HTML para generar estilos CSS apropiados.</a:t>
             </a:r>
             <a:r>
               <a:rPr lang="es-MX" dirty="0">
                 <a:solidFill>
-                  <a:srgbClr val="EB9734"/>
+                  <a:schemeClr val="bg1"/>
                 </a:solidFill>
                 <a:latin typeface="Raleway Black" pitchFamily="2" charset="0"/>
                 <a:ea typeface="Open Sans SemiBold" panose="020B0706030804020204" pitchFamily="34" charset="0"/>
                 <a:cs typeface="Open Sans SemiBold" panose="020B0706030804020204" pitchFamily="34" charset="0"/>
               </a:rPr>
-              <a:t>entender </a:t>
-            </a:r>
-          </a:p>
-          <a:p>
-            <a:pPr algn="just"/>
-            <a:r>
-              <a:rPr lang="es-MX" dirty="0">
-                <a:solidFill>
-                  <a:srgbClr val="EB9734"/>
-                </a:solidFill>
-                <a:latin typeface="Raleway Black" pitchFamily="2" charset="0"/>
-                <a:ea typeface="Open Sans SemiBold" panose="020B0706030804020204" pitchFamily="34" charset="0"/>
-                <a:cs typeface="Open Sans SemiBold" panose="020B0706030804020204" pitchFamily="34" charset="0"/>
-              </a:rPr>
-              <a:t>el contexto y la estructura del HTML para generar estilos CSS apropiados.</a:t>
-            </a:r>
-            <a:r>
-              <a:rPr lang="es-MX" dirty="0">
-                <a:solidFill>
-                  <a:schemeClr val="bg1"/>
-                </a:solidFill>
-                <a:latin typeface="Raleway Black" pitchFamily="2" charset="0"/>
-                <a:ea typeface="Open Sans SemiBold" panose="020B0706030804020204" pitchFamily="34" charset="0"/>
-                <a:cs typeface="Open Sans SemiBold" panose="020B0706030804020204" pitchFamily="34" charset="0"/>
-              </a:rPr>
               <a:t> Cuando se le da un código HTML como entrada, el modelo genera el código CSS necesario para estilizar el HTML basándose en los </a:t>
             </a:r>
-          </a:p>
-          <a:p>
-            <a:pPr algn="just"/>
             <a:r>
               <a:rPr lang="es-MX" dirty="0">
                 <a:solidFill>
@@ -24269,7 +24269,7 @@
                 <a:ea typeface="Open Sans SemiBold" panose="020B0706030804020204" pitchFamily="34" charset="0"/>
                 <a:cs typeface="Open Sans SemiBold" panose="020B0706030804020204" pitchFamily="34" charset="0"/>
               </a:rPr>
-              <a:t> Una vez que el modelo ha sido entrenado, se evalúa su rendimiento utilizando el conjunto de prueba.</a:t>
+              <a:t> Una vez que el modelo ha sido entrenado, se evalúa su rendimiento utilizando el conjunto de datos de prueba.</a:t>
             </a:r>
           </a:p>
         </p:txBody>
@@ -28608,7 +28608,7 @@
         <p:spPr>
           <a:xfrm>
             <a:off x="423598" y="1609913"/>
-            <a:ext cx="10455072" cy="3970318"/>
+            <a:ext cx="10455072" cy="3416320"/>
           </a:xfrm>
           <a:prstGeom prst="rect">
             <a:avLst/>
@@ -29124,7 +29124,7 @@
                 <a:ea typeface="Open Sans SemiBold" panose="020B0706030804020204" pitchFamily="34" charset="0"/>
                 <a:cs typeface="Open Sans SemiBold" panose="020B0706030804020204" pitchFamily="34" charset="0"/>
               </a:rPr>
-              <a:t> Los principales usuarios previstos de estos modelos son investigadores y profesionales de la IA. Principalmente imaginamos que los investigadores utilizarán estos modelos de lenguaje para comprender mejor los comportamientos, capacidades, sesgos y limitaciones de los modelos de lenguaje generativo a gran escala.</a:t>
+              <a:t> Los principales usuarios previstos de estos modelos son investigadores y profesionales en el campo de la Inteligencia Artificial.</a:t>
             </a:r>
           </a:p>
         </p:txBody>
@@ -33919,7 +33919,7 @@
         </p:nvSpPr>
         <p:spPr>
           <a:xfrm>
-            <a:off x="737186" y="877625"/>
+            <a:off x="668161" y="1100689"/>
             <a:ext cx="3568606" cy="430887"/>
           </a:xfrm>
           <a:prstGeom prst="rect">
@@ -34580,7 +34580,7 @@
                 <a:ea typeface="Open Sans SemiBold" panose="020B0706030804020204" pitchFamily="34" charset="0"/>
                 <a:cs typeface="Open Sans SemiBold" panose="020B0706030804020204" pitchFamily="34" charset="0"/>
               </a:rPr>
-              <a:t>. Para ello, dividiremos el conjunto de datos en tres archivos de tipo JSON los cuales son :</a:t>
+              <a:t>. Para ello, dividimos el conjunto de datos en tres archivos de tipo JSON los cuales son :</a:t>
             </a:r>
           </a:p>
           <a:p>
@@ -36700,7 +36700,7 @@
           <a:lstStyle/>
           <a:p>
             <a:r>
-              <a:rPr lang="es-MX" sz="2200" b="1" dirty="0" err="1">
+              <a:rPr lang="es-MX" sz="2200" b="1" dirty="0">
                 <a:solidFill>
                   <a:srgbClr val="FFFF00"/>
                 </a:solidFill>
@@ -36708,40 +36708,7 @@
                 <a:ea typeface="Open Sans SemiBold" panose="020B0706030804020204" pitchFamily="34" charset="0"/>
                 <a:cs typeface="Open Sans SemiBold" panose="020B0706030804020204" pitchFamily="34" charset="0"/>
               </a:rPr>
-              <a:t>Evaluacion</a:t>
-            </a:r>
-            <a:r>
-              <a:rPr lang="es-MX" sz="2200" b="1" dirty="0">
-                <a:solidFill>
-                  <a:srgbClr val="FFFF00"/>
-                </a:solidFill>
-                <a:latin typeface="Raleway Black" pitchFamily="2" charset="0"/>
-                <a:ea typeface="Open Sans SemiBold" panose="020B0706030804020204" pitchFamily="34" charset="0"/>
-                <a:cs typeface="Open Sans SemiBold" panose="020B0706030804020204" pitchFamily="34" charset="0"/>
-              </a:rPr>
-              <a:t> de </a:t>
-            </a:r>
-            <a:r>
-              <a:rPr lang="es-MX" sz="2200" b="1" dirty="0" err="1">
-                <a:solidFill>
-                  <a:srgbClr val="FFFF00"/>
-                </a:solidFill>
-                <a:latin typeface="Raleway Black" pitchFamily="2" charset="0"/>
-                <a:ea typeface="Open Sans SemiBold" panose="020B0706030804020204" pitchFamily="34" charset="0"/>
-                <a:cs typeface="Open Sans SemiBold" panose="020B0706030804020204" pitchFamily="34" charset="0"/>
-              </a:rPr>
-              <a:t>codigo</a:t>
-            </a:r>
-            <a:r>
-              <a:rPr lang="es-MX" sz="2200" b="1" dirty="0">
-                <a:solidFill>
-                  <a:srgbClr val="FFFF00"/>
-                </a:solidFill>
-                <a:latin typeface="Raleway Black" pitchFamily="2" charset="0"/>
-                <a:ea typeface="Open Sans SemiBold" panose="020B0706030804020204" pitchFamily="34" charset="0"/>
-                <a:cs typeface="Open Sans SemiBold" panose="020B0706030804020204" pitchFamily="34" charset="0"/>
-              </a:rPr>
-              <a:t> CSS generado por el Modelo </a:t>
+              <a:t>Evaluación de código CSS generado por el Modelo </a:t>
             </a:r>
             <a:endParaRPr lang="en-US" sz="2200" b="1" dirty="0">
               <a:solidFill>
@@ -36823,6 +36790,320 @@
           </a:p>
         </p:txBody>
       </p:sp>
+      <p:sp>
+        <p:nvSpPr>
+          <p:cNvPr id="3" name="CuadroTexto 2">
+            <a:extLst>
+              <a:ext uri="{FF2B5EF4-FFF2-40B4-BE49-F238E27FC236}">
+                <a16:creationId xmlns:a16="http://schemas.microsoft.com/office/drawing/2014/main" id="{45DC7FC9-CAA6-656A-CCE5-8C07B65F8D8C}"/>
+              </a:ext>
+            </a:extLst>
+          </p:cNvPr>
+          <p:cNvSpPr txBox="1"/>
+          <p:nvPr/>
+        </p:nvSpPr>
+        <p:spPr>
+          <a:xfrm>
+            <a:off x="737186" y="1750491"/>
+            <a:ext cx="10106742" cy="1323439"/>
+          </a:xfrm>
+          <a:prstGeom prst="rect">
+            <a:avLst/>
+          </a:prstGeom>
+          <a:noFill/>
+        </p:spPr>
+        <p:txBody>
+          <a:bodyPr wrap="square" rtlCol="0">
+            <a:spAutoFit/>
+          </a:bodyPr>
+          <a:lstStyle/>
+          <a:p>
+            <a:r>
+              <a:rPr lang="es-MX" sz="1600" dirty="0">
+                <a:solidFill>
+                  <a:schemeClr val="bg1"/>
+                </a:solidFill>
+                <a:latin typeface="Raleway Black" pitchFamily="2" charset="0"/>
+                <a:ea typeface="Open Sans SemiBold" panose="020B0706030804020204" pitchFamily="34" charset="0"/>
+                <a:cs typeface="Open Sans SemiBold" panose="020B0706030804020204" pitchFamily="34" charset="0"/>
+              </a:rPr>
+              <a:t>Para evaluar la precisión de generación de código </a:t>
+            </a:r>
+            <a:r>
+              <a:rPr lang="es-MX" sz="1600" dirty="0" err="1">
+                <a:solidFill>
+                  <a:schemeClr val="bg1"/>
+                </a:solidFill>
+                <a:latin typeface="Raleway Black" pitchFamily="2" charset="0"/>
+                <a:ea typeface="Open Sans SemiBold" panose="020B0706030804020204" pitchFamily="34" charset="0"/>
+                <a:cs typeface="Open Sans SemiBold" panose="020B0706030804020204" pitchFamily="34" charset="0"/>
+              </a:rPr>
+              <a:t>Css</a:t>
+            </a:r>
+            <a:r>
+              <a:rPr lang="es-MX" sz="1600" dirty="0">
+                <a:solidFill>
+                  <a:schemeClr val="bg1"/>
+                </a:solidFill>
+                <a:latin typeface="Raleway Black" pitchFamily="2" charset="0"/>
+                <a:ea typeface="Open Sans SemiBold" panose="020B0706030804020204" pitchFamily="34" charset="0"/>
+                <a:cs typeface="Open Sans SemiBold" panose="020B0706030804020204" pitchFamily="34" charset="0"/>
+              </a:rPr>
+              <a:t> del Modelo se implementó </a:t>
+            </a:r>
+            <a:r>
+              <a:rPr lang="es-MX" sz="1600" dirty="0" err="1">
+                <a:solidFill>
+                  <a:schemeClr val="bg1"/>
+                </a:solidFill>
+                <a:latin typeface="Raleway Black" pitchFamily="2" charset="0"/>
+                <a:ea typeface="Open Sans SemiBold" panose="020B0706030804020204" pitchFamily="34" charset="0"/>
+                <a:cs typeface="Open Sans SemiBold" panose="020B0706030804020204" pitchFamily="34" charset="0"/>
+              </a:rPr>
+              <a:t>bleurt</a:t>
+            </a:r>
+            <a:r>
+              <a:rPr lang="es-MX" sz="1600" dirty="0">
+                <a:solidFill>
+                  <a:schemeClr val="bg1"/>
+                </a:solidFill>
+                <a:latin typeface="Raleway Black" pitchFamily="2" charset="0"/>
+                <a:ea typeface="Open Sans SemiBold" panose="020B0706030804020204" pitchFamily="34" charset="0"/>
+                <a:cs typeface="Open Sans SemiBold" panose="020B0706030804020204" pitchFamily="34" charset="0"/>
+              </a:rPr>
+              <a:t>-</a:t>
+            </a:r>
+            <a:r>
+              <a:rPr lang="es-MX" sz="1600" dirty="0" err="1">
+                <a:solidFill>
+                  <a:schemeClr val="bg1"/>
+                </a:solidFill>
+                <a:latin typeface="Raleway Black" pitchFamily="2" charset="0"/>
+                <a:ea typeface="Open Sans SemiBold" panose="020B0706030804020204" pitchFamily="34" charset="0"/>
+                <a:cs typeface="Open Sans SemiBold" panose="020B0706030804020204" pitchFamily="34" charset="0"/>
+              </a:rPr>
+              <a:t>large</a:t>
+            </a:r>
+            <a:r>
+              <a:rPr lang="es-MX" sz="1600" dirty="0">
+                <a:solidFill>
+                  <a:schemeClr val="bg1"/>
+                </a:solidFill>
+                <a:latin typeface="Raleway Black" pitchFamily="2" charset="0"/>
+                <a:ea typeface="Open Sans SemiBold" panose="020B0706030804020204" pitchFamily="34" charset="0"/>
+                <a:cs typeface="Open Sans SemiBold" panose="020B0706030804020204" pitchFamily="34" charset="0"/>
+              </a:rPr>
+              <a:t>-512 que es un modelo de evaluación automática del lenguaje natural basado en </a:t>
+            </a:r>
+            <a:r>
+              <a:rPr lang="es-MX" sz="1600" dirty="0" err="1">
+                <a:solidFill>
+                  <a:schemeClr val="bg1"/>
+                </a:solidFill>
+                <a:latin typeface="Raleway Black" pitchFamily="2" charset="0"/>
+                <a:ea typeface="Open Sans SemiBold" panose="020B0706030804020204" pitchFamily="34" charset="0"/>
+                <a:cs typeface="Open Sans SemiBold" panose="020B0706030804020204" pitchFamily="34" charset="0"/>
+              </a:rPr>
+              <a:t>BLEURT</a:t>
+            </a:r>
+            <a:r>
+              <a:rPr lang="es-MX" sz="1600" dirty="0">
+                <a:solidFill>
+                  <a:schemeClr val="bg1"/>
+                </a:solidFill>
+                <a:latin typeface="Raleway Black" pitchFamily="2" charset="0"/>
+                <a:ea typeface="Open Sans SemiBold" panose="020B0706030804020204" pitchFamily="34" charset="0"/>
+                <a:cs typeface="Open Sans SemiBold" panose="020B0706030804020204" pitchFamily="34" charset="0"/>
+              </a:rPr>
+              <a:t> (</a:t>
+            </a:r>
+            <a:r>
+              <a:rPr lang="es-MX" sz="1600" dirty="0" err="1">
+                <a:solidFill>
+                  <a:schemeClr val="bg1"/>
+                </a:solidFill>
+                <a:latin typeface="Raleway Black" pitchFamily="2" charset="0"/>
+                <a:ea typeface="Open Sans SemiBold" panose="020B0706030804020204" pitchFamily="34" charset="0"/>
+                <a:cs typeface="Open Sans SemiBold" panose="020B0706030804020204" pitchFamily="34" charset="0"/>
+              </a:rPr>
+              <a:t>Bilingual</a:t>
+            </a:r>
+            <a:r>
+              <a:rPr lang="es-MX" sz="1600" dirty="0">
+                <a:solidFill>
+                  <a:schemeClr val="bg1"/>
+                </a:solidFill>
+                <a:latin typeface="Raleway Black" pitchFamily="2" charset="0"/>
+                <a:ea typeface="Open Sans SemiBold" panose="020B0706030804020204" pitchFamily="34" charset="0"/>
+                <a:cs typeface="Open Sans SemiBold" panose="020B0706030804020204" pitchFamily="34" charset="0"/>
+              </a:rPr>
+              <a:t> </a:t>
+            </a:r>
+            <a:r>
+              <a:rPr lang="es-MX" sz="1600" dirty="0" err="1">
+                <a:solidFill>
+                  <a:schemeClr val="bg1"/>
+                </a:solidFill>
+                <a:latin typeface="Raleway Black" pitchFamily="2" charset="0"/>
+                <a:ea typeface="Open Sans SemiBold" panose="020B0706030804020204" pitchFamily="34" charset="0"/>
+                <a:cs typeface="Open Sans SemiBold" panose="020B0706030804020204" pitchFamily="34" charset="0"/>
+              </a:rPr>
+              <a:t>Evaluation</a:t>
+            </a:r>
+            <a:r>
+              <a:rPr lang="es-MX" sz="1600" dirty="0">
+                <a:solidFill>
+                  <a:schemeClr val="bg1"/>
+                </a:solidFill>
+                <a:latin typeface="Raleway Black" pitchFamily="2" charset="0"/>
+                <a:ea typeface="Open Sans SemiBold" panose="020B0706030804020204" pitchFamily="34" charset="0"/>
+                <a:cs typeface="Open Sans SemiBold" panose="020B0706030804020204" pitchFamily="34" charset="0"/>
+              </a:rPr>
+              <a:t> </a:t>
+            </a:r>
+            <a:r>
+              <a:rPr lang="es-MX" sz="1600" dirty="0" err="1">
+                <a:solidFill>
+                  <a:schemeClr val="bg1"/>
+                </a:solidFill>
+                <a:latin typeface="Raleway Black" pitchFamily="2" charset="0"/>
+                <a:ea typeface="Open Sans SemiBold" panose="020B0706030804020204" pitchFamily="34" charset="0"/>
+                <a:cs typeface="Open Sans SemiBold" panose="020B0706030804020204" pitchFamily="34" charset="0"/>
+              </a:rPr>
+              <a:t>Understudy</a:t>
+            </a:r>
+            <a:r>
+              <a:rPr lang="es-MX" sz="1600" dirty="0">
+                <a:solidFill>
+                  <a:schemeClr val="bg1"/>
+                </a:solidFill>
+                <a:latin typeface="Raleway Black" pitchFamily="2" charset="0"/>
+                <a:ea typeface="Open Sans SemiBold" panose="020B0706030804020204" pitchFamily="34" charset="0"/>
+                <a:cs typeface="Open Sans SemiBold" panose="020B0706030804020204" pitchFamily="34" charset="0"/>
+              </a:rPr>
+              <a:t> </a:t>
+            </a:r>
+            <a:r>
+              <a:rPr lang="es-MX" sz="1600" dirty="0" err="1">
+                <a:solidFill>
+                  <a:schemeClr val="bg1"/>
+                </a:solidFill>
+                <a:latin typeface="Raleway Black" pitchFamily="2" charset="0"/>
+                <a:ea typeface="Open Sans SemiBold" panose="020B0706030804020204" pitchFamily="34" charset="0"/>
+                <a:cs typeface="Open Sans SemiBold" panose="020B0706030804020204" pitchFamily="34" charset="0"/>
+              </a:rPr>
+              <a:t>with</a:t>
+            </a:r>
+            <a:r>
+              <a:rPr lang="es-MX" sz="1600" dirty="0">
+                <a:solidFill>
+                  <a:schemeClr val="bg1"/>
+                </a:solidFill>
+                <a:latin typeface="Raleway Black" pitchFamily="2" charset="0"/>
+                <a:ea typeface="Open Sans SemiBold" panose="020B0706030804020204" pitchFamily="34" charset="0"/>
+                <a:cs typeface="Open Sans SemiBold" panose="020B0706030804020204" pitchFamily="34" charset="0"/>
+              </a:rPr>
+              <a:t> </a:t>
+            </a:r>
+            <a:r>
+              <a:rPr lang="es-MX" sz="1600" dirty="0" err="1">
+                <a:solidFill>
+                  <a:schemeClr val="bg1"/>
+                </a:solidFill>
+                <a:latin typeface="Raleway Black" pitchFamily="2" charset="0"/>
+                <a:ea typeface="Open Sans SemiBold" panose="020B0706030804020204" pitchFamily="34" charset="0"/>
+                <a:cs typeface="Open Sans SemiBold" panose="020B0706030804020204" pitchFamily="34" charset="0"/>
+              </a:rPr>
+              <a:t>Representations</a:t>
+            </a:r>
+            <a:r>
+              <a:rPr lang="es-MX" sz="1600" dirty="0">
+                <a:solidFill>
+                  <a:schemeClr val="bg1"/>
+                </a:solidFill>
+                <a:latin typeface="Raleway Black" pitchFamily="2" charset="0"/>
+                <a:ea typeface="Open Sans SemiBold" panose="020B0706030804020204" pitchFamily="34" charset="0"/>
+                <a:cs typeface="Open Sans SemiBold" panose="020B0706030804020204" pitchFamily="34" charset="0"/>
+              </a:rPr>
+              <a:t> </a:t>
+            </a:r>
+            <a:r>
+              <a:rPr lang="es-MX" sz="1600" dirty="0" err="1">
+                <a:solidFill>
+                  <a:schemeClr val="bg1"/>
+                </a:solidFill>
+                <a:latin typeface="Raleway Black" pitchFamily="2" charset="0"/>
+                <a:ea typeface="Open Sans SemiBold" panose="020B0706030804020204" pitchFamily="34" charset="0"/>
+                <a:cs typeface="Open Sans SemiBold" panose="020B0706030804020204" pitchFamily="34" charset="0"/>
+              </a:rPr>
+              <a:t>from</a:t>
+            </a:r>
+            <a:r>
+              <a:rPr lang="es-MX" sz="1600" dirty="0">
+                <a:solidFill>
+                  <a:schemeClr val="bg1"/>
+                </a:solidFill>
+                <a:latin typeface="Raleway Black" pitchFamily="2" charset="0"/>
+                <a:ea typeface="Open Sans SemiBold" panose="020B0706030804020204" pitchFamily="34" charset="0"/>
+                <a:cs typeface="Open Sans SemiBold" panose="020B0706030804020204" pitchFamily="34" charset="0"/>
+              </a:rPr>
+              <a:t> Transformers). </a:t>
+            </a:r>
+            <a:r>
+              <a:rPr lang="es-MX" sz="1600" dirty="0" err="1">
+                <a:solidFill>
+                  <a:schemeClr val="bg1"/>
+                </a:solidFill>
+                <a:latin typeface="Raleway Black" pitchFamily="2" charset="0"/>
+                <a:ea typeface="Open Sans SemiBold" panose="020B0706030804020204" pitchFamily="34" charset="0"/>
+                <a:cs typeface="Open Sans SemiBold" panose="020B0706030804020204" pitchFamily="34" charset="0"/>
+              </a:rPr>
+              <a:t>BLEURT</a:t>
+            </a:r>
+            <a:r>
+              <a:rPr lang="es-MX" sz="1600" dirty="0">
+                <a:solidFill>
+                  <a:schemeClr val="bg1"/>
+                </a:solidFill>
+                <a:latin typeface="Raleway Black" pitchFamily="2" charset="0"/>
+                <a:ea typeface="Open Sans SemiBold" panose="020B0706030804020204" pitchFamily="34" charset="0"/>
+                <a:cs typeface="Open Sans SemiBold" panose="020B0706030804020204" pitchFamily="34" charset="0"/>
+              </a:rPr>
+              <a:t> es una herramienta diseñada para evaluar la calidad de las respuestas generadas por modelos de lenguaje natural comparándolas con respuestas de referencia.</a:t>
+            </a:r>
+          </a:p>
+        </p:txBody>
+      </p:sp>
+      <p:pic>
+        <p:nvPicPr>
+          <p:cNvPr id="11" name="Imagen 10">
+            <a:extLst>
+              <a:ext uri="{FF2B5EF4-FFF2-40B4-BE49-F238E27FC236}">
+                <a16:creationId xmlns:a16="http://schemas.microsoft.com/office/drawing/2014/main" id="{A05673B3-61A7-8915-B7A2-123A4A5B888A}"/>
+              </a:ext>
+            </a:extLst>
+          </p:cNvPr>
+          <p:cNvPicPr>
+            <a:picLocks noChangeAspect="1"/>
+          </p:cNvPicPr>
+          <p:nvPr/>
+        </p:nvPicPr>
+        <p:blipFill>
+          <a:blip r:embed="rId3"/>
+          <a:stretch>
+            <a:fillRect/>
+          </a:stretch>
+        </p:blipFill>
+        <p:spPr>
+          <a:xfrm>
+            <a:off x="1675782" y="3211058"/>
+            <a:ext cx="8840434" cy="3134162"/>
+          </a:xfrm>
+          <a:prstGeom prst="rect">
+            <a:avLst/>
+          </a:prstGeom>
+        </p:spPr>
+      </p:pic>
     </p:spTree>
     <p:extLst>
       <p:ext uri="{BB962C8B-B14F-4D97-AF65-F5344CB8AC3E}">
@@ -37020,7 +37301,7 @@
         </p:nvSpPr>
         <p:spPr>
           <a:xfrm rot="2700000">
-            <a:off x="11888099" y="777422"/>
+            <a:off x="11622498" y="2228082"/>
             <a:ext cx="1298862" cy="1266716"/>
           </a:xfrm>
           <a:prstGeom prst="frame">
@@ -37097,7 +37378,7 @@
         </p:nvSpPr>
         <p:spPr>
           <a:xfrm>
-            <a:off x="-649431" y="5449312"/>
+            <a:off x="185433" y="5580754"/>
             <a:ext cx="1298862" cy="1266716"/>
           </a:xfrm>
           <a:prstGeom prst="frame">
@@ -37251,8 +37532,8 @@
         </p:nvSpPr>
         <p:spPr>
           <a:xfrm>
-            <a:off x="341191" y="1132909"/>
-            <a:ext cx="11289270" cy="3477875"/>
+            <a:off x="737186" y="1209214"/>
+            <a:ext cx="7353295" cy="430887"/>
           </a:xfrm>
           <a:prstGeom prst="rect">
             <a:avLst/>
@@ -37260,7 +37541,7 @@
           <a:noFill/>
         </p:spPr>
         <p:txBody>
-          <a:bodyPr wrap="square" rtlCol="0">
+          <a:bodyPr wrap="none" rtlCol="0">
             <a:spAutoFit/>
           </a:bodyPr>
           <a:lstStyle/>
@@ -37274,127 +37555,11 @@
                 <a:ea typeface="Open Sans SemiBold" panose="020B0706030804020204" pitchFamily="34" charset="0"/>
                 <a:cs typeface="Open Sans SemiBold" panose="020B0706030804020204" pitchFamily="34" charset="0"/>
               </a:rPr>
-              <a:t>Sistema Generador de CSS</a:t>
-            </a:r>
-          </a:p>
-          <a:p>
-            <a:r>
-              <a:rPr lang="es-MX" b="1" dirty="0">
-                <a:solidFill>
-                  <a:schemeClr val="bg1"/>
-                </a:solidFill>
-                <a:latin typeface="Raleway Black" pitchFamily="2" charset="0"/>
-                <a:ea typeface="Open Sans SemiBold" panose="020B0706030804020204" pitchFamily="34" charset="0"/>
-                <a:cs typeface="Open Sans SemiBold" panose="020B0706030804020204" pitchFamily="34" charset="0"/>
-              </a:rPr>
-              <a:t>Una vez que el Modelo ha sido entrenado cumpliendo con la precisión esperada, y se implementó una API para enviar peticiones al Modelo para generar código CSS, se desarrolló un sistema generador de código CSS que utiliza la API y el Modelo generador de código CSS.</a:t>
-            </a:r>
-          </a:p>
-          <a:p>
-            <a:endParaRPr lang="es-MX" b="1" dirty="0">
-              <a:solidFill>
-                <a:schemeClr val="bg1"/>
-              </a:solidFill>
-              <a:latin typeface="Raleway Black" pitchFamily="2" charset="0"/>
-              <a:ea typeface="Open Sans SemiBold" panose="020B0706030804020204" pitchFamily="34" charset="0"/>
-              <a:cs typeface="Open Sans SemiBold" panose="020B0706030804020204" pitchFamily="34" charset="0"/>
-            </a:endParaRPr>
-          </a:p>
-          <a:p>
-            <a:r>
-              <a:rPr lang="es-MX" b="1" dirty="0">
-                <a:solidFill>
-                  <a:srgbClr val="FFFF00"/>
-                </a:solidFill>
-                <a:latin typeface="Raleway Black" pitchFamily="2" charset="0"/>
-                <a:ea typeface="Open Sans SemiBold" panose="020B0706030804020204" pitchFamily="34" charset="0"/>
-                <a:cs typeface="Open Sans SemiBold" panose="020B0706030804020204" pitchFamily="34" charset="0"/>
-              </a:rPr>
-              <a:t>Se implemento diversos componentes en el Sistema generador de CSS los cuales son: </a:t>
-            </a:r>
-          </a:p>
-          <a:p>
-            <a:endParaRPr lang="es-MX" b="1" dirty="0">
-              <a:solidFill>
-                <a:schemeClr val="bg1"/>
-              </a:solidFill>
-              <a:latin typeface="Raleway Black" pitchFamily="2" charset="0"/>
-              <a:ea typeface="Open Sans SemiBold" panose="020B0706030804020204" pitchFamily="34" charset="0"/>
-              <a:cs typeface="Open Sans SemiBold" panose="020B0706030804020204" pitchFamily="34" charset="0"/>
-            </a:endParaRPr>
-          </a:p>
-          <a:p>
-            <a:pPr marL="3486150" lvl="7" indent="-285750">
-              <a:buFont typeface="Arial" panose="020B0604020202020204" pitchFamily="34" charset="0"/>
-              <a:buChar char="•"/>
-            </a:pPr>
-            <a:r>
-              <a:rPr lang="es-MX" b="1" dirty="0">
-                <a:solidFill>
-                  <a:schemeClr val="bg1"/>
-                </a:solidFill>
-                <a:latin typeface="Raleway Black" pitchFamily="2" charset="0"/>
-                <a:ea typeface="Open Sans SemiBold" panose="020B0706030804020204" pitchFamily="34" charset="0"/>
-                <a:cs typeface="Open Sans SemiBold" panose="020B0706030804020204" pitchFamily="34" charset="0"/>
-              </a:rPr>
-              <a:t>Barra de navegación vertical </a:t>
-            </a:r>
-          </a:p>
-          <a:p>
-            <a:pPr marL="3486150" lvl="7" indent="-285750">
-              <a:buFont typeface="Arial" panose="020B0604020202020204" pitchFamily="34" charset="0"/>
-              <a:buChar char="•"/>
-            </a:pPr>
-            <a:r>
-              <a:rPr lang="es-MX" b="1" dirty="0">
-                <a:solidFill>
-                  <a:schemeClr val="bg1"/>
-                </a:solidFill>
-                <a:latin typeface="Raleway Black" pitchFamily="2" charset="0"/>
-                <a:ea typeface="Open Sans SemiBold" panose="020B0706030804020204" pitchFamily="34" charset="0"/>
-                <a:cs typeface="Open Sans SemiBold" panose="020B0706030804020204" pitchFamily="34" charset="0"/>
-              </a:rPr>
-              <a:t>Visualizador </a:t>
-            </a:r>
-          </a:p>
-          <a:p>
-            <a:pPr marL="3486150" lvl="7" indent="-285750">
-              <a:buFont typeface="Arial" panose="020B0604020202020204" pitchFamily="34" charset="0"/>
-              <a:buChar char="•"/>
-            </a:pPr>
-            <a:r>
-              <a:rPr lang="es-MX" b="1" dirty="0">
-                <a:solidFill>
-                  <a:schemeClr val="bg1"/>
-                </a:solidFill>
-                <a:latin typeface="Raleway Black" pitchFamily="2" charset="0"/>
-                <a:ea typeface="Open Sans SemiBold" panose="020B0706030804020204" pitchFamily="34" charset="0"/>
-                <a:cs typeface="Open Sans SemiBold" panose="020B0706030804020204" pitchFamily="34" charset="0"/>
-              </a:rPr>
-              <a:t>Inicio de sesión </a:t>
-            </a:r>
-          </a:p>
-          <a:p>
-            <a:pPr marL="3486150" lvl="7" indent="-285750">
-              <a:buFont typeface="Arial" panose="020B0604020202020204" pitchFamily="34" charset="0"/>
-              <a:buChar char="•"/>
-            </a:pPr>
-            <a:r>
-              <a:rPr lang="es-MX" b="1" dirty="0">
-                <a:solidFill>
-                  <a:schemeClr val="bg1"/>
-                </a:solidFill>
-                <a:latin typeface="Raleway Black" pitchFamily="2" charset="0"/>
-                <a:ea typeface="Open Sans SemiBold" panose="020B0706030804020204" pitchFamily="34" charset="0"/>
-                <a:cs typeface="Open Sans SemiBold" panose="020B0706030804020204" pitchFamily="34" charset="0"/>
-              </a:rPr>
-              <a:t>Historial</a:t>
-            </a:r>
-          </a:p>
-          <a:p>
-            <a:endParaRPr lang="es-MX" b="1" dirty="0">
-              <a:solidFill>
-                <a:schemeClr val="bg1"/>
+              <a:t>Alojamiento del modelo generador de código CSS </a:t>
+            </a:r>
+            <a:endParaRPr lang="en-US" sz="2200" b="1" dirty="0">
+              <a:solidFill>
+                <a:srgbClr val="FFFF00"/>
               </a:solidFill>
               <a:latin typeface="Raleway Black" pitchFamily="2" charset="0"/>
               <a:ea typeface="Open Sans SemiBold" panose="020B0706030804020204" pitchFamily="34" charset="0"/>
@@ -37472,23 +37637,257 @@
           </a:p>
         </p:txBody>
       </p:sp>
+      <p:sp>
+        <p:nvSpPr>
+          <p:cNvPr id="3" name="CuadroTexto 2">
+            <a:extLst>
+              <a:ext uri="{FF2B5EF4-FFF2-40B4-BE49-F238E27FC236}">
+                <a16:creationId xmlns:a16="http://schemas.microsoft.com/office/drawing/2014/main" id="{45DC7FC9-CAA6-656A-CCE5-8C07B65F8D8C}"/>
+              </a:ext>
+            </a:extLst>
+          </p:cNvPr>
+          <p:cNvSpPr txBox="1"/>
+          <p:nvPr/>
+        </p:nvSpPr>
+        <p:spPr>
+          <a:xfrm>
+            <a:off x="737186" y="1750491"/>
+            <a:ext cx="10106742" cy="830997"/>
+          </a:xfrm>
+          <a:prstGeom prst="rect">
+            <a:avLst/>
+          </a:prstGeom>
+          <a:noFill/>
+        </p:spPr>
+        <p:txBody>
+          <a:bodyPr wrap="square" rtlCol="0">
+            <a:spAutoFit/>
+          </a:bodyPr>
+          <a:lstStyle/>
+          <a:p>
+            <a:r>
+              <a:rPr lang="es-MX" sz="1600" dirty="0">
+                <a:solidFill>
+                  <a:schemeClr val="bg1"/>
+                </a:solidFill>
+                <a:latin typeface="Raleway Black" pitchFamily="2" charset="0"/>
+                <a:ea typeface="Open Sans SemiBold" panose="020B0706030804020204" pitchFamily="34" charset="0"/>
+                <a:cs typeface="Open Sans SemiBold" panose="020B0706030804020204" pitchFamily="34" charset="0"/>
+              </a:rPr>
+              <a:t>Para alojar el modelo gratuitamente, se utilizó el plan HF Hub de </a:t>
+            </a:r>
+            <a:r>
+              <a:rPr lang="es-MX" sz="1600" dirty="0" err="1">
+                <a:solidFill>
+                  <a:schemeClr val="bg1"/>
+                </a:solidFill>
+                <a:latin typeface="Raleway Black" pitchFamily="2" charset="0"/>
+                <a:ea typeface="Open Sans SemiBold" panose="020B0706030804020204" pitchFamily="34" charset="0"/>
+                <a:cs typeface="Open Sans SemiBold" panose="020B0706030804020204" pitchFamily="34" charset="0"/>
+              </a:rPr>
+              <a:t>Hugging</a:t>
+            </a:r>
+            <a:r>
+              <a:rPr lang="es-MX" sz="1600" dirty="0">
+                <a:solidFill>
+                  <a:schemeClr val="bg1"/>
+                </a:solidFill>
+                <a:latin typeface="Raleway Black" pitchFamily="2" charset="0"/>
+                <a:ea typeface="Open Sans SemiBold" panose="020B0706030804020204" pitchFamily="34" charset="0"/>
+                <a:cs typeface="Open Sans SemiBold" panose="020B0706030804020204" pitchFamily="34" charset="0"/>
+              </a:rPr>
+              <a:t> </a:t>
+            </a:r>
+            <a:r>
+              <a:rPr lang="es-MX" sz="1600" dirty="0" err="1">
+                <a:solidFill>
+                  <a:schemeClr val="bg1"/>
+                </a:solidFill>
+                <a:latin typeface="Raleway Black" pitchFamily="2" charset="0"/>
+                <a:ea typeface="Open Sans SemiBold" panose="020B0706030804020204" pitchFamily="34" charset="0"/>
+                <a:cs typeface="Open Sans SemiBold" panose="020B0706030804020204" pitchFamily="34" charset="0"/>
+              </a:rPr>
+              <a:t>Face</a:t>
+            </a:r>
+            <a:r>
+              <a:rPr lang="es-MX" sz="1600" dirty="0">
+                <a:solidFill>
+                  <a:schemeClr val="bg1"/>
+                </a:solidFill>
+                <a:latin typeface="Raleway Black" pitchFamily="2" charset="0"/>
+                <a:ea typeface="Open Sans SemiBold" panose="020B0706030804020204" pitchFamily="34" charset="0"/>
+                <a:cs typeface="Open Sans SemiBold" panose="020B0706030804020204" pitchFamily="34" charset="0"/>
+              </a:rPr>
+              <a:t>, y para las peticiones al modelo se empleó el plan </a:t>
+            </a:r>
+            <a:r>
+              <a:rPr lang="es-MX" sz="1600" dirty="0" err="1">
+                <a:solidFill>
+                  <a:schemeClr val="bg1"/>
+                </a:solidFill>
+                <a:latin typeface="Raleway Black" pitchFamily="2" charset="0"/>
+                <a:ea typeface="Open Sans SemiBold" panose="020B0706030804020204" pitchFamily="34" charset="0"/>
+                <a:cs typeface="Open Sans SemiBold" panose="020B0706030804020204" pitchFamily="34" charset="0"/>
+              </a:rPr>
+              <a:t>Inference</a:t>
+            </a:r>
+            <a:r>
+              <a:rPr lang="es-MX" sz="1600" dirty="0">
+                <a:solidFill>
+                  <a:schemeClr val="bg1"/>
+                </a:solidFill>
+                <a:latin typeface="Raleway Black" pitchFamily="2" charset="0"/>
+                <a:ea typeface="Open Sans SemiBold" panose="020B0706030804020204" pitchFamily="34" charset="0"/>
+                <a:cs typeface="Open Sans SemiBold" panose="020B0706030804020204" pitchFamily="34" charset="0"/>
+              </a:rPr>
+              <a:t> </a:t>
+            </a:r>
+            <a:r>
+              <a:rPr lang="es-MX" sz="1600" dirty="0" err="1">
+                <a:solidFill>
+                  <a:schemeClr val="bg1"/>
+                </a:solidFill>
+                <a:latin typeface="Raleway Black" pitchFamily="2" charset="0"/>
+                <a:ea typeface="Open Sans SemiBold" panose="020B0706030804020204" pitchFamily="34" charset="0"/>
+                <a:cs typeface="Open Sans SemiBold" panose="020B0706030804020204" pitchFamily="34" charset="0"/>
+              </a:rPr>
+              <a:t>Endpoints</a:t>
+            </a:r>
+            <a:r>
+              <a:rPr lang="es-MX" sz="1600" dirty="0">
+                <a:solidFill>
+                  <a:schemeClr val="bg1"/>
+                </a:solidFill>
+                <a:latin typeface="Raleway Black" pitchFamily="2" charset="0"/>
+                <a:ea typeface="Open Sans SemiBold" panose="020B0706030804020204" pitchFamily="34" charset="0"/>
+                <a:cs typeface="Open Sans SemiBold" panose="020B0706030804020204" pitchFamily="34" charset="0"/>
+              </a:rPr>
+              <a:t> (dedicado) de </a:t>
+            </a:r>
+            <a:r>
+              <a:rPr lang="es-MX" sz="1600" dirty="0" err="1">
+                <a:solidFill>
+                  <a:schemeClr val="bg1"/>
+                </a:solidFill>
+                <a:latin typeface="Raleway Black" pitchFamily="2" charset="0"/>
+                <a:ea typeface="Open Sans SemiBold" panose="020B0706030804020204" pitchFamily="34" charset="0"/>
+                <a:cs typeface="Open Sans SemiBold" panose="020B0706030804020204" pitchFamily="34" charset="0"/>
+              </a:rPr>
+              <a:t>Hugging</a:t>
+            </a:r>
+            <a:r>
+              <a:rPr lang="es-MX" sz="1600" dirty="0">
+                <a:solidFill>
+                  <a:schemeClr val="bg1"/>
+                </a:solidFill>
+                <a:latin typeface="Raleway Black" pitchFamily="2" charset="0"/>
+                <a:ea typeface="Open Sans SemiBold" panose="020B0706030804020204" pitchFamily="34" charset="0"/>
+                <a:cs typeface="Open Sans SemiBold" panose="020B0706030804020204" pitchFamily="34" charset="0"/>
+              </a:rPr>
+              <a:t> </a:t>
+            </a:r>
+            <a:r>
+              <a:rPr lang="es-MX" sz="1600" dirty="0" err="1">
+                <a:solidFill>
+                  <a:schemeClr val="bg1"/>
+                </a:solidFill>
+                <a:latin typeface="Raleway Black" pitchFamily="2" charset="0"/>
+                <a:ea typeface="Open Sans SemiBold" panose="020B0706030804020204" pitchFamily="34" charset="0"/>
+                <a:cs typeface="Open Sans SemiBold" panose="020B0706030804020204" pitchFamily="34" charset="0"/>
+              </a:rPr>
+              <a:t>Face</a:t>
+            </a:r>
+            <a:r>
+              <a:rPr lang="es-MX" sz="1600" dirty="0">
+                <a:solidFill>
+                  <a:schemeClr val="bg1"/>
+                </a:solidFill>
+                <a:latin typeface="Raleway Black" pitchFamily="2" charset="0"/>
+                <a:ea typeface="Open Sans SemiBold" panose="020B0706030804020204" pitchFamily="34" charset="0"/>
+                <a:cs typeface="Open Sans SemiBold" panose="020B0706030804020204" pitchFamily="34" charset="0"/>
+              </a:rPr>
+              <a:t>, que calcula el costo promedio de las peticiones al modelo por hora.</a:t>
+            </a:r>
+          </a:p>
+        </p:txBody>
+      </p:sp>
+      <p:pic>
+        <p:nvPicPr>
+          <p:cNvPr id="4" name="Imagen 3">
+            <a:extLst>
+              <a:ext uri="{FF2B5EF4-FFF2-40B4-BE49-F238E27FC236}">
+                <a16:creationId xmlns:a16="http://schemas.microsoft.com/office/drawing/2014/main" id="{8B98E2C7-B262-8511-5082-2DC1C4BBDD82}"/>
+              </a:ext>
+            </a:extLst>
+          </p:cNvPr>
+          <p:cNvPicPr>
+            <a:picLocks noChangeAspect="1"/>
+          </p:cNvPicPr>
+          <p:nvPr/>
+        </p:nvPicPr>
+        <p:blipFill>
+          <a:blip r:embed="rId3"/>
+          <a:stretch>
+            <a:fillRect/>
+          </a:stretch>
+        </p:blipFill>
+        <p:spPr>
+          <a:xfrm>
+            <a:off x="1701836" y="2808802"/>
+            <a:ext cx="3935490" cy="3097361"/>
+          </a:xfrm>
+          <a:prstGeom prst="rect">
+            <a:avLst/>
+          </a:prstGeom>
+        </p:spPr>
+      </p:pic>
+      <p:pic>
+        <p:nvPicPr>
+          <p:cNvPr id="6" name="Imagen 5">
+            <a:extLst>
+              <a:ext uri="{FF2B5EF4-FFF2-40B4-BE49-F238E27FC236}">
+                <a16:creationId xmlns:a16="http://schemas.microsoft.com/office/drawing/2014/main" id="{DA4ECA8A-7032-9064-53E5-70D2E4055845}"/>
+              </a:ext>
+            </a:extLst>
+          </p:cNvPr>
+          <p:cNvPicPr>
+            <a:picLocks noChangeAspect="1"/>
+          </p:cNvPicPr>
+          <p:nvPr/>
+        </p:nvPicPr>
+        <p:blipFill>
+          <a:blip r:embed="rId4"/>
+          <a:stretch>
+            <a:fillRect/>
+          </a:stretch>
+        </p:blipFill>
+        <p:spPr>
+          <a:xfrm>
+            <a:off x="5981718" y="2800930"/>
+            <a:ext cx="3982552" cy="3097363"/>
+          </a:xfrm>
+          <a:prstGeom prst="rect">
+            <a:avLst/>
+          </a:prstGeom>
+        </p:spPr>
+      </p:pic>
     </p:spTree>
     <p:extLst>
       <p:ext uri="{BB962C8B-B14F-4D97-AF65-F5344CB8AC3E}">
-        <p14:creationId xmlns:p14="http://schemas.microsoft.com/office/powerpoint/2010/main" val="2430271893"/>
+        <p14:creationId xmlns:p14="http://schemas.microsoft.com/office/powerpoint/2010/main" val="3460971075"/>
       </p:ext>
     </p:extLst>
   </p:cSld>
   <p:clrMapOvr>
     <a:masterClrMapping/>
   </p:clrMapOvr>
-  <mc:AlternateContent xmlns:mc="http://schemas.openxmlformats.org/markup-compatibility/2006" xmlns:p159="http://schemas.microsoft.com/office/powerpoint/2015/09/main">
-    <mc:Choice Requires="p159">
+  <mc:AlternateContent xmlns:mc="http://schemas.openxmlformats.org/markup-compatibility/2006">
+    <mc:Choice xmlns:p159="http://schemas.microsoft.com/office/powerpoint/2015/09/main" Requires="p159">
       <p:transition xmlns:p14="http://schemas.microsoft.com/office/powerpoint/2010/main" spd="slow" p14:dur="2000">
         <p159:morph option="byObject"/>
       </p:transition>
     </mc:Choice>
-    <mc:Fallback xmlns="">
+    <mc:Fallback>
       <p:transition spd="slow">
         <p:fade/>
       </p:transition>
@@ -37516,10 +37915,10 @@
       </p:grpSpPr>
       <p:sp>
         <p:nvSpPr>
-          <p:cNvPr id="11" name="CuadroTexto 10">
-            <a:extLst>
-              <a:ext uri="{FF2B5EF4-FFF2-40B4-BE49-F238E27FC236}">
-                <a16:creationId xmlns:a16="http://schemas.microsoft.com/office/drawing/2014/main" id="{E6364B03-8BE8-6ED5-4CCE-26078AB0B956}"/>
+          <p:cNvPr id="27" name="CuadroTexto 26">
+            <a:extLst>
+              <a:ext uri="{FF2B5EF4-FFF2-40B4-BE49-F238E27FC236}">
+                <a16:creationId xmlns:a16="http://schemas.microsoft.com/office/drawing/2014/main" id="{87B13D7A-39B9-23F1-8BBE-7195185A6185}"/>
               </a:ext>
             </a:extLst>
           </p:cNvPr>
@@ -37528,50 +37927,8 @@
         </p:nvSpPr>
         <p:spPr>
           <a:xfrm>
-            <a:off x="1241515" y="1082433"/>
-            <a:ext cx="9425129" cy="830997"/>
-          </a:xfrm>
-          <a:prstGeom prst="rect">
-            <a:avLst/>
-          </a:prstGeom>
-          <a:noFill/>
-        </p:spPr>
-        <p:txBody>
-          <a:bodyPr wrap="square" rtlCol="0">
-            <a:spAutoFit/>
-          </a:bodyPr>
-          <a:lstStyle/>
-          <a:p>
-            <a:r>
-              <a:rPr lang="es-MX" sz="1600" dirty="0">
-                <a:solidFill>
-                  <a:schemeClr val="bg1"/>
-                </a:solidFill>
-                <a:latin typeface="Raleway Black" pitchFamily="2" charset="0"/>
-                <a:ea typeface="Open Sans SemiBold" panose="020B0706030804020204" pitchFamily="34" charset="0"/>
-                <a:cs typeface="Open Sans SemiBold" panose="020B0706030804020204" pitchFamily="34" charset="0"/>
-              </a:rPr>
-              <a:t>Como Planificación se presenta el siguiente cronograma donde el tiempo requerido para el desarrollo del proyecto fue de 20 semanas, también se utilizará el Diagrama de Gantt para organizar y ejecutar el cronograma de manera eficiente a continuación mostrado.</a:t>
-            </a:r>
-          </a:p>
-        </p:txBody>
-      </p:sp>
-      <p:sp>
-        <p:nvSpPr>
-          <p:cNvPr id="27" name="CuadroTexto 26">
-            <a:extLst>
-              <a:ext uri="{FF2B5EF4-FFF2-40B4-BE49-F238E27FC236}">
-                <a16:creationId xmlns:a16="http://schemas.microsoft.com/office/drawing/2014/main" id="{87B13D7A-39B9-23F1-8BBE-7195185A6185}"/>
-              </a:ext>
-            </a:extLst>
-          </p:cNvPr>
-          <p:cNvSpPr txBox="1"/>
-          <p:nvPr/>
-        </p:nvSpPr>
-        <p:spPr>
-          <a:xfrm>
-            <a:off x="3331461" y="458128"/>
-            <a:ext cx="5735866" cy="523220"/>
+            <a:off x="4057621" y="367412"/>
+            <a:ext cx="4076757" cy="523220"/>
           </a:xfrm>
           <a:prstGeom prst="rect">
             <a:avLst/>
@@ -37585,19 +37942,19 @@
           <a:lstStyle/>
           <a:p>
             <a:r>
-              <a:rPr lang="es-CO" sz="2800" dirty="0">
-                <a:solidFill>
-                  <a:srgbClr val="F03CED"/>
+              <a:rPr lang="es-MX" sz="2800" b="1" dirty="0">
+                <a:solidFill>
+                  <a:srgbClr val="FFFF00"/>
                 </a:solidFill>
                 <a:latin typeface="Raleway Black" pitchFamily="2" charset="0"/>
                 <a:ea typeface="Open Sans SemiBold" panose="020B0706030804020204" pitchFamily="34" charset="0"/>
                 <a:cs typeface="Open Sans SemiBold" panose="020B0706030804020204" pitchFamily="34" charset="0"/>
               </a:rPr>
-              <a:t>PLANIFICACIÓN DEL PROYECTO</a:t>
-            </a:r>
-            <a:endParaRPr lang="en-US" sz="2800" dirty="0">
-              <a:solidFill>
-                <a:srgbClr val="F03CED"/>
+              <a:t>FASE DE DESARROLLO</a:t>
+            </a:r>
+            <a:endParaRPr lang="en-US" sz="2800" b="1" dirty="0">
+              <a:solidFill>
+                <a:srgbClr val="FFFF00"/>
               </a:solidFill>
               <a:latin typeface="Raleway Black" pitchFamily="2" charset="0"/>
               <a:ea typeface="Open Sans SemiBold" panose="020B0706030804020204" pitchFamily="34" charset="0"/>
@@ -37699,10 +38056,10 @@
       </p:sp>
       <p:sp>
         <p:nvSpPr>
-          <p:cNvPr id="2" name="Marco 1">
-            <a:extLst>
-              <a:ext uri="{FF2B5EF4-FFF2-40B4-BE49-F238E27FC236}">
-                <a16:creationId xmlns:a16="http://schemas.microsoft.com/office/drawing/2014/main" id="{9EE11A52-29B0-7E53-2BDB-6888EDB42876}"/>
+          <p:cNvPr id="7" name="Marco 6">
+            <a:extLst>
+              <a:ext uri="{FF2B5EF4-FFF2-40B4-BE49-F238E27FC236}">
+                <a16:creationId xmlns:a16="http://schemas.microsoft.com/office/drawing/2014/main" id="{CEF553B4-F2FB-D91F-E50B-4696182BCFA2}"/>
               </a:ext>
             </a:extLst>
           </p:cNvPr>
@@ -37710,8 +38067,8 @@
           <p:nvPr/>
         </p:nvSpPr>
         <p:spPr>
-          <a:xfrm rot="1015177">
-            <a:off x="157215" y="5626784"/>
+          <a:xfrm rot="2700000">
+            <a:off x="11888099" y="777422"/>
             <a:ext cx="1298862" cy="1266716"/>
           </a:xfrm>
           <a:prstGeom prst="frame">
@@ -37722,12 +38079,14 @@
           <a:noFill/>
           <a:ln w="12700">
             <a:solidFill>
-              <a:srgbClr val="E10DFF"/>
+              <a:schemeClr val="bg1">
+                <a:alpha val="56000"/>
+              </a:schemeClr>
             </a:solidFill>
           </a:ln>
           <a:effectLst>
             <a:glow rad="228600">
-              <a:srgbClr val="8A14EC"/>
+              <a:srgbClr val="FFFF00"/>
             </a:glow>
           </a:effectLst>
           <a:scene3d>
@@ -37774,10 +38133,10 @@
       </p:sp>
       <p:sp>
         <p:nvSpPr>
-          <p:cNvPr id="3" name="Marco 2">
-            <a:extLst>
-              <a:ext uri="{FF2B5EF4-FFF2-40B4-BE49-F238E27FC236}">
-                <a16:creationId xmlns:a16="http://schemas.microsoft.com/office/drawing/2014/main" id="{F0AA8EC3-B8EF-0325-CF91-DF3376E835ED}"/>
+          <p:cNvPr id="8" name="Marco 7">
+            <a:extLst>
+              <a:ext uri="{FF2B5EF4-FFF2-40B4-BE49-F238E27FC236}">
+                <a16:creationId xmlns:a16="http://schemas.microsoft.com/office/drawing/2014/main" id="{FB274F02-1315-4EAC-622A-BB23E106B52E}"/>
               </a:ext>
             </a:extLst>
           </p:cNvPr>
@@ -37785,8 +38144,8 @@
           <p:nvPr/>
         </p:nvSpPr>
         <p:spPr>
-          <a:xfrm rot="18693024">
-            <a:off x="5549963" y="6317924"/>
+          <a:xfrm>
+            <a:off x="-649431" y="5449312"/>
             <a:ext cx="1298862" cy="1266716"/>
           </a:xfrm>
           <a:prstGeom prst="frame">
@@ -37797,12 +38156,14 @@
           <a:noFill/>
           <a:ln w="12700">
             <a:solidFill>
-              <a:srgbClr val="E10DFF"/>
+              <a:schemeClr val="bg1">
+                <a:alpha val="56000"/>
+              </a:schemeClr>
             </a:solidFill>
           </a:ln>
           <a:effectLst>
             <a:glow rad="228600">
-              <a:srgbClr val="8A14EC"/>
+              <a:srgbClr val="FFFF00"/>
             </a:glow>
           </a:effectLst>
           <a:scene3d>
@@ -37849,10 +38210,10 @@
       </p:sp>
       <p:sp>
         <p:nvSpPr>
-          <p:cNvPr id="6" name="Marco 5">
-            <a:extLst>
-              <a:ext uri="{FF2B5EF4-FFF2-40B4-BE49-F238E27FC236}">
-                <a16:creationId xmlns:a16="http://schemas.microsoft.com/office/drawing/2014/main" id="{01B69663-0226-41F2-F178-6601FE0CE422}"/>
+          <p:cNvPr id="9" name="Marco 8">
+            <a:extLst>
+              <a:ext uri="{FF2B5EF4-FFF2-40B4-BE49-F238E27FC236}">
+                <a16:creationId xmlns:a16="http://schemas.microsoft.com/office/drawing/2014/main" id="{AA9643C4-9F54-CEF2-9055-853C5EAA42A5}"/>
               </a:ext>
             </a:extLst>
           </p:cNvPr>
@@ -37860,8 +38221,8 @@
           <p:nvPr/>
         </p:nvSpPr>
         <p:spPr>
-          <a:xfrm rot="17445565">
-            <a:off x="10980109" y="5626783"/>
+          <a:xfrm rot="17004837">
+            <a:off x="10618177" y="5304026"/>
             <a:ext cx="1298862" cy="1266716"/>
           </a:xfrm>
           <a:prstGeom prst="frame">
@@ -37872,12 +38233,14 @@
           <a:noFill/>
           <a:ln w="12700">
             <a:solidFill>
-              <a:srgbClr val="E10DFF"/>
+              <a:schemeClr val="bg1">
+                <a:alpha val="56000"/>
+              </a:schemeClr>
             </a:solidFill>
           </a:ln>
           <a:effectLst>
             <a:glow rad="228600">
-              <a:srgbClr val="8A14EC"/>
+              <a:srgbClr val="FFFF00"/>
             </a:glow>
           </a:effectLst>
           <a:scene3d>
@@ -37914,7 +38277,7 @@
           <a:lstStyle/>
           <a:p>
             <a:pPr algn="ctr"/>
-            <a:endParaRPr lang="en-US" dirty="0">
+            <a:endParaRPr lang="en-US">
               <a:solidFill>
                 <a:schemeClr val="tx1"/>
               </a:solidFill>
@@ -37924,10 +38287,10 @@
       </p:sp>
       <p:sp>
         <p:nvSpPr>
-          <p:cNvPr id="9" name="CuadroTexto 8">
-            <a:extLst>
-              <a:ext uri="{FF2B5EF4-FFF2-40B4-BE49-F238E27FC236}">
-                <a16:creationId xmlns:a16="http://schemas.microsoft.com/office/drawing/2014/main" id="{7E34B77F-32EA-90BF-1AA8-420BC5726BF4}"/>
+          <p:cNvPr id="2" name="CuadroTexto 1">
+            <a:extLst>
+              <a:ext uri="{FF2B5EF4-FFF2-40B4-BE49-F238E27FC236}">
+                <a16:creationId xmlns:a16="http://schemas.microsoft.com/office/drawing/2014/main" id="{2ED7D00C-0029-A804-E23C-632FB9FA4253}"/>
               </a:ext>
             </a:extLst>
           </p:cNvPr>
@@ -37936,8 +38299,8 @@
         </p:nvSpPr>
         <p:spPr>
           <a:xfrm>
-            <a:off x="1149150" y="1113212"/>
-            <a:ext cx="184731" cy="769441"/>
+            <a:off x="341191" y="1132909"/>
+            <a:ext cx="11289270" cy="3477875"/>
           </a:xfrm>
           <a:prstGeom prst="rect">
             <a:avLst/>
@@ -37945,14 +38308,40 @@
           <a:noFill/>
         </p:spPr>
         <p:txBody>
-          <a:bodyPr wrap="none" rtlCol="0">
+          <a:bodyPr wrap="square" rtlCol="0">
             <a:spAutoFit/>
           </a:bodyPr>
           <a:lstStyle/>
           <a:p>
-            <a:endParaRPr lang="es-CO" sz="2200" dirty="0">
-              <a:solidFill>
-                <a:srgbClr val="F03CED"/>
+            <a:r>
+              <a:rPr lang="es-MX" sz="2200" b="1" dirty="0">
+                <a:solidFill>
+                  <a:srgbClr val="FFFF00"/>
+                </a:solidFill>
+                <a:latin typeface="Raleway Black" pitchFamily="2" charset="0"/>
+                <a:ea typeface="Open Sans SemiBold" panose="020B0706030804020204" pitchFamily="34" charset="0"/>
+                <a:cs typeface="Open Sans SemiBold" panose="020B0706030804020204" pitchFamily="34" charset="0"/>
+              </a:rPr>
+              <a:t>Sistema Generador de CSS</a:t>
+            </a:r>
+          </a:p>
+          <a:p>
+            <a:r>
+              <a:rPr lang="es-MX" b="1" dirty="0">
+                <a:solidFill>
+                  <a:schemeClr val="bg1"/>
+                </a:solidFill>
+                <a:latin typeface="Raleway Black" pitchFamily="2" charset="0"/>
+                <a:ea typeface="Open Sans SemiBold" panose="020B0706030804020204" pitchFamily="34" charset="0"/>
+                <a:cs typeface="Open Sans SemiBold" panose="020B0706030804020204" pitchFamily="34" charset="0"/>
+              </a:rPr>
+              <a:t>Una vez que el Modelo ha sido entrenado cumpliendo con la precisión esperada, y se implementó una API para enviar peticiones al Modelo para generar código CSS, se desarrolló un sistema generador de código CSS que utiliza la API y el Modelo generador de código CSS.</a:t>
+            </a:r>
+          </a:p>
+          <a:p>
+            <a:endParaRPr lang="es-MX" b="1" dirty="0">
+              <a:solidFill>
+                <a:schemeClr val="bg1"/>
               </a:solidFill>
               <a:latin typeface="Raleway Black" pitchFamily="2" charset="0"/>
               <a:ea typeface="Open Sans SemiBold" panose="020B0706030804020204" pitchFamily="34" charset="0"/>
@@ -37960,48 +38349,126 @@
             </a:endParaRPr>
           </a:p>
           <a:p>
-            <a:endParaRPr lang="en-US" sz="2200" dirty="0">
-              <a:solidFill>
-                <a:srgbClr val="F03CED"/>
+            <a:r>
+              <a:rPr lang="es-MX" b="1" dirty="0">
+                <a:solidFill>
+                  <a:srgbClr val="FFFF00"/>
+                </a:solidFill>
+                <a:latin typeface="Raleway Black" pitchFamily="2" charset="0"/>
+                <a:ea typeface="Open Sans SemiBold" panose="020B0706030804020204" pitchFamily="34" charset="0"/>
+                <a:cs typeface="Open Sans SemiBold" panose="020B0706030804020204" pitchFamily="34" charset="0"/>
+              </a:rPr>
+              <a:t>Se implemento diversos componentes en el Sistema generador de CSS los cuales son: </a:t>
+            </a:r>
+          </a:p>
+          <a:p>
+            <a:endParaRPr lang="es-MX" b="1" dirty="0">
+              <a:solidFill>
+                <a:schemeClr val="bg1"/>
               </a:solidFill>
               <a:latin typeface="Raleway Black" pitchFamily="2" charset="0"/>
               <a:ea typeface="Open Sans SemiBold" panose="020B0706030804020204" pitchFamily="34" charset="0"/>
               <a:cs typeface="Open Sans SemiBold" panose="020B0706030804020204" pitchFamily="34" charset="0"/>
             </a:endParaRPr>
           </a:p>
-        </p:txBody>
-      </p:sp>
-      <p:pic>
-        <p:nvPicPr>
-          <p:cNvPr id="8" name="Imagen 7">
-            <a:extLst>
-              <a:ext uri="{FF2B5EF4-FFF2-40B4-BE49-F238E27FC236}">
-                <a16:creationId xmlns:a16="http://schemas.microsoft.com/office/drawing/2014/main" id="{94298721-3533-C3C8-52FE-9D017F355D67}"/>
-              </a:ext>
-            </a:extLst>
-          </p:cNvPr>
-          <p:cNvPicPr>
-            <a:picLocks noChangeAspect="1"/>
-          </p:cNvPicPr>
-          <p:nvPr/>
-        </p:nvPicPr>
-        <p:blipFill>
-          <a:blip r:embed="rId3" cstate="print">
-            <a:extLst>
-              <a:ext uri="{28A0092B-C50C-407E-A947-70E740481C1C}">
-                <a14:useLocalDpi xmlns:a14="http://schemas.microsoft.com/office/drawing/2010/main" val="0"/>
-              </a:ext>
-            </a:extLst>
-          </a:blip>
-          <a:srcRect/>
-          <a:stretch>
-            <a:fillRect/>
-          </a:stretch>
-        </p:blipFill>
+          <a:p>
+            <a:pPr marL="3486150" lvl="7" indent="-285750">
+              <a:buFont typeface="Arial" panose="020B0604020202020204" pitchFamily="34" charset="0"/>
+              <a:buChar char="•"/>
+            </a:pPr>
+            <a:r>
+              <a:rPr lang="es-MX" b="1" dirty="0">
+                <a:solidFill>
+                  <a:schemeClr val="bg1"/>
+                </a:solidFill>
+                <a:latin typeface="Raleway Black" pitchFamily="2" charset="0"/>
+                <a:ea typeface="Open Sans SemiBold" panose="020B0706030804020204" pitchFamily="34" charset="0"/>
+                <a:cs typeface="Open Sans SemiBold" panose="020B0706030804020204" pitchFamily="34" charset="0"/>
+              </a:rPr>
+              <a:t>Barra de navegación vertical </a:t>
+            </a:r>
+          </a:p>
+          <a:p>
+            <a:pPr marL="3486150" lvl="7" indent="-285750">
+              <a:buFont typeface="Arial" panose="020B0604020202020204" pitchFamily="34" charset="0"/>
+              <a:buChar char="•"/>
+            </a:pPr>
+            <a:r>
+              <a:rPr lang="es-MX" b="1" dirty="0">
+                <a:solidFill>
+                  <a:schemeClr val="bg1"/>
+                </a:solidFill>
+                <a:latin typeface="Raleway Black" pitchFamily="2" charset="0"/>
+                <a:ea typeface="Open Sans SemiBold" panose="020B0706030804020204" pitchFamily="34" charset="0"/>
+                <a:cs typeface="Open Sans SemiBold" panose="020B0706030804020204" pitchFamily="34" charset="0"/>
+              </a:rPr>
+              <a:t>Visualizador </a:t>
+            </a:r>
+          </a:p>
+          <a:p>
+            <a:pPr marL="3486150" lvl="7" indent="-285750">
+              <a:buFont typeface="Arial" panose="020B0604020202020204" pitchFamily="34" charset="0"/>
+              <a:buChar char="•"/>
+            </a:pPr>
+            <a:r>
+              <a:rPr lang="es-MX" b="1" dirty="0">
+                <a:solidFill>
+                  <a:schemeClr val="bg1"/>
+                </a:solidFill>
+                <a:latin typeface="Raleway Black" pitchFamily="2" charset="0"/>
+                <a:ea typeface="Open Sans SemiBold" panose="020B0706030804020204" pitchFamily="34" charset="0"/>
+                <a:cs typeface="Open Sans SemiBold" panose="020B0706030804020204" pitchFamily="34" charset="0"/>
+              </a:rPr>
+              <a:t>Inicio de sesión </a:t>
+            </a:r>
+          </a:p>
+          <a:p>
+            <a:pPr marL="3486150" lvl="7" indent="-285750">
+              <a:buFont typeface="Arial" panose="020B0604020202020204" pitchFamily="34" charset="0"/>
+              <a:buChar char="•"/>
+            </a:pPr>
+            <a:r>
+              <a:rPr lang="es-MX" b="1" dirty="0">
+                <a:solidFill>
+                  <a:schemeClr val="bg1"/>
+                </a:solidFill>
+                <a:latin typeface="Raleway Black" pitchFamily="2" charset="0"/>
+                <a:ea typeface="Open Sans SemiBold" panose="020B0706030804020204" pitchFamily="34" charset="0"/>
+                <a:cs typeface="Open Sans SemiBold" panose="020B0706030804020204" pitchFamily="34" charset="0"/>
+              </a:rPr>
+              <a:t>Historial</a:t>
+            </a:r>
+          </a:p>
+          <a:p>
+            <a:endParaRPr lang="es-MX" b="1" dirty="0">
+              <a:solidFill>
+                <a:schemeClr val="bg1"/>
+              </a:solidFill>
+              <a:latin typeface="Raleway Black" pitchFamily="2" charset="0"/>
+              <a:ea typeface="Open Sans SemiBold" panose="020B0706030804020204" pitchFamily="34" charset="0"/>
+              <a:cs typeface="Open Sans SemiBold" panose="020B0706030804020204" pitchFamily="34" charset="0"/>
+            </a:endParaRPr>
+          </a:p>
+        </p:txBody>
+      </p:sp>
+      <p:sp>
+        <p:nvSpPr>
+          <p:cNvPr id="5" name="Rectangle 3">
+            <a:extLst>
+              <a:ext uri="{FF2B5EF4-FFF2-40B4-BE49-F238E27FC236}">
+                <a16:creationId xmlns:a16="http://schemas.microsoft.com/office/drawing/2014/main" id="{B46411D0-ABD2-9593-C95A-5D800F65A7FD}"/>
+              </a:ext>
+            </a:extLst>
+          </p:cNvPr>
+          <p:cNvSpPr>
+            <a:spLocks noChangeArrowheads="1"/>
+          </p:cNvSpPr>
+          <p:nvPr/>
+        </p:nvSpPr>
         <p:spPr bwMode="auto">
           <a:xfrm>
-            <a:off x="2562394" y="2014515"/>
-            <a:ext cx="7067212" cy="4545212"/>
+            <a:off x="1194386" y="6055423"/>
+            <a:ext cx="12192000" cy="0"/>
           </a:xfrm>
           <a:prstGeom prst="rect">
             <a:avLst/>
@@ -38010,12 +38477,53 @@
           <a:ln>
             <a:noFill/>
           </a:ln>
-        </p:spPr>
-      </p:pic>
+          <a:effectLst/>
+          <a:extLst>
+            <a:ext uri="{909E8E84-426E-40DD-AFC4-6F175D3DCCD1}">
+              <a14:hiddenFill xmlns:a14="http://schemas.microsoft.com/office/drawing/2010/main">
+                <a:solidFill>
+                  <a:schemeClr val="accent1"/>
+                </a:solidFill>
+              </a14:hiddenFill>
+            </a:ext>
+            <a:ext uri="{91240B29-F687-4F45-9708-019B960494DF}">
+              <a14:hiddenLine xmlns:a14="http://schemas.microsoft.com/office/drawing/2010/main" w="9525">
+                <a:solidFill>
+                  <a:schemeClr val="tx1"/>
+                </a:solidFill>
+                <a:miter lim="800000"/>
+                <a:headEnd/>
+                <a:tailEnd/>
+              </a14:hiddenLine>
+            </a:ext>
+            <a:ext uri="{AF507438-7753-43E0-B8FC-AC1667EBCBE1}">
+              <a14:hiddenEffects xmlns:a14="http://schemas.microsoft.com/office/drawing/2010/main">
+                <a:effectLst>
+                  <a:outerShdw dist="35921" dir="2700000" algn="ctr" rotWithShape="0">
+                    <a:schemeClr val="bg2"/>
+                  </a:outerShdw>
+                </a:effectLst>
+              </a14:hiddenEffects>
+            </a:ext>
+          </a:extLst>
+        </p:spPr>
+        <p:txBody>
+          <a:bodyPr vert="horz" wrap="none" lIns="91440" tIns="45720" rIns="91440" bIns="45720" numCol="1" anchor="ctr" anchorCtr="0" compatLnSpc="1">
+            <a:prstTxWarp prst="textNoShape">
+              <a:avLst/>
+            </a:prstTxWarp>
+            <a:spAutoFit/>
+          </a:bodyPr>
+          <a:lstStyle/>
+          <a:p>
+            <a:endParaRPr lang="es-ES"/>
+          </a:p>
+        </p:txBody>
+      </p:sp>
     </p:spTree>
     <p:extLst>
       <p:ext uri="{BB962C8B-B14F-4D97-AF65-F5344CB8AC3E}">
-        <p14:creationId xmlns:p14="http://schemas.microsoft.com/office/powerpoint/2010/main" val="2022738794"/>
+        <p14:creationId xmlns:p14="http://schemas.microsoft.com/office/powerpoint/2010/main" val="2430271893"/>
       </p:ext>
     </p:extLst>
   </p:cSld>
@@ -38069,7 +38577,7 @@
         <p:spPr>
           <a:xfrm>
             <a:off x="1241515" y="1082433"/>
-            <a:ext cx="9565599" cy="3477875"/>
+            <a:ext cx="9425129" cy="830997"/>
           </a:xfrm>
           <a:prstGeom prst="rect">
             <a:avLst/>
@@ -38082,9 +38590,8 @@
           </a:bodyPr>
           <a:lstStyle/>
           <a:p>
-            <a:pPr algn="just"/>
-            <a:r>
-              <a:rPr lang="es-MX" sz="2000" dirty="0">
+            <a:r>
+              <a:rPr lang="es-MX" sz="1600" dirty="0">
                 <a:solidFill>
                   <a:schemeClr val="bg1"/>
                 </a:solidFill>
@@ -38092,7 +38599,7 @@
                 <a:ea typeface="Open Sans SemiBold" panose="020B0706030804020204" pitchFamily="34" charset="0"/>
                 <a:cs typeface="Open Sans SemiBold" panose="020B0706030804020204" pitchFamily="34" charset="0"/>
               </a:rPr>
-              <a:t>El análisis bibliográfico ha proporcionado una base teórica sólida para el desarrollo de un modelo de inteligencia artificial que genera código CSS mediante procesamiento del lenguaje natural. Se diseñó un algoritmo que traduce etiquetas HTML en estilos CSS coherentes, reduciendo código repetitivo también se implemento, un prototipo de aplicación web permite a los usuarios ver vistas generadas en tiempo real al introducir etiquetas HTML, facilitando el diseño de páginas web. La aplicación presenta una interfaz intuitiva, permitiendo interacción sencilla sin conocimientos profundos de CSS. El proyecto demostró la viabilidad y eficacia del enfoque, mejorando la productividad y calidad en el desarrollo web, aunque aún hay oportunidades para optimización y expansión futura.</a:t>
+              <a:t>Como Planificación se presenta el siguiente cronograma donde el tiempo requerido para el desarrollo del proyecto fue de 20 semanas, también se utilizo el Diagrama de Gantt para organizar y ejecutar el cronograma de manera eficiente a continuación mostrado.</a:t>
             </a:r>
           </a:p>
         </p:txBody>
@@ -38111,8 +38618,8 @@
         </p:nvSpPr>
         <p:spPr>
           <a:xfrm>
-            <a:off x="4586612" y="385269"/>
-            <a:ext cx="3018775" cy="523220"/>
+            <a:off x="3331461" y="458128"/>
+            <a:ext cx="5735866" cy="523220"/>
           </a:xfrm>
           <a:prstGeom prst="rect">
             <a:avLst/>
@@ -38134,7 +38641,7 @@
                 <a:ea typeface="Open Sans SemiBold" panose="020B0706030804020204" pitchFamily="34" charset="0"/>
                 <a:cs typeface="Open Sans SemiBold" panose="020B0706030804020204" pitchFamily="34" charset="0"/>
               </a:rPr>
-              <a:t>CONCLUSIONES</a:t>
+              <a:t>PLANIFICACIÓN DEL PROYECTO</a:t>
             </a:r>
             <a:endParaRPr lang="en-US" sz="2800" dirty="0">
               <a:solidFill>
@@ -38512,10 +39019,51 @@
           </a:p>
         </p:txBody>
       </p:sp>
+      <p:pic>
+        <p:nvPicPr>
+          <p:cNvPr id="8" name="Imagen 7">
+            <a:extLst>
+              <a:ext uri="{FF2B5EF4-FFF2-40B4-BE49-F238E27FC236}">
+                <a16:creationId xmlns:a16="http://schemas.microsoft.com/office/drawing/2014/main" id="{94298721-3533-C3C8-52FE-9D017F355D67}"/>
+              </a:ext>
+            </a:extLst>
+          </p:cNvPr>
+          <p:cNvPicPr>
+            <a:picLocks noChangeAspect="1"/>
+          </p:cNvPicPr>
+          <p:nvPr/>
+        </p:nvPicPr>
+        <p:blipFill>
+          <a:blip r:embed="rId3" cstate="print">
+            <a:extLst>
+              <a:ext uri="{28A0092B-C50C-407E-A947-70E740481C1C}">
+                <a14:useLocalDpi xmlns:a14="http://schemas.microsoft.com/office/drawing/2010/main" val="0"/>
+              </a:ext>
+            </a:extLst>
+          </a:blip>
+          <a:srcRect/>
+          <a:stretch>
+            <a:fillRect/>
+          </a:stretch>
+        </p:blipFill>
+        <p:spPr bwMode="auto">
+          <a:xfrm>
+            <a:off x="2562394" y="2014515"/>
+            <a:ext cx="7067212" cy="4545212"/>
+          </a:xfrm>
+          <a:prstGeom prst="rect">
+            <a:avLst/>
+          </a:prstGeom>
+          <a:noFill/>
+          <a:ln>
+            <a:noFill/>
+          </a:ln>
+        </p:spPr>
+      </p:pic>
     </p:spTree>
     <p:extLst>
       <p:ext uri="{BB962C8B-B14F-4D97-AF65-F5344CB8AC3E}">
-        <p14:creationId xmlns:p14="http://schemas.microsoft.com/office/powerpoint/2010/main" val="3610692895"/>
+        <p14:creationId xmlns:p14="http://schemas.microsoft.com/office/powerpoint/2010/main" val="2022738794"/>
       </p:ext>
     </p:extLst>
   </p:cSld>
@@ -39983,8 +40531,8 @@
         </p:nvSpPr>
         <p:spPr>
           <a:xfrm>
-            <a:off x="1383435" y="1214047"/>
-            <a:ext cx="9425129" cy="2862322"/>
+            <a:off x="1241515" y="1428880"/>
+            <a:ext cx="9565599" cy="2862322"/>
           </a:xfrm>
           <a:prstGeom prst="rect">
             <a:avLst/>
@@ -40007,29 +40555,7 @@
                 <a:ea typeface="Open Sans SemiBold" panose="020B0706030804020204" pitchFamily="34" charset="0"/>
                 <a:cs typeface="Open Sans SemiBold" panose="020B0706030804020204" pitchFamily="34" charset="0"/>
               </a:rPr>
-              <a:t>Se recomienda mejorar el entrenamiento del modelo generador de código CSS para que generalice mejor y optimice su rendimiento, permitiendo su empaquetado y uso por otros ingenieros de software. Además, futuras versiones del software deberían generar múltiples alternativas de estilos CSS, enriqueciendo la experiencia del usuario y aumentando la flexibilidad del diseño. La iniciativa del proyecto debería replicarse en diversas tecnologías actuales, y se recomienda experimentar con diferentes modelos </a:t>
-            </a:r>
-            <a:r>
-              <a:rPr lang="es-MX" sz="2000" dirty="0" err="1">
-                <a:solidFill>
-                  <a:schemeClr val="bg1"/>
-                </a:solidFill>
-                <a:latin typeface="Raleway Black" pitchFamily="2" charset="0"/>
-                <a:ea typeface="Open Sans SemiBold" panose="020B0706030804020204" pitchFamily="34" charset="0"/>
-                <a:cs typeface="Open Sans SemiBold" panose="020B0706030804020204" pitchFamily="34" charset="0"/>
-              </a:rPr>
-              <a:t>pre-entrenados</a:t>
-            </a:r>
-            <a:r>
-              <a:rPr lang="es-MX" sz="2000" dirty="0">
-                <a:solidFill>
-                  <a:schemeClr val="bg1"/>
-                </a:solidFill>
-                <a:latin typeface="Raleway Black" pitchFamily="2" charset="0"/>
-                <a:ea typeface="Open Sans SemiBold" panose="020B0706030804020204" pitchFamily="34" charset="0"/>
-                <a:cs typeface="Open Sans SemiBold" panose="020B0706030804020204" pitchFamily="34" charset="0"/>
-              </a:rPr>
-              <a:t> para mejorar los generadores de código.</a:t>
+              <a:t>El análisis bibliográfico ha proporcionado una base teórica sólida para el desarrollo de un modelo de inteligencia artificial que genera código CSS mediante procesamiento del lenguaje natural. Se diseñó un modelo que traduce etiquetas HTML en estilos CSS coherentes, reduciendo código repetitivo también se implemento, un prototipo de aplicación web permite a los usuarios ver vistas generadas en tiempo real al introducir etiquetas HTML, facilitando el diseño de páginas web. La aplicación presenta una interfaz intuitiva, permitiendo interacción sencilla sin conocimientos profundos de CSS. </a:t>
             </a:r>
           </a:p>
         </p:txBody>
@@ -40048,8 +40574,8 @@
         </p:nvSpPr>
         <p:spPr>
           <a:xfrm>
-            <a:off x="4056764" y="472935"/>
-            <a:ext cx="3794629" cy="523220"/>
+            <a:off x="4586612" y="385269"/>
+            <a:ext cx="3018775" cy="523220"/>
           </a:xfrm>
           <a:prstGeom prst="rect">
             <a:avLst/>
@@ -40071,7 +40597,7 @@
                 <a:ea typeface="Open Sans SemiBold" panose="020B0706030804020204" pitchFamily="34" charset="0"/>
                 <a:cs typeface="Open Sans SemiBold" panose="020B0706030804020204" pitchFamily="34" charset="0"/>
               </a:rPr>
-              <a:t>RECOMENDACIONES</a:t>
+              <a:t>CONCLUSIONES</a:t>
             </a:r>
             <a:endParaRPr lang="en-US" sz="2800" dirty="0">
               <a:solidFill>
@@ -40452,7 +40978,7 @@
     </p:spTree>
     <p:extLst>
       <p:ext uri="{BB962C8B-B14F-4D97-AF65-F5344CB8AC3E}">
-        <p14:creationId xmlns:p14="http://schemas.microsoft.com/office/powerpoint/2010/main" val="2665606798"/>
+        <p14:creationId xmlns:p14="http://schemas.microsoft.com/office/powerpoint/2010/main" val="3610692895"/>
       </p:ext>
     </p:extLst>
   </p:cSld>
@@ -40491,6 +41017,528 @@
           <a:chExt cx="0" cy="0"/>
         </a:xfrm>
       </p:grpSpPr>
+      <p:sp>
+        <p:nvSpPr>
+          <p:cNvPr id="11" name="CuadroTexto 10">
+            <a:extLst>
+              <a:ext uri="{FF2B5EF4-FFF2-40B4-BE49-F238E27FC236}">
+                <a16:creationId xmlns:a16="http://schemas.microsoft.com/office/drawing/2014/main" id="{E6364B03-8BE8-6ED5-4CCE-26078AB0B956}"/>
+              </a:ext>
+            </a:extLst>
+          </p:cNvPr>
+          <p:cNvSpPr txBox="1"/>
+          <p:nvPr/>
+        </p:nvSpPr>
+        <p:spPr>
+          <a:xfrm>
+            <a:off x="1383435" y="1214047"/>
+            <a:ext cx="9425129" cy="2862322"/>
+          </a:xfrm>
+          <a:prstGeom prst="rect">
+            <a:avLst/>
+          </a:prstGeom>
+          <a:noFill/>
+        </p:spPr>
+        <p:txBody>
+          <a:bodyPr wrap="square" rtlCol="0">
+            <a:spAutoFit/>
+          </a:bodyPr>
+          <a:lstStyle/>
+          <a:p>
+            <a:pPr algn="just"/>
+            <a:r>
+              <a:rPr lang="es-MX" sz="2000" dirty="0">
+                <a:solidFill>
+                  <a:schemeClr val="bg1"/>
+                </a:solidFill>
+                <a:latin typeface="Raleway Black" pitchFamily="2" charset="0"/>
+                <a:ea typeface="Open Sans SemiBold" panose="020B0706030804020204" pitchFamily="34" charset="0"/>
+                <a:cs typeface="Open Sans SemiBold" panose="020B0706030804020204" pitchFamily="34" charset="0"/>
+              </a:rPr>
+              <a:t>Se recomienda mejorar el entrenamiento del modelo generador de código CSS para que generalice mejor y optimice su rendimiento, permitiendo su empaquetado y uso por otros ingenieros de software. Además, futuras versiones del software deberían generar múltiples alternativas de estilos CSS, enriqueciendo la experiencia del usuario y aumentando la flexibilidad del diseño. La iniciativa del proyecto debería replicarse en diversas tecnologías actuales, y se recomienda experimentar con diferentes modelos </a:t>
+            </a:r>
+            <a:r>
+              <a:rPr lang="es-MX" sz="2000" dirty="0" err="1">
+                <a:solidFill>
+                  <a:schemeClr val="bg1"/>
+                </a:solidFill>
+                <a:latin typeface="Raleway Black" pitchFamily="2" charset="0"/>
+                <a:ea typeface="Open Sans SemiBold" panose="020B0706030804020204" pitchFamily="34" charset="0"/>
+                <a:cs typeface="Open Sans SemiBold" panose="020B0706030804020204" pitchFamily="34" charset="0"/>
+              </a:rPr>
+              <a:t>pre-entrenados</a:t>
+            </a:r>
+            <a:r>
+              <a:rPr lang="es-MX" sz="2000" dirty="0">
+                <a:solidFill>
+                  <a:schemeClr val="bg1"/>
+                </a:solidFill>
+                <a:latin typeface="Raleway Black" pitchFamily="2" charset="0"/>
+                <a:ea typeface="Open Sans SemiBold" panose="020B0706030804020204" pitchFamily="34" charset="0"/>
+                <a:cs typeface="Open Sans SemiBold" panose="020B0706030804020204" pitchFamily="34" charset="0"/>
+              </a:rPr>
+              <a:t> para mejorar los generadores de código.</a:t>
+            </a:r>
+          </a:p>
+        </p:txBody>
+      </p:sp>
+      <p:sp>
+        <p:nvSpPr>
+          <p:cNvPr id="27" name="CuadroTexto 26">
+            <a:extLst>
+              <a:ext uri="{FF2B5EF4-FFF2-40B4-BE49-F238E27FC236}">
+                <a16:creationId xmlns:a16="http://schemas.microsoft.com/office/drawing/2014/main" id="{87B13D7A-39B9-23F1-8BBE-7195185A6185}"/>
+              </a:ext>
+            </a:extLst>
+          </p:cNvPr>
+          <p:cNvSpPr txBox="1"/>
+          <p:nvPr/>
+        </p:nvSpPr>
+        <p:spPr>
+          <a:xfrm>
+            <a:off x="4056764" y="472935"/>
+            <a:ext cx="3794629" cy="523220"/>
+          </a:xfrm>
+          <a:prstGeom prst="rect">
+            <a:avLst/>
+          </a:prstGeom>
+          <a:noFill/>
+        </p:spPr>
+        <p:txBody>
+          <a:bodyPr wrap="none" rtlCol="0">
+            <a:spAutoFit/>
+          </a:bodyPr>
+          <a:lstStyle/>
+          <a:p>
+            <a:r>
+              <a:rPr lang="es-CO" sz="2800" dirty="0">
+                <a:solidFill>
+                  <a:srgbClr val="F03CED"/>
+                </a:solidFill>
+                <a:latin typeface="Raleway Black" pitchFamily="2" charset="0"/>
+                <a:ea typeface="Open Sans SemiBold" panose="020B0706030804020204" pitchFamily="34" charset="0"/>
+                <a:cs typeface="Open Sans SemiBold" panose="020B0706030804020204" pitchFamily="34" charset="0"/>
+              </a:rPr>
+              <a:t>RECOMENDACIONES</a:t>
+            </a:r>
+            <a:endParaRPr lang="en-US" sz="2800" dirty="0">
+              <a:solidFill>
+                <a:srgbClr val="F03CED"/>
+              </a:solidFill>
+              <a:latin typeface="Raleway Black" pitchFamily="2" charset="0"/>
+              <a:ea typeface="Open Sans SemiBold" panose="020B0706030804020204" pitchFamily="34" charset="0"/>
+              <a:cs typeface="Open Sans SemiBold" panose="020B0706030804020204" pitchFamily="34" charset="0"/>
+            </a:endParaRPr>
+          </a:p>
+        </p:txBody>
+      </p:sp>
+      <p:pic>
+        <p:nvPicPr>
+          <p:cNvPr id="19" name="Imagen 18">
+            <a:extLst>
+              <a:ext uri="{FF2B5EF4-FFF2-40B4-BE49-F238E27FC236}">
+                <a16:creationId xmlns:a16="http://schemas.microsoft.com/office/drawing/2014/main" id="{9CFCF00A-BC29-624E-C884-59E3760894F7}"/>
+              </a:ext>
+            </a:extLst>
+          </p:cNvPr>
+          <p:cNvPicPr>
+            <a:picLocks noChangeAspect="1"/>
+          </p:cNvPicPr>
+          <p:nvPr/>
+        </p:nvPicPr>
+        <p:blipFill>
+          <a:blip r:embed="rId2" cstate="print">
+            <a:extLst>
+              <a:ext uri="{28A0092B-C50C-407E-A947-70E740481C1C}">
+                <a14:useLocalDpi xmlns:a14="http://schemas.microsoft.com/office/drawing/2010/main" val="0"/>
+              </a:ext>
+            </a:extLst>
+          </a:blip>
+          <a:srcRect/>
+          <a:stretch>
+            <a:fillRect/>
+          </a:stretch>
+        </p:blipFill>
+        <p:spPr bwMode="auto">
+          <a:xfrm>
+            <a:off x="275769" y="141153"/>
+            <a:ext cx="571538" cy="725117"/>
+          </a:xfrm>
+          <a:prstGeom prst="rect">
+            <a:avLst/>
+          </a:prstGeom>
+          <a:noFill/>
+          <a:ln>
+            <a:noFill/>
+          </a:ln>
+        </p:spPr>
+      </p:pic>
+      <p:sp>
+        <p:nvSpPr>
+          <p:cNvPr id="20" name="CuadroTexto 19">
+            <a:extLst>
+              <a:ext uri="{FF2B5EF4-FFF2-40B4-BE49-F238E27FC236}">
+                <a16:creationId xmlns:a16="http://schemas.microsoft.com/office/drawing/2014/main" id="{862420DE-757B-6285-AF97-EA1907B94B71}"/>
+              </a:ext>
+            </a:extLst>
+          </p:cNvPr>
+          <p:cNvSpPr txBox="1"/>
+          <p:nvPr/>
+        </p:nvSpPr>
+        <p:spPr>
+          <a:xfrm>
+            <a:off x="834865" y="272880"/>
+            <a:ext cx="914033" cy="461665"/>
+          </a:xfrm>
+          <a:prstGeom prst="rect">
+            <a:avLst/>
+          </a:prstGeom>
+          <a:noFill/>
+        </p:spPr>
+        <p:txBody>
+          <a:bodyPr wrap="none" rtlCol="0">
+            <a:spAutoFit/>
+          </a:bodyPr>
+          <a:lstStyle/>
+          <a:p>
+            <a:r>
+              <a:rPr lang="es-CO" sz="2400" dirty="0" err="1">
+                <a:solidFill>
+                  <a:schemeClr val="bg1"/>
+                </a:solidFill>
+                <a:latin typeface="Open Sans" panose="020B0606030504020204" pitchFamily="34" charset="0"/>
+                <a:ea typeface="Open Sans" panose="020B0606030504020204" pitchFamily="34" charset="0"/>
+                <a:cs typeface="Open Sans" panose="020B0606030504020204" pitchFamily="34" charset="0"/>
+              </a:rPr>
+              <a:t>USFX</a:t>
+            </a:r>
+            <a:endParaRPr lang="en-US" sz="2400" dirty="0">
+              <a:solidFill>
+                <a:schemeClr val="bg1"/>
+              </a:solidFill>
+              <a:latin typeface="Open Sans" panose="020B0606030504020204" pitchFamily="34" charset="0"/>
+              <a:ea typeface="Open Sans" panose="020B0606030504020204" pitchFamily="34" charset="0"/>
+              <a:cs typeface="Open Sans" panose="020B0606030504020204" pitchFamily="34" charset="0"/>
+            </a:endParaRPr>
+          </a:p>
+        </p:txBody>
+      </p:sp>
+      <p:sp>
+        <p:nvSpPr>
+          <p:cNvPr id="2" name="Marco 1">
+            <a:extLst>
+              <a:ext uri="{FF2B5EF4-FFF2-40B4-BE49-F238E27FC236}">
+                <a16:creationId xmlns:a16="http://schemas.microsoft.com/office/drawing/2014/main" id="{9EE11A52-29B0-7E53-2BDB-6888EDB42876}"/>
+              </a:ext>
+            </a:extLst>
+          </p:cNvPr>
+          <p:cNvSpPr/>
+          <p:nvPr/>
+        </p:nvSpPr>
+        <p:spPr>
+          <a:xfrm rot="1015177">
+            <a:off x="157215" y="5626784"/>
+            <a:ext cx="1298862" cy="1266716"/>
+          </a:xfrm>
+          <a:prstGeom prst="frame">
+            <a:avLst>
+              <a:gd name="adj1" fmla="val 50000"/>
+            </a:avLst>
+          </a:prstGeom>
+          <a:noFill/>
+          <a:ln w="12700">
+            <a:solidFill>
+              <a:srgbClr val="E10DFF"/>
+            </a:solidFill>
+          </a:ln>
+          <a:effectLst>
+            <a:glow rad="228600">
+              <a:srgbClr val="8A14EC"/>
+            </a:glow>
+          </a:effectLst>
+          <a:scene3d>
+            <a:camera prst="isometricTopUp">
+              <a:rot lat="19476219" lon="18883143" rev="909743"/>
+            </a:camera>
+            <a:lightRig rig="twoPt" dir="t">
+              <a:rot lat="0" lon="0" rev="2400000"/>
+            </a:lightRig>
+          </a:scene3d>
+          <a:sp3d prstMaterial="matte">
+            <a:bevelT w="0" h="577850"/>
+            <a:bevelB w="0" h="0"/>
+          </a:sp3d>
+        </p:spPr>
+        <p:style>
+          <a:lnRef idx="2">
+            <a:schemeClr val="accent1">
+              <a:shade val="50000"/>
+            </a:schemeClr>
+          </a:lnRef>
+          <a:fillRef idx="1">
+            <a:schemeClr val="accent1"/>
+          </a:fillRef>
+          <a:effectRef idx="0">
+            <a:schemeClr val="accent1"/>
+          </a:effectRef>
+          <a:fontRef idx="minor">
+            <a:schemeClr val="lt1"/>
+          </a:fontRef>
+        </p:style>
+        <p:txBody>
+          <a:bodyPr rtlCol="0" anchor="ctr"/>
+          <a:lstStyle/>
+          <a:p>
+            <a:pPr algn="ctr"/>
+            <a:endParaRPr lang="en-US">
+              <a:solidFill>
+                <a:schemeClr val="tx1"/>
+              </a:solidFill>
+            </a:endParaRPr>
+          </a:p>
+        </p:txBody>
+      </p:sp>
+      <p:sp>
+        <p:nvSpPr>
+          <p:cNvPr id="3" name="Marco 2">
+            <a:extLst>
+              <a:ext uri="{FF2B5EF4-FFF2-40B4-BE49-F238E27FC236}">
+                <a16:creationId xmlns:a16="http://schemas.microsoft.com/office/drawing/2014/main" id="{F0AA8EC3-B8EF-0325-CF91-DF3376E835ED}"/>
+              </a:ext>
+            </a:extLst>
+          </p:cNvPr>
+          <p:cNvSpPr/>
+          <p:nvPr/>
+        </p:nvSpPr>
+        <p:spPr>
+          <a:xfrm rot="18693024">
+            <a:off x="5549963" y="6317924"/>
+            <a:ext cx="1298862" cy="1266716"/>
+          </a:xfrm>
+          <a:prstGeom prst="frame">
+            <a:avLst>
+              <a:gd name="adj1" fmla="val 50000"/>
+            </a:avLst>
+          </a:prstGeom>
+          <a:noFill/>
+          <a:ln w="12700">
+            <a:solidFill>
+              <a:srgbClr val="E10DFF"/>
+            </a:solidFill>
+          </a:ln>
+          <a:effectLst>
+            <a:glow rad="228600">
+              <a:srgbClr val="8A14EC"/>
+            </a:glow>
+          </a:effectLst>
+          <a:scene3d>
+            <a:camera prst="isometricTopUp">
+              <a:rot lat="19476219" lon="18883143" rev="909743"/>
+            </a:camera>
+            <a:lightRig rig="twoPt" dir="t">
+              <a:rot lat="0" lon="0" rev="2400000"/>
+            </a:lightRig>
+          </a:scene3d>
+          <a:sp3d prstMaterial="matte">
+            <a:bevelT w="0" h="577850"/>
+            <a:bevelB w="0" h="0"/>
+          </a:sp3d>
+        </p:spPr>
+        <p:style>
+          <a:lnRef idx="2">
+            <a:schemeClr val="accent1">
+              <a:shade val="50000"/>
+            </a:schemeClr>
+          </a:lnRef>
+          <a:fillRef idx="1">
+            <a:schemeClr val="accent1"/>
+          </a:fillRef>
+          <a:effectRef idx="0">
+            <a:schemeClr val="accent1"/>
+          </a:effectRef>
+          <a:fontRef idx="minor">
+            <a:schemeClr val="lt1"/>
+          </a:fontRef>
+        </p:style>
+        <p:txBody>
+          <a:bodyPr rtlCol="0" anchor="ctr"/>
+          <a:lstStyle/>
+          <a:p>
+            <a:pPr algn="ctr"/>
+            <a:endParaRPr lang="en-US">
+              <a:solidFill>
+                <a:schemeClr val="tx1"/>
+              </a:solidFill>
+            </a:endParaRPr>
+          </a:p>
+        </p:txBody>
+      </p:sp>
+      <p:sp>
+        <p:nvSpPr>
+          <p:cNvPr id="6" name="Marco 5">
+            <a:extLst>
+              <a:ext uri="{FF2B5EF4-FFF2-40B4-BE49-F238E27FC236}">
+                <a16:creationId xmlns:a16="http://schemas.microsoft.com/office/drawing/2014/main" id="{01B69663-0226-41F2-F178-6601FE0CE422}"/>
+              </a:ext>
+            </a:extLst>
+          </p:cNvPr>
+          <p:cNvSpPr/>
+          <p:nvPr/>
+        </p:nvSpPr>
+        <p:spPr>
+          <a:xfrm rot="17445565">
+            <a:off x="10980109" y="5626783"/>
+            <a:ext cx="1298862" cy="1266716"/>
+          </a:xfrm>
+          <a:prstGeom prst="frame">
+            <a:avLst>
+              <a:gd name="adj1" fmla="val 50000"/>
+            </a:avLst>
+          </a:prstGeom>
+          <a:noFill/>
+          <a:ln w="12700">
+            <a:solidFill>
+              <a:srgbClr val="E10DFF"/>
+            </a:solidFill>
+          </a:ln>
+          <a:effectLst>
+            <a:glow rad="228600">
+              <a:srgbClr val="8A14EC"/>
+            </a:glow>
+          </a:effectLst>
+          <a:scene3d>
+            <a:camera prst="isometricTopUp">
+              <a:rot lat="19476219" lon="18883143" rev="909743"/>
+            </a:camera>
+            <a:lightRig rig="twoPt" dir="t">
+              <a:rot lat="0" lon="0" rev="2400000"/>
+            </a:lightRig>
+          </a:scene3d>
+          <a:sp3d prstMaterial="matte">
+            <a:bevelT w="0" h="577850"/>
+            <a:bevelB w="0" h="0"/>
+          </a:sp3d>
+        </p:spPr>
+        <p:style>
+          <a:lnRef idx="2">
+            <a:schemeClr val="accent1">
+              <a:shade val="50000"/>
+            </a:schemeClr>
+          </a:lnRef>
+          <a:fillRef idx="1">
+            <a:schemeClr val="accent1"/>
+          </a:fillRef>
+          <a:effectRef idx="0">
+            <a:schemeClr val="accent1"/>
+          </a:effectRef>
+          <a:fontRef idx="minor">
+            <a:schemeClr val="lt1"/>
+          </a:fontRef>
+        </p:style>
+        <p:txBody>
+          <a:bodyPr rtlCol="0" anchor="ctr"/>
+          <a:lstStyle/>
+          <a:p>
+            <a:pPr algn="ctr"/>
+            <a:endParaRPr lang="en-US" dirty="0">
+              <a:solidFill>
+                <a:schemeClr val="tx1"/>
+              </a:solidFill>
+            </a:endParaRPr>
+          </a:p>
+        </p:txBody>
+      </p:sp>
+      <p:sp>
+        <p:nvSpPr>
+          <p:cNvPr id="9" name="CuadroTexto 8">
+            <a:extLst>
+              <a:ext uri="{FF2B5EF4-FFF2-40B4-BE49-F238E27FC236}">
+                <a16:creationId xmlns:a16="http://schemas.microsoft.com/office/drawing/2014/main" id="{7E34B77F-32EA-90BF-1AA8-420BC5726BF4}"/>
+              </a:ext>
+            </a:extLst>
+          </p:cNvPr>
+          <p:cNvSpPr txBox="1"/>
+          <p:nvPr/>
+        </p:nvSpPr>
+        <p:spPr>
+          <a:xfrm>
+            <a:off x="1149150" y="1113212"/>
+            <a:ext cx="184731" cy="769441"/>
+          </a:xfrm>
+          <a:prstGeom prst="rect">
+            <a:avLst/>
+          </a:prstGeom>
+          <a:noFill/>
+        </p:spPr>
+        <p:txBody>
+          <a:bodyPr wrap="none" rtlCol="0">
+            <a:spAutoFit/>
+          </a:bodyPr>
+          <a:lstStyle/>
+          <a:p>
+            <a:endParaRPr lang="es-CO" sz="2200" dirty="0">
+              <a:solidFill>
+                <a:srgbClr val="F03CED"/>
+              </a:solidFill>
+              <a:latin typeface="Raleway Black" pitchFamily="2" charset="0"/>
+              <a:ea typeface="Open Sans SemiBold" panose="020B0706030804020204" pitchFamily="34" charset="0"/>
+              <a:cs typeface="Open Sans SemiBold" panose="020B0706030804020204" pitchFamily="34" charset="0"/>
+            </a:endParaRPr>
+          </a:p>
+          <a:p>
+            <a:endParaRPr lang="en-US" sz="2200" dirty="0">
+              <a:solidFill>
+                <a:srgbClr val="F03CED"/>
+              </a:solidFill>
+              <a:latin typeface="Raleway Black" pitchFamily="2" charset="0"/>
+              <a:ea typeface="Open Sans SemiBold" panose="020B0706030804020204" pitchFamily="34" charset="0"/>
+              <a:cs typeface="Open Sans SemiBold" panose="020B0706030804020204" pitchFamily="34" charset="0"/>
+            </a:endParaRPr>
+          </a:p>
+        </p:txBody>
+      </p:sp>
+    </p:spTree>
+    <p:extLst>
+      <p:ext uri="{BB962C8B-B14F-4D97-AF65-F5344CB8AC3E}">
+        <p14:creationId xmlns:p14="http://schemas.microsoft.com/office/powerpoint/2010/main" val="2665606798"/>
+      </p:ext>
+    </p:extLst>
+  </p:cSld>
+  <p:clrMapOvr>
+    <a:masterClrMapping/>
+  </p:clrMapOvr>
+  <mc:AlternateContent xmlns:mc="http://schemas.openxmlformats.org/markup-compatibility/2006" xmlns:p159="http://schemas.microsoft.com/office/powerpoint/2015/09/main">
+    <mc:Choice Requires="p159">
+      <p:transition xmlns:p14="http://schemas.microsoft.com/office/powerpoint/2010/main" spd="slow" p14:dur="2000">
+        <p159:morph option="byObject"/>
+      </p:transition>
+    </mc:Choice>
+    <mc:Fallback xmlns="">
+      <p:transition spd="slow">
+        <p:fade/>
+      </p:transition>
+    </mc:Fallback>
+  </mc:AlternateContent>
+</p:sld>
+</file>
+
+<file path=ppt/slides/slide52.xml><?xml version="1.0" encoding="utf-8"?>
+<p:sld xmlns:a="http://schemas.openxmlformats.org/drawingml/2006/main" xmlns:r="http://schemas.openxmlformats.org/officeDocument/2006/relationships" xmlns:p="http://schemas.openxmlformats.org/presentationml/2006/main">
+  <p:cSld>
+    <p:spTree>
+      <p:nvGrpSpPr>
+        <p:cNvPr id="1" name=""/>
+        <p:cNvGrpSpPr/>
+        <p:nvPr/>
+      </p:nvGrpSpPr>
+      <p:grpSpPr>
+        <a:xfrm>
+          <a:off x="0" y="0"/>
+          <a:ext cx="0" cy="0"/>
+          <a:chOff x="0" y="0"/>
+          <a:chExt cx="0" cy="0"/>
+        </a:xfrm>
+      </p:grpSpPr>
       <p:pic>
         <p:nvPicPr>
           <p:cNvPr id="7" name="Imagen 6">
@@ -40685,7 +41733,7 @@
 </p:sld>
 </file>
 
-<file path=ppt/slides/slide52.xml><?xml version="1.0" encoding="utf-8"?>
+<file path=ppt/slides/slide53.xml><?xml version="1.0" encoding="utf-8"?>
 <p:sld xmlns:a="http://schemas.openxmlformats.org/drawingml/2006/main" xmlns:r="http://schemas.openxmlformats.org/officeDocument/2006/relationships" xmlns:p="http://schemas.openxmlformats.org/presentationml/2006/main">
   <p:cSld>
     <p:spTree>

</xml_diff>

<commit_message>
docs(v0.6.8): add changes in presentation about problematic situation
</commit_message>
<xml_diff>
--- a/documents/Presentación de Perfil - Modelo Generador CSS.pptx
+++ b/documents/Presentación de Perfil - Modelo Generador CSS.pptx
@@ -37811,8 +37811,8 @@
           <p:nvPr/>
         </p:nvSpPr>
         <p:spPr>
-          <a:xfrm rot="2700000">
-            <a:off x="8373877" y="1622173"/>
+          <a:xfrm rot="7650039">
+            <a:off x="4241274" y="4048068"/>
             <a:ext cx="3831235" cy="4087796"/>
           </a:xfrm>
           <a:prstGeom prst="frame">
@@ -37881,8 +37881,8 @@
           <p:nvPr/>
         </p:nvSpPr>
         <p:spPr>
-          <a:xfrm rot="2700000">
-            <a:off x="7463586" y="2379730"/>
+          <a:xfrm rot="7859835">
+            <a:off x="4856322" y="3924701"/>
             <a:ext cx="2776936" cy="2679500"/>
           </a:xfrm>
           <a:prstGeom prst="frame">
@@ -37940,80 +37940,10 @@
       </p:sp>
       <p:sp>
         <p:nvSpPr>
-          <p:cNvPr id="8" name="Marco 7">
-            <a:extLst>
-              <a:ext uri="{FF2B5EF4-FFF2-40B4-BE49-F238E27FC236}">
-                <a16:creationId xmlns:a16="http://schemas.microsoft.com/office/drawing/2014/main" id="{B25B7CBB-5B0D-3F05-D7F3-575EFB2515CF}"/>
-              </a:ext>
-            </a:extLst>
-          </p:cNvPr>
-          <p:cNvSpPr/>
-          <p:nvPr/>
-        </p:nvSpPr>
-        <p:spPr>
-          <a:xfrm rot="2700000">
-            <a:off x="6453323" y="2692073"/>
-            <a:ext cx="1298862" cy="1266716"/>
-          </a:xfrm>
-          <a:prstGeom prst="frame">
-            <a:avLst>
-              <a:gd name="adj1" fmla="val 50000"/>
-            </a:avLst>
-          </a:prstGeom>
-          <a:solidFill>
-            <a:srgbClr val="EF9B35"/>
-          </a:solidFill>
-          <a:ln>
-            <a:noFill/>
-          </a:ln>
-          <a:scene3d>
-            <a:camera prst="isometricOffAxis2Left">
-              <a:rot lat="2193786" lon="3074922" rev="1325882"/>
-            </a:camera>
-            <a:lightRig rig="twoPt" dir="t">
-              <a:rot lat="0" lon="0" rev="2400000"/>
-            </a:lightRig>
-          </a:scene3d>
-          <a:sp3d prstMaterial="matte">
-            <a:bevelT w="0" h="1016000"/>
-            <a:bevelB w="0" h="0"/>
-          </a:sp3d>
-        </p:spPr>
-        <p:style>
-          <a:lnRef idx="2">
-            <a:schemeClr val="accent1">
-              <a:shade val="50000"/>
-            </a:schemeClr>
-          </a:lnRef>
-          <a:fillRef idx="1">
-            <a:schemeClr val="accent1"/>
-          </a:fillRef>
-          <a:effectRef idx="0">
-            <a:schemeClr val="accent1"/>
-          </a:effectRef>
-          <a:fontRef idx="minor">
-            <a:schemeClr val="lt1"/>
-          </a:fontRef>
-        </p:style>
-        <p:txBody>
-          <a:bodyPr rtlCol="0" anchor="ctr"/>
-          <a:lstStyle/>
-          <a:p>
-            <a:pPr algn="ctr"/>
-            <a:endParaRPr lang="en-US">
-              <a:solidFill>
-                <a:schemeClr val="tx1"/>
-              </a:solidFill>
-            </a:endParaRPr>
-          </a:p>
-        </p:txBody>
-      </p:sp>
-      <p:sp>
-        <p:nvSpPr>
-          <p:cNvPr id="10" name="CuadroTexto 9">
-            <a:extLst>
-              <a:ext uri="{FF2B5EF4-FFF2-40B4-BE49-F238E27FC236}">
-                <a16:creationId xmlns:a16="http://schemas.microsoft.com/office/drawing/2014/main" id="{5D6C2A9A-6F58-2CC9-E33F-5F46A26A68AC}"/>
+          <p:cNvPr id="12" name="CuadroTexto 11">
+            <a:extLst>
+              <a:ext uri="{FF2B5EF4-FFF2-40B4-BE49-F238E27FC236}">
+                <a16:creationId xmlns:a16="http://schemas.microsoft.com/office/drawing/2014/main" id="{BBA8378A-01B3-B9B5-4AA8-DE5194191A37}"/>
               </a:ext>
             </a:extLst>
           </p:cNvPr>
@@ -38022,8 +37952,8 @@
         </p:nvSpPr>
         <p:spPr>
           <a:xfrm>
-            <a:off x="285196" y="4848427"/>
-            <a:ext cx="4256293" cy="323165"/>
+            <a:off x="561538" y="1538573"/>
+            <a:ext cx="11205625" cy="2677656"/>
           </a:xfrm>
           <a:prstGeom prst="rect">
             <a:avLst/>
@@ -38031,35 +37961,70 @@
           <a:noFill/>
         </p:spPr>
         <p:txBody>
-          <a:bodyPr wrap="none" rtlCol="0">
+          <a:bodyPr wrap="square" rtlCol="0">
             <a:spAutoFit/>
           </a:bodyPr>
           <a:lstStyle/>
           <a:p>
-            <a:pPr marL="285750" indent="-285750">
-              <a:buFont typeface="Arial" panose="020B0604020202020204" pitchFamily="34" charset="0"/>
-              <a:buChar char="•"/>
-            </a:pPr>
-            <a:r>
-              <a:rPr lang="es-MX" sz="1500" dirty="0">
-                <a:solidFill>
-                  <a:schemeClr val="accent1">
-                    <a:lumMod val="40000"/>
-                    <a:lumOff val="60000"/>
-                  </a:schemeClr>
+            <a:pPr algn="just"/>
+            <a:r>
+              <a:rPr lang="es-MX" sz="2400" b="1" dirty="0">
+                <a:solidFill>
+                  <a:srgbClr val="FFC000"/>
                 </a:solidFill>
                 <a:latin typeface="Raleway Black" pitchFamily="2" charset="0"/>
                 <a:ea typeface="Open Sans SemiBold" panose="020B0706030804020204" pitchFamily="34" charset="0"/>
                 <a:cs typeface="Open Sans SemiBold" panose="020B0706030804020204" pitchFamily="34" charset="0"/>
               </a:rPr>
-              <a:t>Aumenta la complejidad del desarrollo.</a:t>
-            </a:r>
-            <a:endParaRPr lang="en-US" sz="1500" dirty="0">
-              <a:solidFill>
-                <a:schemeClr val="accent1">
-                  <a:lumMod val="40000"/>
-                  <a:lumOff val="60000"/>
-                </a:schemeClr>
+              <a:t>Desarrollar con CSS puede ser complejo debido a la amplia gama de librerías, </a:t>
+            </a:r>
+            <a:r>
+              <a:rPr lang="es-MX" sz="2400" b="1" dirty="0" err="1">
+                <a:solidFill>
+                  <a:srgbClr val="FFC000"/>
+                </a:solidFill>
+                <a:latin typeface="Raleway Black" pitchFamily="2" charset="0"/>
+                <a:ea typeface="Open Sans SemiBold" panose="020B0706030804020204" pitchFamily="34" charset="0"/>
+                <a:cs typeface="Open Sans SemiBold" panose="020B0706030804020204" pitchFamily="34" charset="0"/>
+              </a:rPr>
+              <a:t>frameworks</a:t>
+            </a:r>
+            <a:r>
+              <a:rPr lang="es-MX" sz="2400" b="1" dirty="0">
+                <a:solidFill>
+                  <a:srgbClr val="FFC000"/>
+                </a:solidFill>
+                <a:latin typeface="Raleway Black" pitchFamily="2" charset="0"/>
+                <a:ea typeface="Open Sans SemiBold" panose="020B0706030804020204" pitchFamily="34" charset="0"/>
+                <a:cs typeface="Open Sans SemiBold" panose="020B0706030804020204" pitchFamily="34" charset="0"/>
+              </a:rPr>
+              <a:t> y </a:t>
+            </a:r>
+            <a:r>
+              <a:rPr lang="es-MX" sz="2400" b="1" dirty="0" err="1">
+                <a:solidFill>
+                  <a:srgbClr val="FFC000"/>
+                </a:solidFill>
+                <a:latin typeface="Raleway Black" pitchFamily="2" charset="0"/>
+                <a:ea typeface="Open Sans SemiBold" panose="020B0706030804020204" pitchFamily="34" charset="0"/>
+                <a:cs typeface="Open Sans SemiBold" panose="020B0706030804020204" pitchFamily="34" charset="0"/>
+              </a:rPr>
+              <a:t>APIs</a:t>
+            </a:r>
+            <a:r>
+              <a:rPr lang="es-MX" sz="2400" b="1" dirty="0">
+                <a:solidFill>
+                  <a:srgbClr val="FFC000"/>
+                </a:solidFill>
+                <a:latin typeface="Raleway Black" pitchFamily="2" charset="0"/>
+                <a:ea typeface="Open Sans SemiBold" panose="020B0706030804020204" pitchFamily="34" charset="0"/>
+                <a:cs typeface="Open Sans SemiBold" panose="020B0706030804020204" pitchFamily="34" charset="0"/>
+              </a:rPr>
+              <a:t> disponibles, lo que hace que el proceso sea lento y tedioso, requiriendo un conocimiento profundo de las herramientas. Muchas veces, se escribe código repetitivo, y a medida que se aumenta la cantidad de código, el trabajo se incrementa y la complejidad del desarrollo aumenta, prolongando el tiempo necesario para completar los proyectos.</a:t>
+            </a:r>
+            <a:endParaRPr lang="en-US" sz="2400" b="1" dirty="0">
+              <a:solidFill>
+                <a:srgbClr val="FFC000"/>
               </a:solidFill>
               <a:latin typeface="Raleway Black" pitchFamily="2" charset="0"/>
               <a:ea typeface="Open Sans SemiBold" panose="020B0706030804020204" pitchFamily="34" charset="0"/>
@@ -38068,622 +38033,6 @@
           </a:p>
         </p:txBody>
       </p:sp>
-      <p:sp>
-        <p:nvSpPr>
-          <p:cNvPr id="11" name="CuadroTexto 10">
-            <a:extLst>
-              <a:ext uri="{FF2B5EF4-FFF2-40B4-BE49-F238E27FC236}">
-                <a16:creationId xmlns:a16="http://schemas.microsoft.com/office/drawing/2014/main" id="{E6364B03-8BE8-6ED5-4CCE-26078AB0B956}"/>
-              </a:ext>
-            </a:extLst>
-          </p:cNvPr>
-          <p:cNvSpPr txBox="1"/>
-          <p:nvPr/>
-        </p:nvSpPr>
-        <p:spPr>
-          <a:xfrm>
-            <a:off x="270759" y="2909448"/>
-            <a:ext cx="5565947" cy="323165"/>
-          </a:xfrm>
-          <a:prstGeom prst="rect">
-            <a:avLst/>
-          </a:prstGeom>
-          <a:noFill/>
-        </p:spPr>
-        <p:txBody>
-          <a:bodyPr wrap="none" rtlCol="0">
-            <a:spAutoFit/>
-          </a:bodyPr>
-          <a:lstStyle/>
-          <a:p>
-            <a:pPr marL="285750" indent="-285750">
-              <a:buFont typeface="Arial" panose="020B0604020202020204" pitchFamily="34" charset="0"/>
-              <a:buChar char="•"/>
-            </a:pPr>
-            <a:r>
-              <a:rPr lang="es-CO" sz="1500" dirty="0">
-                <a:solidFill>
-                  <a:srgbClr val="009A90"/>
-                </a:solidFill>
-                <a:latin typeface="Raleway Black" pitchFamily="2" charset="0"/>
-                <a:ea typeface="Open Sans SemiBold" panose="020B0706030804020204" pitchFamily="34" charset="0"/>
-                <a:cs typeface="Open Sans SemiBold" panose="020B0706030804020204" pitchFamily="34" charset="0"/>
-              </a:rPr>
-              <a:t>Gran cantidad de Librerías, </a:t>
-            </a:r>
-            <a:r>
-              <a:rPr lang="es-CO" sz="1500" dirty="0" err="1">
-                <a:solidFill>
-                  <a:srgbClr val="009A90"/>
-                </a:solidFill>
-                <a:latin typeface="Raleway Black" pitchFamily="2" charset="0"/>
-                <a:ea typeface="Open Sans SemiBold" panose="020B0706030804020204" pitchFamily="34" charset="0"/>
-                <a:cs typeface="Open Sans SemiBold" panose="020B0706030804020204" pitchFamily="34" charset="0"/>
-              </a:rPr>
-              <a:t>Frameworks</a:t>
-            </a:r>
-            <a:r>
-              <a:rPr lang="es-CO" sz="1500" dirty="0">
-                <a:solidFill>
-                  <a:srgbClr val="009A90"/>
-                </a:solidFill>
-                <a:latin typeface="Raleway Black" pitchFamily="2" charset="0"/>
-                <a:ea typeface="Open Sans SemiBold" panose="020B0706030804020204" pitchFamily="34" charset="0"/>
-                <a:cs typeface="Open Sans SemiBold" panose="020B0706030804020204" pitchFamily="34" charset="0"/>
-              </a:rPr>
-              <a:t> y </a:t>
-            </a:r>
-            <a:r>
-              <a:rPr lang="es-CO" sz="1500" dirty="0" err="1">
-                <a:solidFill>
-                  <a:srgbClr val="009A90"/>
-                </a:solidFill>
-                <a:latin typeface="Raleway Black" pitchFamily="2" charset="0"/>
-                <a:ea typeface="Open Sans SemiBold" panose="020B0706030804020204" pitchFamily="34" charset="0"/>
-                <a:cs typeface="Open Sans SemiBold" panose="020B0706030804020204" pitchFamily="34" charset="0"/>
-              </a:rPr>
-              <a:t>APIs</a:t>
-            </a:r>
-            <a:r>
-              <a:rPr lang="es-CO" sz="1500" dirty="0">
-                <a:solidFill>
-                  <a:srgbClr val="009A90"/>
-                </a:solidFill>
-                <a:latin typeface="Raleway Black" pitchFamily="2" charset="0"/>
-                <a:ea typeface="Open Sans SemiBold" panose="020B0706030804020204" pitchFamily="34" charset="0"/>
-                <a:cs typeface="Open Sans SemiBold" panose="020B0706030804020204" pitchFamily="34" charset="0"/>
-              </a:rPr>
-              <a:t> de CSS</a:t>
-            </a:r>
-            <a:endParaRPr lang="en-US" sz="1500" dirty="0">
-              <a:solidFill>
-                <a:srgbClr val="009A90"/>
-              </a:solidFill>
-              <a:latin typeface="Raleway Black" pitchFamily="2" charset="0"/>
-              <a:ea typeface="Open Sans SemiBold" panose="020B0706030804020204" pitchFamily="34" charset="0"/>
-              <a:cs typeface="Open Sans SemiBold" panose="020B0706030804020204" pitchFamily="34" charset="0"/>
-            </a:endParaRPr>
-          </a:p>
-        </p:txBody>
-      </p:sp>
-      <p:sp>
-        <p:nvSpPr>
-          <p:cNvPr id="12" name="CuadroTexto 11">
-            <a:extLst>
-              <a:ext uri="{FF2B5EF4-FFF2-40B4-BE49-F238E27FC236}">
-                <a16:creationId xmlns:a16="http://schemas.microsoft.com/office/drawing/2014/main" id="{BBA8378A-01B3-B9B5-4AA8-DE5194191A37}"/>
-              </a:ext>
-            </a:extLst>
-          </p:cNvPr>
-          <p:cNvSpPr txBox="1"/>
-          <p:nvPr/>
-        </p:nvSpPr>
-        <p:spPr>
-          <a:xfrm>
-            <a:off x="249910" y="1422523"/>
-            <a:ext cx="4213013" cy="323165"/>
-          </a:xfrm>
-          <a:prstGeom prst="rect">
-            <a:avLst/>
-          </a:prstGeom>
-          <a:noFill/>
-        </p:spPr>
-        <p:txBody>
-          <a:bodyPr wrap="none" rtlCol="0">
-            <a:spAutoFit/>
-          </a:bodyPr>
-          <a:lstStyle/>
-          <a:p>
-            <a:pPr marL="285750" indent="-285750">
-              <a:buFont typeface="Arial" panose="020B0604020202020204" pitchFamily="34" charset="0"/>
-              <a:buChar char="•"/>
-            </a:pPr>
-            <a:r>
-              <a:rPr lang="es-CO" sz="1500" b="1" dirty="0">
-                <a:solidFill>
-                  <a:srgbClr val="FFC000"/>
-                </a:solidFill>
-                <a:latin typeface="Raleway Black" pitchFamily="2" charset="0"/>
-                <a:ea typeface="Open Sans SemiBold" panose="020B0706030804020204" pitchFamily="34" charset="0"/>
-                <a:cs typeface="Open Sans SemiBold" panose="020B0706030804020204" pitchFamily="34" charset="0"/>
-              </a:rPr>
-              <a:t>La complejidad de Desarrollar con CSS.</a:t>
-            </a:r>
-            <a:endParaRPr lang="en-US" sz="1500" b="1" dirty="0">
-              <a:solidFill>
-                <a:srgbClr val="FFC000"/>
-              </a:solidFill>
-              <a:latin typeface="Raleway Black" pitchFamily="2" charset="0"/>
-              <a:ea typeface="Open Sans SemiBold" panose="020B0706030804020204" pitchFamily="34" charset="0"/>
-              <a:cs typeface="Open Sans SemiBold" panose="020B0706030804020204" pitchFamily="34" charset="0"/>
-            </a:endParaRPr>
-          </a:p>
-        </p:txBody>
-      </p:sp>
-      <p:grpSp>
-        <p:nvGrpSpPr>
-          <p:cNvPr id="2" name="Grupo 1">
-            <a:extLst>
-              <a:ext uri="{FF2B5EF4-FFF2-40B4-BE49-F238E27FC236}">
-                <a16:creationId xmlns:a16="http://schemas.microsoft.com/office/drawing/2014/main" id="{D0684625-07F3-9A7B-CB3B-C7E0DA365720}"/>
-              </a:ext>
-            </a:extLst>
-          </p:cNvPr>
-          <p:cNvGrpSpPr/>
-          <p:nvPr/>
-        </p:nvGrpSpPr>
-        <p:grpSpPr>
-          <a:xfrm flipV="1">
-            <a:off x="4703215" y="1905285"/>
-            <a:ext cx="1986959" cy="921643"/>
-            <a:chOff x="6096000" y="3017520"/>
-            <a:chExt cx="1645920" cy="533400"/>
-          </a:xfrm>
-        </p:grpSpPr>
-        <p:cxnSp>
-          <p:nvCxnSpPr>
-            <p:cNvPr id="3" name="Conector recto 2">
-              <a:extLst>
-                <a:ext uri="{FF2B5EF4-FFF2-40B4-BE49-F238E27FC236}">
-                  <a16:creationId xmlns:a16="http://schemas.microsoft.com/office/drawing/2014/main" id="{5DAA5603-4AB7-E7B2-7EC7-56C03F91355F}"/>
-                </a:ext>
-              </a:extLst>
-            </p:cNvPr>
-            <p:cNvCxnSpPr>
-              <a:cxnSpLocks/>
-            </p:cNvCxnSpPr>
-            <p:nvPr/>
-          </p:nvCxnSpPr>
-          <p:spPr>
-            <a:xfrm>
-              <a:off x="6096000" y="3550920"/>
-              <a:ext cx="716280" cy="0"/>
-            </a:xfrm>
-            <a:prstGeom prst="line">
-              <a:avLst/>
-            </a:prstGeom>
-            <a:ln w="28575">
-              <a:solidFill>
-                <a:srgbClr val="EB9734"/>
-              </a:solidFill>
-              <a:headEnd type="oval"/>
-              <a:tailEnd type="oval"/>
-            </a:ln>
-          </p:spPr>
-          <p:style>
-            <a:lnRef idx="1">
-              <a:schemeClr val="accent2"/>
-            </a:lnRef>
-            <a:fillRef idx="0">
-              <a:schemeClr val="accent2"/>
-            </a:fillRef>
-            <a:effectRef idx="0">
-              <a:schemeClr val="accent2"/>
-            </a:effectRef>
-            <a:fontRef idx="minor">
-              <a:schemeClr val="tx1"/>
-            </a:fontRef>
-          </p:style>
-        </p:cxnSp>
-        <p:cxnSp>
-          <p:nvCxnSpPr>
-            <p:cNvPr id="4" name="Conector recto 3">
-              <a:extLst>
-                <a:ext uri="{FF2B5EF4-FFF2-40B4-BE49-F238E27FC236}">
-                  <a16:creationId xmlns:a16="http://schemas.microsoft.com/office/drawing/2014/main" id="{370E3F82-FD03-B086-448D-EA3A0CEED72A}"/>
-                </a:ext>
-              </a:extLst>
-            </p:cNvPr>
-            <p:cNvCxnSpPr>
-              <a:cxnSpLocks/>
-            </p:cNvCxnSpPr>
-            <p:nvPr/>
-          </p:nvCxnSpPr>
-          <p:spPr>
-            <a:xfrm flipV="1">
-              <a:off x="6812280" y="3017520"/>
-              <a:ext cx="259080" cy="533400"/>
-            </a:xfrm>
-            <a:prstGeom prst="line">
-              <a:avLst/>
-            </a:prstGeom>
-            <a:ln w="28575">
-              <a:solidFill>
-                <a:srgbClr val="EB9734"/>
-              </a:solidFill>
-              <a:headEnd type="oval"/>
-              <a:tailEnd type="oval"/>
-            </a:ln>
-          </p:spPr>
-          <p:style>
-            <a:lnRef idx="1">
-              <a:schemeClr val="accent2"/>
-            </a:lnRef>
-            <a:fillRef idx="0">
-              <a:schemeClr val="accent2"/>
-            </a:fillRef>
-            <a:effectRef idx="0">
-              <a:schemeClr val="accent2"/>
-            </a:effectRef>
-            <a:fontRef idx="minor">
-              <a:schemeClr val="tx1"/>
-            </a:fontRef>
-          </p:style>
-        </p:cxnSp>
-        <p:cxnSp>
-          <p:nvCxnSpPr>
-            <p:cNvPr id="5" name="Conector recto 4">
-              <a:extLst>
-                <a:ext uri="{FF2B5EF4-FFF2-40B4-BE49-F238E27FC236}">
-                  <a16:creationId xmlns:a16="http://schemas.microsoft.com/office/drawing/2014/main" id="{12EC1A90-9226-0175-F179-D15E12D44378}"/>
-                </a:ext>
-              </a:extLst>
-            </p:cNvPr>
-            <p:cNvCxnSpPr>
-              <a:cxnSpLocks/>
-            </p:cNvCxnSpPr>
-            <p:nvPr/>
-          </p:nvCxnSpPr>
-          <p:spPr>
-            <a:xfrm>
-              <a:off x="7071360" y="3017520"/>
-              <a:ext cx="670560" cy="0"/>
-            </a:xfrm>
-            <a:prstGeom prst="line">
-              <a:avLst/>
-            </a:prstGeom>
-            <a:ln w="28575">
-              <a:solidFill>
-                <a:srgbClr val="EB9734"/>
-              </a:solidFill>
-              <a:headEnd type="oval"/>
-              <a:tailEnd type="oval"/>
-            </a:ln>
-          </p:spPr>
-          <p:style>
-            <a:lnRef idx="1">
-              <a:schemeClr val="accent2"/>
-            </a:lnRef>
-            <a:fillRef idx="0">
-              <a:schemeClr val="accent2"/>
-            </a:fillRef>
-            <a:effectRef idx="0">
-              <a:schemeClr val="accent2"/>
-            </a:effectRef>
-            <a:fontRef idx="minor">
-              <a:schemeClr val="tx1"/>
-            </a:fontRef>
-          </p:style>
-        </p:cxnSp>
-      </p:grpSp>
-      <p:grpSp>
-        <p:nvGrpSpPr>
-          <p:cNvPr id="9" name="Grupo 8">
-            <a:extLst>
-              <a:ext uri="{FF2B5EF4-FFF2-40B4-BE49-F238E27FC236}">
-                <a16:creationId xmlns:a16="http://schemas.microsoft.com/office/drawing/2014/main" id="{5E6707C5-F6F1-8A91-3BD9-21E23CBDEB3A}"/>
-              </a:ext>
-            </a:extLst>
-          </p:cNvPr>
-          <p:cNvGrpSpPr/>
-          <p:nvPr/>
-        </p:nvGrpSpPr>
-        <p:grpSpPr>
-          <a:xfrm flipV="1">
-            <a:off x="5414458" y="3815544"/>
-            <a:ext cx="2469164" cy="774804"/>
-            <a:chOff x="6225768" y="3017520"/>
-            <a:chExt cx="1774229" cy="533400"/>
-          </a:xfrm>
-        </p:grpSpPr>
-        <p:cxnSp>
-          <p:nvCxnSpPr>
-            <p:cNvPr id="16" name="Conector recto 15">
-              <a:extLst>
-                <a:ext uri="{FF2B5EF4-FFF2-40B4-BE49-F238E27FC236}">
-                  <a16:creationId xmlns:a16="http://schemas.microsoft.com/office/drawing/2014/main" id="{6838BA70-5BE0-1AAB-272C-5D9139645C4A}"/>
-                </a:ext>
-              </a:extLst>
-            </p:cNvPr>
-            <p:cNvCxnSpPr>
-              <a:cxnSpLocks/>
-            </p:cNvCxnSpPr>
-            <p:nvPr/>
-          </p:nvCxnSpPr>
-          <p:spPr>
-            <a:xfrm flipV="1">
-              <a:off x="6225768" y="3550920"/>
-              <a:ext cx="586513" cy="0"/>
-            </a:xfrm>
-            <a:prstGeom prst="line">
-              <a:avLst/>
-            </a:prstGeom>
-            <a:ln w="28575">
-              <a:solidFill>
-                <a:srgbClr val="00978D"/>
-              </a:solidFill>
-              <a:headEnd type="oval"/>
-            </a:ln>
-          </p:spPr>
-          <p:style>
-            <a:lnRef idx="1">
-              <a:schemeClr val="accent2"/>
-            </a:lnRef>
-            <a:fillRef idx="0">
-              <a:schemeClr val="accent2"/>
-            </a:fillRef>
-            <a:effectRef idx="0">
-              <a:schemeClr val="accent2"/>
-            </a:effectRef>
-            <a:fontRef idx="minor">
-              <a:schemeClr val="tx1"/>
-            </a:fontRef>
-          </p:style>
-        </p:cxnSp>
-        <p:cxnSp>
-          <p:nvCxnSpPr>
-            <p:cNvPr id="17" name="Conector recto 16">
-              <a:extLst>
-                <a:ext uri="{FF2B5EF4-FFF2-40B4-BE49-F238E27FC236}">
-                  <a16:creationId xmlns:a16="http://schemas.microsoft.com/office/drawing/2014/main" id="{E0BCA83F-BC25-54AD-A568-74739C072892}"/>
-                </a:ext>
-              </a:extLst>
-            </p:cNvPr>
-            <p:cNvCxnSpPr>
-              <a:cxnSpLocks/>
-            </p:cNvCxnSpPr>
-            <p:nvPr/>
-          </p:nvCxnSpPr>
-          <p:spPr>
-            <a:xfrm flipV="1">
-              <a:off x="6812280" y="3017520"/>
-              <a:ext cx="259080" cy="533400"/>
-            </a:xfrm>
-            <a:prstGeom prst="line">
-              <a:avLst/>
-            </a:prstGeom>
-            <a:ln w="28575">
-              <a:solidFill>
-                <a:srgbClr val="00978D"/>
-              </a:solidFill>
-              <a:headEnd type="oval"/>
-              <a:tailEnd type="oval"/>
-            </a:ln>
-          </p:spPr>
-          <p:style>
-            <a:lnRef idx="1">
-              <a:schemeClr val="accent2"/>
-            </a:lnRef>
-            <a:fillRef idx="0">
-              <a:schemeClr val="accent2"/>
-            </a:fillRef>
-            <a:effectRef idx="0">
-              <a:schemeClr val="accent2"/>
-            </a:effectRef>
-            <a:fontRef idx="minor">
-              <a:schemeClr val="tx1"/>
-            </a:fontRef>
-          </p:style>
-        </p:cxnSp>
-        <p:cxnSp>
-          <p:nvCxnSpPr>
-            <p:cNvPr id="18" name="Conector recto 17">
-              <a:extLst>
-                <a:ext uri="{FF2B5EF4-FFF2-40B4-BE49-F238E27FC236}">
-                  <a16:creationId xmlns:a16="http://schemas.microsoft.com/office/drawing/2014/main" id="{7F2B1CEA-A7AA-9F2E-BE33-266B2FEF8B8F}"/>
-                </a:ext>
-              </a:extLst>
-            </p:cNvPr>
-            <p:cNvCxnSpPr>
-              <a:cxnSpLocks/>
-            </p:cNvCxnSpPr>
-            <p:nvPr/>
-          </p:nvCxnSpPr>
-          <p:spPr>
-            <a:xfrm>
-              <a:off x="7071360" y="3017520"/>
-              <a:ext cx="928637" cy="0"/>
-            </a:xfrm>
-            <a:prstGeom prst="line">
-              <a:avLst/>
-            </a:prstGeom>
-            <a:ln w="28575">
-              <a:solidFill>
-                <a:srgbClr val="00978D"/>
-              </a:solidFill>
-              <a:tailEnd type="oval"/>
-            </a:ln>
-          </p:spPr>
-          <p:style>
-            <a:lnRef idx="1">
-              <a:schemeClr val="accent2"/>
-            </a:lnRef>
-            <a:fillRef idx="0">
-              <a:schemeClr val="accent2"/>
-            </a:fillRef>
-            <a:effectRef idx="0">
-              <a:schemeClr val="accent2"/>
-            </a:effectRef>
-            <a:fontRef idx="minor">
-              <a:schemeClr val="tx1"/>
-            </a:fontRef>
-          </p:style>
-        </p:cxnSp>
-      </p:grpSp>
-      <p:grpSp>
-        <p:nvGrpSpPr>
-          <p:cNvPr id="22" name="Grupo 21">
-            <a:extLst>
-              <a:ext uri="{FF2B5EF4-FFF2-40B4-BE49-F238E27FC236}">
-                <a16:creationId xmlns:a16="http://schemas.microsoft.com/office/drawing/2014/main" id="{E57E67D4-32F3-F8AF-ECC0-250D2F43AD9C}"/>
-              </a:ext>
-            </a:extLst>
-          </p:cNvPr>
-          <p:cNvGrpSpPr/>
-          <p:nvPr/>
-        </p:nvGrpSpPr>
-        <p:grpSpPr>
-          <a:xfrm flipV="1">
-            <a:off x="5634001" y="5535045"/>
-            <a:ext cx="3769239" cy="603690"/>
-            <a:chOff x="5696612" y="3017520"/>
-            <a:chExt cx="2303385" cy="533400"/>
-          </a:xfrm>
-        </p:grpSpPr>
-        <p:cxnSp>
-          <p:nvCxnSpPr>
-            <p:cNvPr id="23" name="Conector recto 22">
-              <a:extLst>
-                <a:ext uri="{FF2B5EF4-FFF2-40B4-BE49-F238E27FC236}">
-                  <a16:creationId xmlns:a16="http://schemas.microsoft.com/office/drawing/2014/main" id="{BB7DBEC1-D575-FFE5-CC80-D3FEFB49FFA8}"/>
-                </a:ext>
-              </a:extLst>
-            </p:cNvPr>
-            <p:cNvCxnSpPr>
-              <a:cxnSpLocks/>
-            </p:cNvCxnSpPr>
-            <p:nvPr/>
-          </p:nvCxnSpPr>
-          <p:spPr>
-            <a:xfrm flipV="1">
-              <a:off x="5696612" y="3550920"/>
-              <a:ext cx="1115668" cy="0"/>
-            </a:xfrm>
-            <a:prstGeom prst="line">
-              <a:avLst/>
-            </a:prstGeom>
-            <a:ln w="28575">
-              <a:solidFill>
-                <a:srgbClr val="8F999D"/>
-              </a:solidFill>
-              <a:headEnd type="oval"/>
-              <a:tailEnd type="oval"/>
-            </a:ln>
-          </p:spPr>
-          <p:style>
-            <a:lnRef idx="1">
-              <a:schemeClr val="accent2"/>
-            </a:lnRef>
-            <a:fillRef idx="0">
-              <a:schemeClr val="accent2"/>
-            </a:fillRef>
-            <a:effectRef idx="0">
-              <a:schemeClr val="accent2"/>
-            </a:effectRef>
-            <a:fontRef idx="minor">
-              <a:schemeClr val="tx1"/>
-            </a:fontRef>
-          </p:style>
-        </p:cxnSp>
-        <p:cxnSp>
-          <p:nvCxnSpPr>
-            <p:cNvPr id="24" name="Conector recto 23">
-              <a:extLst>
-                <a:ext uri="{FF2B5EF4-FFF2-40B4-BE49-F238E27FC236}">
-                  <a16:creationId xmlns:a16="http://schemas.microsoft.com/office/drawing/2014/main" id="{5CCC6452-CA0A-CB66-9D26-1A151CE74DAA}"/>
-                </a:ext>
-              </a:extLst>
-            </p:cNvPr>
-            <p:cNvCxnSpPr>
-              <a:cxnSpLocks/>
-            </p:cNvCxnSpPr>
-            <p:nvPr/>
-          </p:nvCxnSpPr>
-          <p:spPr>
-            <a:xfrm flipV="1">
-              <a:off x="6812280" y="3017520"/>
-              <a:ext cx="259080" cy="533400"/>
-            </a:xfrm>
-            <a:prstGeom prst="line">
-              <a:avLst/>
-            </a:prstGeom>
-            <a:ln w="28575">
-              <a:solidFill>
-                <a:srgbClr val="8F999D"/>
-              </a:solidFill>
-              <a:tailEnd type="oval"/>
-            </a:ln>
-          </p:spPr>
-          <p:style>
-            <a:lnRef idx="1">
-              <a:schemeClr val="accent2"/>
-            </a:lnRef>
-            <a:fillRef idx="0">
-              <a:schemeClr val="accent2"/>
-            </a:fillRef>
-            <a:effectRef idx="0">
-              <a:schemeClr val="accent2"/>
-            </a:effectRef>
-            <a:fontRef idx="minor">
-              <a:schemeClr val="tx1"/>
-            </a:fontRef>
-          </p:style>
-        </p:cxnSp>
-        <p:cxnSp>
-          <p:nvCxnSpPr>
-            <p:cNvPr id="25" name="Conector recto 24">
-              <a:extLst>
-                <a:ext uri="{FF2B5EF4-FFF2-40B4-BE49-F238E27FC236}">
-                  <a16:creationId xmlns:a16="http://schemas.microsoft.com/office/drawing/2014/main" id="{198BEBE2-823D-7AFB-D991-9F69BBBE1496}"/>
-                </a:ext>
-              </a:extLst>
-            </p:cNvPr>
-            <p:cNvCxnSpPr>
-              <a:cxnSpLocks/>
-            </p:cNvCxnSpPr>
-            <p:nvPr/>
-          </p:nvCxnSpPr>
-          <p:spPr>
-            <a:xfrm>
-              <a:off x="7071360" y="3017520"/>
-              <a:ext cx="928637" cy="0"/>
-            </a:xfrm>
-            <a:prstGeom prst="line">
-              <a:avLst/>
-            </a:prstGeom>
-            <a:ln w="28575">
-              <a:solidFill>
-                <a:srgbClr val="8F999D"/>
-              </a:solidFill>
-              <a:tailEnd type="oval"/>
-            </a:ln>
-          </p:spPr>
-          <p:style>
-            <a:lnRef idx="1">
-              <a:schemeClr val="accent2"/>
-            </a:lnRef>
-            <a:fillRef idx="0">
-              <a:schemeClr val="accent2"/>
-            </a:fillRef>
-            <a:effectRef idx="0">
-              <a:schemeClr val="accent2"/>
-            </a:effectRef>
-            <a:fontRef idx="minor">
-              <a:schemeClr val="tx1"/>
-            </a:fontRef>
-          </p:style>
-        </p:cxnSp>
-      </p:grpSp>
       <p:sp>
         <p:nvSpPr>
           <p:cNvPr id="27" name="CuadroTexto 26">
@@ -38817,282 +38166,6 @@
               <a:latin typeface="Open Sans" panose="020B0606030504020204" pitchFamily="34" charset="0"/>
               <a:ea typeface="Open Sans" panose="020B0606030504020204" pitchFamily="34" charset="0"/>
               <a:cs typeface="Open Sans" panose="020B0606030504020204" pitchFamily="34" charset="0"/>
-            </a:endParaRPr>
-          </a:p>
-        </p:txBody>
-      </p:sp>
-      <p:sp>
-        <p:nvSpPr>
-          <p:cNvPr id="21" name="CuadroTexto 20">
-            <a:extLst>
-              <a:ext uri="{FF2B5EF4-FFF2-40B4-BE49-F238E27FC236}">
-                <a16:creationId xmlns:a16="http://schemas.microsoft.com/office/drawing/2014/main" id="{1388B7EE-22EC-33CD-6348-86CF627B7A88}"/>
-              </a:ext>
-            </a:extLst>
-          </p:cNvPr>
-          <p:cNvSpPr txBox="1"/>
-          <p:nvPr/>
-        </p:nvSpPr>
-        <p:spPr>
-          <a:xfrm>
-            <a:off x="268073" y="5306065"/>
-            <a:ext cx="3900427" cy="323165"/>
-          </a:xfrm>
-          <a:prstGeom prst="rect">
-            <a:avLst/>
-          </a:prstGeom>
-          <a:noFill/>
-        </p:spPr>
-        <p:txBody>
-          <a:bodyPr wrap="none" rtlCol="0">
-            <a:spAutoFit/>
-          </a:bodyPr>
-          <a:lstStyle/>
-          <a:p>
-            <a:pPr marL="285750" indent="-285750">
-              <a:buFont typeface="Arial" panose="020B0604020202020204" pitchFamily="34" charset="0"/>
-              <a:buChar char="•"/>
-            </a:pPr>
-            <a:r>
-              <a:rPr lang="es-MX" sz="1500" dirty="0">
-                <a:solidFill>
-                  <a:schemeClr val="accent1">
-                    <a:lumMod val="40000"/>
-                    <a:lumOff val="60000"/>
-                  </a:schemeClr>
-                </a:solidFill>
-                <a:latin typeface="Raleway Black" pitchFamily="2" charset="0"/>
-                <a:ea typeface="Open Sans SemiBold" panose="020B0706030804020204" pitchFamily="34" charset="0"/>
-                <a:cs typeface="Open Sans SemiBold" panose="020B0706030804020204" pitchFamily="34" charset="0"/>
-              </a:rPr>
-              <a:t>Incrementa el tiempo de desarrollo.</a:t>
-            </a:r>
-            <a:endParaRPr lang="en-US" sz="1500" dirty="0">
-              <a:solidFill>
-                <a:schemeClr val="accent1">
-                  <a:lumMod val="40000"/>
-                  <a:lumOff val="60000"/>
-                </a:schemeClr>
-              </a:solidFill>
-              <a:latin typeface="Raleway Black" pitchFamily="2" charset="0"/>
-              <a:ea typeface="Open Sans SemiBold" panose="020B0706030804020204" pitchFamily="34" charset="0"/>
-              <a:cs typeface="Open Sans SemiBold" panose="020B0706030804020204" pitchFamily="34" charset="0"/>
-            </a:endParaRPr>
-          </a:p>
-        </p:txBody>
-      </p:sp>
-      <p:sp>
-        <p:nvSpPr>
-          <p:cNvPr id="26" name="CuadroTexto 25">
-            <a:extLst>
-              <a:ext uri="{FF2B5EF4-FFF2-40B4-BE49-F238E27FC236}">
-                <a16:creationId xmlns:a16="http://schemas.microsoft.com/office/drawing/2014/main" id="{763C83BE-779A-4224-43BD-2A31635EDC0B}"/>
-              </a:ext>
-            </a:extLst>
-          </p:cNvPr>
-          <p:cNvSpPr txBox="1"/>
-          <p:nvPr/>
-        </p:nvSpPr>
-        <p:spPr>
-          <a:xfrm>
-            <a:off x="270759" y="3391354"/>
-            <a:ext cx="5143699" cy="553998"/>
-          </a:xfrm>
-          <a:prstGeom prst="rect">
-            <a:avLst/>
-          </a:prstGeom>
-          <a:noFill/>
-        </p:spPr>
-        <p:txBody>
-          <a:bodyPr wrap="square" rtlCol="0">
-            <a:spAutoFit/>
-          </a:bodyPr>
-          <a:lstStyle/>
-          <a:p>
-            <a:pPr marL="285750" indent="-285750">
-              <a:buFont typeface="Arial" panose="020B0604020202020204" pitchFamily="34" charset="0"/>
-              <a:buChar char="•"/>
-            </a:pPr>
-            <a:r>
-              <a:rPr lang="es-MX" sz="1500" dirty="0">
-                <a:solidFill>
-                  <a:srgbClr val="009A90"/>
-                </a:solidFill>
-                <a:latin typeface="Raleway Black" pitchFamily="2" charset="0"/>
-                <a:ea typeface="Open Sans SemiBold" panose="020B0706030804020204" pitchFamily="34" charset="0"/>
-                <a:cs typeface="Open Sans SemiBold" panose="020B0706030804020204" pitchFamily="34" charset="0"/>
-              </a:rPr>
-              <a:t>Escribir más código y se debe tener más conocimientos sobre la herramienta.</a:t>
-            </a:r>
-            <a:endParaRPr lang="en-US" sz="1500" dirty="0">
-              <a:solidFill>
-                <a:srgbClr val="009A90"/>
-              </a:solidFill>
-              <a:latin typeface="Raleway Black" pitchFamily="2" charset="0"/>
-              <a:ea typeface="Open Sans SemiBold" panose="020B0706030804020204" pitchFamily="34" charset="0"/>
-              <a:cs typeface="Open Sans SemiBold" panose="020B0706030804020204" pitchFamily="34" charset="0"/>
-            </a:endParaRPr>
-          </a:p>
-        </p:txBody>
-      </p:sp>
-      <p:sp>
-        <p:nvSpPr>
-          <p:cNvPr id="29" name="CuadroTexto 28">
-            <a:extLst>
-              <a:ext uri="{FF2B5EF4-FFF2-40B4-BE49-F238E27FC236}">
-                <a16:creationId xmlns:a16="http://schemas.microsoft.com/office/drawing/2014/main" id="{9E9BF258-0E22-F08A-8D3A-CF3607D4077B}"/>
-              </a:ext>
-            </a:extLst>
-          </p:cNvPr>
-          <p:cNvSpPr txBox="1"/>
-          <p:nvPr/>
-        </p:nvSpPr>
-        <p:spPr>
-          <a:xfrm>
-            <a:off x="257222" y="1850686"/>
-            <a:ext cx="4065537" cy="323165"/>
-          </a:xfrm>
-          <a:prstGeom prst="rect">
-            <a:avLst/>
-          </a:prstGeom>
-          <a:noFill/>
-        </p:spPr>
-        <p:txBody>
-          <a:bodyPr wrap="none" rtlCol="0">
-            <a:spAutoFit/>
-          </a:bodyPr>
-          <a:lstStyle/>
-          <a:p>
-            <a:pPr marL="285750" indent="-285750">
-              <a:buFont typeface="Arial" panose="020B0604020202020204" pitchFamily="34" charset="0"/>
-              <a:buChar char="•"/>
-            </a:pPr>
-            <a:r>
-              <a:rPr lang="es-MX" sz="1500" b="1" dirty="0">
-                <a:solidFill>
-                  <a:srgbClr val="FFC000"/>
-                </a:solidFill>
-                <a:latin typeface="Raleway Black" pitchFamily="2" charset="0"/>
-                <a:ea typeface="Open Sans SemiBold" panose="020B0706030804020204" pitchFamily="34" charset="0"/>
-                <a:cs typeface="Open Sans SemiBold" panose="020B0706030804020204" pitchFamily="34" charset="0"/>
-              </a:rPr>
-              <a:t>Proceso de desarrollo lento y tedioso.</a:t>
-            </a:r>
-            <a:endParaRPr lang="en-US" sz="1500" b="1" dirty="0">
-              <a:solidFill>
-                <a:srgbClr val="FFC000"/>
-              </a:solidFill>
-              <a:latin typeface="Raleway Black" pitchFamily="2" charset="0"/>
-              <a:ea typeface="Open Sans SemiBold" panose="020B0706030804020204" pitchFamily="34" charset="0"/>
-              <a:cs typeface="Open Sans SemiBold" panose="020B0706030804020204" pitchFamily="34" charset="0"/>
-            </a:endParaRPr>
-          </a:p>
-        </p:txBody>
-      </p:sp>
-      <p:sp>
-        <p:nvSpPr>
-          <p:cNvPr id="31" name="CuadroTexto 30">
-            <a:extLst>
-              <a:ext uri="{FF2B5EF4-FFF2-40B4-BE49-F238E27FC236}">
-                <a16:creationId xmlns:a16="http://schemas.microsoft.com/office/drawing/2014/main" id="{52572835-F25A-B78F-3258-29811BB7DE6C}"/>
-              </a:ext>
-            </a:extLst>
-          </p:cNvPr>
-          <p:cNvSpPr txBox="1"/>
-          <p:nvPr/>
-        </p:nvSpPr>
-        <p:spPr>
-          <a:xfrm>
-            <a:off x="285196" y="4070039"/>
-            <a:ext cx="2927404" cy="323165"/>
-          </a:xfrm>
-          <a:prstGeom prst="rect">
-            <a:avLst/>
-          </a:prstGeom>
-          <a:noFill/>
-        </p:spPr>
-        <p:txBody>
-          <a:bodyPr wrap="none" rtlCol="0">
-            <a:spAutoFit/>
-          </a:bodyPr>
-          <a:lstStyle/>
-          <a:p>
-            <a:pPr marL="285750" indent="-285750">
-              <a:buFont typeface="Arial" panose="020B0604020202020204" pitchFamily="34" charset="0"/>
-              <a:buChar char="•"/>
-            </a:pPr>
-            <a:r>
-              <a:rPr lang="es-CO" sz="1500" dirty="0">
-                <a:solidFill>
-                  <a:srgbClr val="009A90"/>
-                </a:solidFill>
-                <a:latin typeface="Raleway Black" pitchFamily="2" charset="0"/>
-                <a:ea typeface="Open Sans SemiBold" panose="020B0706030804020204" pitchFamily="34" charset="0"/>
-                <a:cs typeface="Open Sans SemiBold" panose="020B0706030804020204" pitchFamily="34" charset="0"/>
-              </a:rPr>
-              <a:t>El trabajo se incrementa. </a:t>
-            </a:r>
-            <a:endParaRPr lang="en-US" sz="1500" dirty="0">
-              <a:solidFill>
-                <a:srgbClr val="009A90"/>
-              </a:solidFill>
-              <a:latin typeface="Raleway Black" pitchFamily="2" charset="0"/>
-              <a:ea typeface="Open Sans SemiBold" panose="020B0706030804020204" pitchFamily="34" charset="0"/>
-              <a:cs typeface="Open Sans SemiBold" panose="020B0706030804020204" pitchFamily="34" charset="0"/>
-            </a:endParaRPr>
-          </a:p>
-        </p:txBody>
-      </p:sp>
-      <p:sp>
-        <p:nvSpPr>
-          <p:cNvPr id="32" name="CuadroTexto 31">
-            <a:extLst>
-              <a:ext uri="{FF2B5EF4-FFF2-40B4-BE49-F238E27FC236}">
-                <a16:creationId xmlns:a16="http://schemas.microsoft.com/office/drawing/2014/main" id="{0796FBA4-9EF0-FD35-686D-97E6D34F26B6}"/>
-              </a:ext>
-            </a:extLst>
-          </p:cNvPr>
-          <p:cNvSpPr txBox="1"/>
-          <p:nvPr/>
-        </p:nvSpPr>
-        <p:spPr>
-          <a:xfrm>
-            <a:off x="257222" y="2278849"/>
-            <a:ext cx="3621504" cy="323165"/>
-          </a:xfrm>
-          <a:prstGeom prst="rect">
-            <a:avLst/>
-          </a:prstGeom>
-          <a:noFill/>
-        </p:spPr>
-        <p:txBody>
-          <a:bodyPr wrap="none" rtlCol="0">
-            <a:spAutoFit/>
-          </a:bodyPr>
-          <a:lstStyle/>
-          <a:p>
-            <a:pPr marL="285750" indent="-285750">
-              <a:buFont typeface="Arial" panose="020B0604020202020204" pitchFamily="34" charset="0"/>
-              <a:buChar char="•"/>
-            </a:pPr>
-            <a:r>
-              <a:rPr lang="es-CO" sz="1500" b="1" dirty="0">
-                <a:solidFill>
-                  <a:srgbClr val="FFC000"/>
-                </a:solidFill>
-                <a:latin typeface="Raleway Black" pitchFamily="2" charset="0"/>
-                <a:ea typeface="Open Sans SemiBold" panose="020B0706030804020204" pitchFamily="34" charset="0"/>
-                <a:cs typeface="Open Sans SemiBold" panose="020B0706030804020204" pitchFamily="34" charset="0"/>
-              </a:rPr>
-              <a:t>La escritura de código repetitivo.</a:t>
-            </a:r>
-            <a:endParaRPr lang="en-US" sz="1500" b="1" dirty="0">
-              <a:solidFill>
-                <a:srgbClr val="FFC000"/>
-              </a:solidFill>
-              <a:latin typeface="Raleway Black" pitchFamily="2" charset="0"/>
-              <a:ea typeface="Open Sans SemiBold" panose="020B0706030804020204" pitchFamily="34" charset="0"/>
-              <a:cs typeface="Open Sans SemiBold" panose="020B0706030804020204" pitchFamily="34" charset="0"/>
             </a:endParaRPr>
           </a:p>
         </p:txBody>

</xml_diff>

<commit_message>
style(v0.6.9): add format in presentation
</commit_message>
<xml_diff>
--- a/documents/Presentación de Perfil - Modelo Generador CSS.pptx
+++ b/documents/Presentación de Perfil - Modelo Generador CSS.pptx
@@ -11398,7 +11398,7 @@
           </a:bodyPr>
           <a:lstStyle/>
           <a:p>
-            <a:pPr marL="342900" indent="-342900">
+            <a:pPr marL="342900" indent="-342900" algn="just">
               <a:buFont typeface="Arial" panose="020B0604020202020204" pitchFamily="34" charset="0"/>
               <a:buChar char="•"/>
             </a:pPr>
@@ -11425,7 +11425,7 @@
             </a:endParaRPr>
           </a:p>
           <a:p>
-            <a:pPr marL="342900" indent="-342900">
+            <a:pPr marL="342900" indent="-342900" algn="just">
               <a:buFont typeface="Arial" panose="020B0604020202020204" pitchFamily="34" charset="0"/>
               <a:buChar char="•"/>
             </a:pPr>
@@ -29703,6 +29703,7 @@
           </a:bodyPr>
           <a:lstStyle/>
           <a:p>
+            <a:pPr algn="just"/>
             <a:r>
               <a:rPr lang="es-MX" sz="1600" dirty="0">
                 <a:solidFill>
@@ -33235,6 +33236,7 @@
           </a:bodyPr>
           <a:lstStyle/>
           <a:p>
+            <a:pPr algn="just"/>
             <a:r>
               <a:rPr lang="es-MX" sz="1600" dirty="0">
                 <a:solidFill>
@@ -34843,6 +34845,7 @@
             </a:endParaRPr>
           </a:p>
           <a:p>
+            <a:pPr algn="just"/>
             <a:r>
               <a:rPr lang="es-MX" b="1" dirty="0">
                 <a:solidFill>

</xml_diff>

<commit_message>
docs(v0.7.0): add final changes in presentation
</commit_message>
<xml_diff>
--- a/documents/Presentación de Perfil - Modelo Generador CSS.pptx
+++ b/documents/Presentación de Perfil - Modelo Generador CSS.pptx
@@ -5,7 +5,7 @@
     <p:sldMasterId id="2147483648" r:id="rId1"/>
   </p:sldMasterIdLst>
   <p:notesMasterIdLst>
-    <p:notesMasterId r:id="rId49"/>
+    <p:notesMasterId r:id="rId48"/>
   </p:notesMasterIdLst>
   <p:sldIdLst>
     <p:sldId id="256" r:id="rId2"/>
@@ -49,12 +49,11 @@
     <p:sldId id="363" r:id="rId40"/>
     <p:sldId id="380" r:id="rId41"/>
     <p:sldId id="381" r:id="rId42"/>
-    <p:sldId id="375" r:id="rId43"/>
-    <p:sldId id="382" r:id="rId44"/>
-    <p:sldId id="378" r:id="rId45"/>
-    <p:sldId id="377" r:id="rId46"/>
-    <p:sldId id="278" r:id="rId47"/>
-    <p:sldId id="376" r:id="rId48"/>
+    <p:sldId id="382" r:id="rId43"/>
+    <p:sldId id="378" r:id="rId44"/>
+    <p:sldId id="377" r:id="rId45"/>
+    <p:sldId id="278" r:id="rId46"/>
+    <p:sldId id="376" r:id="rId47"/>
   </p:sldIdLst>
   <p:sldSz cx="12192000" cy="6858000"/>
   <p:notesSz cx="6858000" cy="9144000"/>
@@ -255,7 +254,7 @@
           <a:p>
             <a:fld id="{0CE5AC1C-3879-49AC-930D-5E36BA111EA3}" type="datetimeFigureOut">
               <a:rPr lang="es-ES" smtClean="0"/>
-              <a:t>30/06/2024</a:t>
+              <a:t>01/07/2024</a:t>
             </a:fld>
             <a:endParaRPr lang="es-ES"/>
           </a:p>
@@ -839,7 +838,7 @@
           <a:p>
             <a:fld id="{353ECDC7-B053-49E7-A4E4-B30D314B072F}" type="datetimeFigureOut">
               <a:rPr lang="es-BO" smtClean="0"/>
-              <a:t>30/6/2024</a:t>
+              <a:t>1/7/2024</a:t>
             </a:fld>
             <a:endParaRPr lang="es-BO"/>
           </a:p>
@@ -1039,7 +1038,7 @@
           <a:p>
             <a:fld id="{353ECDC7-B053-49E7-A4E4-B30D314B072F}" type="datetimeFigureOut">
               <a:rPr lang="es-BO" smtClean="0"/>
-              <a:t>30/6/2024</a:t>
+              <a:t>1/7/2024</a:t>
             </a:fld>
             <a:endParaRPr lang="es-BO"/>
           </a:p>
@@ -1249,7 +1248,7 @@
           <a:p>
             <a:fld id="{353ECDC7-B053-49E7-A4E4-B30D314B072F}" type="datetimeFigureOut">
               <a:rPr lang="es-BO" smtClean="0"/>
-              <a:t>30/6/2024</a:t>
+              <a:t>1/7/2024</a:t>
             </a:fld>
             <a:endParaRPr lang="es-BO"/>
           </a:p>
@@ -1449,7 +1448,7 @@
           <a:p>
             <a:fld id="{353ECDC7-B053-49E7-A4E4-B30D314B072F}" type="datetimeFigureOut">
               <a:rPr lang="es-BO" smtClean="0"/>
-              <a:t>30/6/2024</a:t>
+              <a:t>1/7/2024</a:t>
             </a:fld>
             <a:endParaRPr lang="es-BO"/>
           </a:p>
@@ -1725,7 +1724,7 @@
           <a:p>
             <a:fld id="{353ECDC7-B053-49E7-A4E4-B30D314B072F}" type="datetimeFigureOut">
               <a:rPr lang="es-BO" smtClean="0"/>
-              <a:t>30/6/2024</a:t>
+              <a:t>1/7/2024</a:t>
             </a:fld>
             <a:endParaRPr lang="es-BO"/>
           </a:p>
@@ -1993,7 +1992,7 @@
           <a:p>
             <a:fld id="{353ECDC7-B053-49E7-A4E4-B30D314B072F}" type="datetimeFigureOut">
               <a:rPr lang="es-BO" smtClean="0"/>
-              <a:t>30/6/2024</a:t>
+              <a:t>1/7/2024</a:t>
             </a:fld>
             <a:endParaRPr lang="es-BO"/>
           </a:p>
@@ -2408,7 +2407,7 @@
           <a:p>
             <a:fld id="{353ECDC7-B053-49E7-A4E4-B30D314B072F}" type="datetimeFigureOut">
               <a:rPr lang="es-BO" smtClean="0"/>
-              <a:t>30/6/2024</a:t>
+              <a:t>1/7/2024</a:t>
             </a:fld>
             <a:endParaRPr lang="es-BO"/>
           </a:p>
@@ -2550,7 +2549,7 @@
           <a:p>
             <a:fld id="{353ECDC7-B053-49E7-A4E4-B30D314B072F}" type="datetimeFigureOut">
               <a:rPr lang="es-BO" smtClean="0"/>
-              <a:t>30/6/2024</a:t>
+              <a:t>1/7/2024</a:t>
             </a:fld>
             <a:endParaRPr lang="es-BO"/>
           </a:p>
@@ -2663,7 +2662,7 @@
           <a:p>
             <a:fld id="{353ECDC7-B053-49E7-A4E4-B30D314B072F}" type="datetimeFigureOut">
               <a:rPr lang="es-BO" smtClean="0"/>
-              <a:t>30/6/2024</a:t>
+              <a:t>1/7/2024</a:t>
             </a:fld>
             <a:endParaRPr lang="es-BO"/>
           </a:p>
@@ -2976,7 +2975,7 @@
           <a:p>
             <a:fld id="{353ECDC7-B053-49E7-A4E4-B30D314B072F}" type="datetimeFigureOut">
               <a:rPr lang="es-BO" smtClean="0"/>
-              <a:t>30/6/2024</a:t>
+              <a:t>1/7/2024</a:t>
             </a:fld>
             <a:endParaRPr lang="es-BO"/>
           </a:p>
@@ -3265,7 +3264,7 @@
           <a:p>
             <a:fld id="{353ECDC7-B053-49E7-A4E4-B30D314B072F}" type="datetimeFigureOut">
               <a:rPr lang="es-BO" smtClean="0"/>
-              <a:t>30/6/2024</a:t>
+              <a:t>1/7/2024</a:t>
             </a:fld>
             <a:endParaRPr lang="es-BO"/>
           </a:p>
@@ -3524,7 +3523,7 @@
           <a:p>
             <a:fld id="{353ECDC7-B053-49E7-A4E4-B30D314B072F}" type="datetimeFigureOut">
               <a:rPr lang="es-BO" smtClean="0"/>
-              <a:t>30/6/2024</a:t>
+              <a:t>1/7/2024</a:t>
             </a:fld>
             <a:endParaRPr lang="es-BO"/>
           </a:p>
@@ -26633,8 +26632,8 @@
         </p:blipFill>
         <p:spPr bwMode="auto">
           <a:xfrm>
-            <a:off x="2361914" y="1661691"/>
-            <a:ext cx="7468171" cy="2244787"/>
+            <a:off x="561538" y="1979747"/>
+            <a:ext cx="10969236" cy="3297139"/>
           </a:xfrm>
           <a:prstGeom prst="rect">
             <a:avLst/>
@@ -26643,36 +26642,6 @@
           <a:ln>
             <a:noFill/>
           </a:ln>
-        </p:spPr>
-      </p:pic>
-      <p:pic>
-        <p:nvPicPr>
-          <p:cNvPr id="5" name="Imagen 4">
-            <a:extLst>
-              <a:ext uri="{FF2B5EF4-FFF2-40B4-BE49-F238E27FC236}">
-                <a16:creationId xmlns:a16="http://schemas.microsoft.com/office/drawing/2014/main" id="{6ADB4F6F-F543-CFA5-15A3-09C5CE364D83}"/>
-              </a:ext>
-            </a:extLst>
-          </p:cNvPr>
-          <p:cNvPicPr>
-            <a:picLocks noChangeAspect="1"/>
-          </p:cNvPicPr>
-          <p:nvPr/>
-        </p:nvPicPr>
-        <p:blipFill>
-          <a:blip r:embed="rId4"/>
-          <a:stretch>
-            <a:fillRect/>
-          </a:stretch>
-        </p:blipFill>
-        <p:spPr>
-          <a:xfrm>
-            <a:off x="1412408" y="4165107"/>
-            <a:ext cx="9715819" cy="1785190"/>
-          </a:xfrm>
-          <a:prstGeom prst="rect">
-            <a:avLst/>
-          </a:prstGeom>
         </p:spPr>
       </p:pic>
     </p:spTree>
@@ -34424,666 +34393,6 @@
       </p:grpSpPr>
       <p:sp>
         <p:nvSpPr>
-          <p:cNvPr id="27" name="CuadroTexto 26">
-            <a:extLst>
-              <a:ext uri="{FF2B5EF4-FFF2-40B4-BE49-F238E27FC236}">
-                <a16:creationId xmlns:a16="http://schemas.microsoft.com/office/drawing/2014/main" id="{87B13D7A-39B9-23F1-8BBE-7195185A6185}"/>
-              </a:ext>
-            </a:extLst>
-          </p:cNvPr>
-          <p:cNvSpPr txBox="1"/>
-          <p:nvPr/>
-        </p:nvSpPr>
-        <p:spPr>
-          <a:xfrm>
-            <a:off x="4057621" y="367412"/>
-            <a:ext cx="4076757" cy="523220"/>
-          </a:xfrm>
-          <a:prstGeom prst="rect">
-            <a:avLst/>
-          </a:prstGeom>
-          <a:noFill/>
-        </p:spPr>
-        <p:txBody>
-          <a:bodyPr wrap="none" rtlCol="0">
-            <a:spAutoFit/>
-          </a:bodyPr>
-          <a:lstStyle/>
-          <a:p>
-            <a:r>
-              <a:rPr lang="es-MX" sz="2800" b="1" dirty="0">
-                <a:solidFill>
-                  <a:srgbClr val="FFFF00"/>
-                </a:solidFill>
-                <a:latin typeface="Raleway Black" pitchFamily="2" charset="0"/>
-                <a:ea typeface="Open Sans SemiBold" panose="020B0706030804020204" pitchFamily="34" charset="0"/>
-                <a:cs typeface="Open Sans SemiBold" panose="020B0706030804020204" pitchFamily="34" charset="0"/>
-              </a:rPr>
-              <a:t>FASE DE DESARROLLO</a:t>
-            </a:r>
-            <a:endParaRPr lang="en-US" sz="2800" b="1" dirty="0">
-              <a:solidFill>
-                <a:srgbClr val="FFFF00"/>
-              </a:solidFill>
-              <a:latin typeface="Raleway Black" pitchFamily="2" charset="0"/>
-              <a:ea typeface="Open Sans SemiBold" panose="020B0706030804020204" pitchFamily="34" charset="0"/>
-              <a:cs typeface="Open Sans SemiBold" panose="020B0706030804020204" pitchFamily="34" charset="0"/>
-            </a:endParaRPr>
-          </a:p>
-        </p:txBody>
-      </p:sp>
-      <p:pic>
-        <p:nvPicPr>
-          <p:cNvPr id="19" name="Imagen 18">
-            <a:extLst>
-              <a:ext uri="{FF2B5EF4-FFF2-40B4-BE49-F238E27FC236}">
-                <a16:creationId xmlns:a16="http://schemas.microsoft.com/office/drawing/2014/main" id="{9CFCF00A-BC29-624E-C884-59E3760894F7}"/>
-              </a:ext>
-            </a:extLst>
-          </p:cNvPr>
-          <p:cNvPicPr>
-            <a:picLocks noChangeAspect="1"/>
-          </p:cNvPicPr>
-          <p:nvPr/>
-        </p:nvPicPr>
-        <p:blipFill>
-          <a:blip r:embed="rId2" cstate="print">
-            <a:extLst>
-              <a:ext uri="{28A0092B-C50C-407E-A947-70E740481C1C}">
-                <a14:useLocalDpi xmlns:a14="http://schemas.microsoft.com/office/drawing/2010/main" val="0"/>
-              </a:ext>
-            </a:extLst>
-          </a:blip>
-          <a:srcRect/>
-          <a:stretch>
-            <a:fillRect/>
-          </a:stretch>
-        </p:blipFill>
-        <p:spPr bwMode="auto">
-          <a:xfrm>
-            <a:off x="275769" y="141153"/>
-            <a:ext cx="571538" cy="725117"/>
-          </a:xfrm>
-          <a:prstGeom prst="rect">
-            <a:avLst/>
-          </a:prstGeom>
-          <a:noFill/>
-          <a:ln>
-            <a:noFill/>
-          </a:ln>
-        </p:spPr>
-      </p:pic>
-      <p:sp>
-        <p:nvSpPr>
-          <p:cNvPr id="20" name="CuadroTexto 19">
-            <a:extLst>
-              <a:ext uri="{FF2B5EF4-FFF2-40B4-BE49-F238E27FC236}">
-                <a16:creationId xmlns:a16="http://schemas.microsoft.com/office/drawing/2014/main" id="{862420DE-757B-6285-AF97-EA1907B94B71}"/>
-              </a:ext>
-            </a:extLst>
-          </p:cNvPr>
-          <p:cNvSpPr txBox="1"/>
-          <p:nvPr/>
-        </p:nvSpPr>
-        <p:spPr>
-          <a:xfrm>
-            <a:off x="834865" y="272880"/>
-            <a:ext cx="914033" cy="461665"/>
-          </a:xfrm>
-          <a:prstGeom prst="rect">
-            <a:avLst/>
-          </a:prstGeom>
-          <a:noFill/>
-        </p:spPr>
-        <p:txBody>
-          <a:bodyPr wrap="none" rtlCol="0">
-            <a:spAutoFit/>
-          </a:bodyPr>
-          <a:lstStyle/>
-          <a:p>
-            <a:r>
-              <a:rPr lang="es-CO" sz="2400" dirty="0" err="1">
-                <a:solidFill>
-                  <a:schemeClr val="bg1"/>
-                </a:solidFill>
-                <a:latin typeface="Open Sans" panose="020B0606030504020204" pitchFamily="34" charset="0"/>
-                <a:ea typeface="Open Sans" panose="020B0606030504020204" pitchFamily="34" charset="0"/>
-                <a:cs typeface="Open Sans" panose="020B0606030504020204" pitchFamily="34" charset="0"/>
-              </a:rPr>
-              <a:t>USFX</a:t>
-            </a:r>
-            <a:endParaRPr lang="en-US" sz="2400" dirty="0">
-              <a:solidFill>
-                <a:schemeClr val="bg1"/>
-              </a:solidFill>
-              <a:latin typeface="Open Sans" panose="020B0606030504020204" pitchFamily="34" charset="0"/>
-              <a:ea typeface="Open Sans" panose="020B0606030504020204" pitchFamily="34" charset="0"/>
-              <a:cs typeface="Open Sans" panose="020B0606030504020204" pitchFamily="34" charset="0"/>
-            </a:endParaRPr>
-          </a:p>
-        </p:txBody>
-      </p:sp>
-      <p:sp>
-        <p:nvSpPr>
-          <p:cNvPr id="7" name="Marco 6">
-            <a:extLst>
-              <a:ext uri="{FF2B5EF4-FFF2-40B4-BE49-F238E27FC236}">
-                <a16:creationId xmlns:a16="http://schemas.microsoft.com/office/drawing/2014/main" id="{CEF553B4-F2FB-D91F-E50B-4696182BCFA2}"/>
-              </a:ext>
-            </a:extLst>
-          </p:cNvPr>
-          <p:cNvSpPr/>
-          <p:nvPr/>
-        </p:nvSpPr>
-        <p:spPr>
-          <a:xfrm rot="2700000">
-            <a:off x="11888099" y="777422"/>
-            <a:ext cx="1298862" cy="1266716"/>
-          </a:xfrm>
-          <a:prstGeom prst="frame">
-            <a:avLst>
-              <a:gd name="adj1" fmla="val 50000"/>
-            </a:avLst>
-          </a:prstGeom>
-          <a:noFill/>
-          <a:ln w="12700">
-            <a:solidFill>
-              <a:schemeClr val="bg1">
-                <a:alpha val="56000"/>
-              </a:schemeClr>
-            </a:solidFill>
-          </a:ln>
-          <a:effectLst>
-            <a:glow rad="228600">
-              <a:srgbClr val="FFFF00"/>
-            </a:glow>
-          </a:effectLst>
-          <a:scene3d>
-            <a:camera prst="isometricTopUp">
-              <a:rot lat="19476219" lon="18883143" rev="909743"/>
-            </a:camera>
-            <a:lightRig rig="twoPt" dir="t">
-              <a:rot lat="0" lon="0" rev="2400000"/>
-            </a:lightRig>
-          </a:scene3d>
-          <a:sp3d prstMaterial="matte">
-            <a:bevelT w="0" h="577850"/>
-            <a:bevelB w="0" h="0"/>
-          </a:sp3d>
-        </p:spPr>
-        <p:style>
-          <a:lnRef idx="2">
-            <a:schemeClr val="accent1">
-              <a:shade val="50000"/>
-            </a:schemeClr>
-          </a:lnRef>
-          <a:fillRef idx="1">
-            <a:schemeClr val="accent1"/>
-          </a:fillRef>
-          <a:effectRef idx="0">
-            <a:schemeClr val="accent1"/>
-          </a:effectRef>
-          <a:fontRef idx="minor">
-            <a:schemeClr val="lt1"/>
-          </a:fontRef>
-        </p:style>
-        <p:txBody>
-          <a:bodyPr rtlCol="0" anchor="ctr"/>
-          <a:lstStyle/>
-          <a:p>
-            <a:pPr algn="ctr"/>
-            <a:endParaRPr lang="en-US">
-              <a:solidFill>
-                <a:schemeClr val="tx1"/>
-              </a:solidFill>
-            </a:endParaRPr>
-          </a:p>
-        </p:txBody>
-      </p:sp>
-      <p:sp>
-        <p:nvSpPr>
-          <p:cNvPr id="8" name="Marco 7">
-            <a:extLst>
-              <a:ext uri="{FF2B5EF4-FFF2-40B4-BE49-F238E27FC236}">
-                <a16:creationId xmlns:a16="http://schemas.microsoft.com/office/drawing/2014/main" id="{FB274F02-1315-4EAC-622A-BB23E106B52E}"/>
-              </a:ext>
-            </a:extLst>
-          </p:cNvPr>
-          <p:cNvSpPr/>
-          <p:nvPr/>
-        </p:nvSpPr>
-        <p:spPr>
-          <a:xfrm>
-            <a:off x="-649431" y="5449312"/>
-            <a:ext cx="1298862" cy="1266716"/>
-          </a:xfrm>
-          <a:prstGeom prst="frame">
-            <a:avLst>
-              <a:gd name="adj1" fmla="val 50000"/>
-            </a:avLst>
-          </a:prstGeom>
-          <a:noFill/>
-          <a:ln w="12700">
-            <a:solidFill>
-              <a:schemeClr val="bg1">
-                <a:alpha val="56000"/>
-              </a:schemeClr>
-            </a:solidFill>
-          </a:ln>
-          <a:effectLst>
-            <a:glow rad="228600">
-              <a:srgbClr val="FFFF00"/>
-            </a:glow>
-          </a:effectLst>
-          <a:scene3d>
-            <a:camera prst="isometricTopUp">
-              <a:rot lat="19476219" lon="18883143" rev="909743"/>
-            </a:camera>
-            <a:lightRig rig="twoPt" dir="t">
-              <a:rot lat="0" lon="0" rev="2400000"/>
-            </a:lightRig>
-          </a:scene3d>
-          <a:sp3d prstMaterial="matte">
-            <a:bevelT w="0" h="577850"/>
-            <a:bevelB w="0" h="0"/>
-          </a:sp3d>
-        </p:spPr>
-        <p:style>
-          <a:lnRef idx="2">
-            <a:schemeClr val="accent1">
-              <a:shade val="50000"/>
-            </a:schemeClr>
-          </a:lnRef>
-          <a:fillRef idx="1">
-            <a:schemeClr val="accent1"/>
-          </a:fillRef>
-          <a:effectRef idx="0">
-            <a:schemeClr val="accent1"/>
-          </a:effectRef>
-          <a:fontRef idx="minor">
-            <a:schemeClr val="lt1"/>
-          </a:fontRef>
-        </p:style>
-        <p:txBody>
-          <a:bodyPr rtlCol="0" anchor="ctr"/>
-          <a:lstStyle/>
-          <a:p>
-            <a:pPr algn="ctr"/>
-            <a:endParaRPr lang="en-US">
-              <a:solidFill>
-                <a:schemeClr val="tx1"/>
-              </a:solidFill>
-            </a:endParaRPr>
-          </a:p>
-        </p:txBody>
-      </p:sp>
-      <p:sp>
-        <p:nvSpPr>
-          <p:cNvPr id="9" name="Marco 8">
-            <a:extLst>
-              <a:ext uri="{FF2B5EF4-FFF2-40B4-BE49-F238E27FC236}">
-                <a16:creationId xmlns:a16="http://schemas.microsoft.com/office/drawing/2014/main" id="{AA9643C4-9F54-CEF2-9055-853C5EAA42A5}"/>
-              </a:ext>
-            </a:extLst>
-          </p:cNvPr>
-          <p:cNvSpPr/>
-          <p:nvPr/>
-        </p:nvSpPr>
-        <p:spPr>
-          <a:xfrm rot="17004837">
-            <a:off x="10618177" y="5304026"/>
-            <a:ext cx="1298862" cy="1266716"/>
-          </a:xfrm>
-          <a:prstGeom prst="frame">
-            <a:avLst>
-              <a:gd name="adj1" fmla="val 50000"/>
-            </a:avLst>
-          </a:prstGeom>
-          <a:noFill/>
-          <a:ln w="12700">
-            <a:solidFill>
-              <a:schemeClr val="bg1">
-                <a:alpha val="56000"/>
-              </a:schemeClr>
-            </a:solidFill>
-          </a:ln>
-          <a:effectLst>
-            <a:glow rad="228600">
-              <a:srgbClr val="FFFF00"/>
-            </a:glow>
-          </a:effectLst>
-          <a:scene3d>
-            <a:camera prst="isometricTopUp">
-              <a:rot lat="19476219" lon="18883143" rev="909743"/>
-            </a:camera>
-            <a:lightRig rig="twoPt" dir="t">
-              <a:rot lat="0" lon="0" rev="2400000"/>
-            </a:lightRig>
-          </a:scene3d>
-          <a:sp3d prstMaterial="matte">
-            <a:bevelT w="0" h="577850"/>
-            <a:bevelB w="0" h="0"/>
-          </a:sp3d>
-        </p:spPr>
-        <p:style>
-          <a:lnRef idx="2">
-            <a:schemeClr val="accent1">
-              <a:shade val="50000"/>
-            </a:schemeClr>
-          </a:lnRef>
-          <a:fillRef idx="1">
-            <a:schemeClr val="accent1"/>
-          </a:fillRef>
-          <a:effectRef idx="0">
-            <a:schemeClr val="accent1"/>
-          </a:effectRef>
-          <a:fontRef idx="minor">
-            <a:schemeClr val="lt1"/>
-          </a:fontRef>
-        </p:style>
-        <p:txBody>
-          <a:bodyPr rtlCol="0" anchor="ctr"/>
-          <a:lstStyle/>
-          <a:p>
-            <a:pPr algn="ctr"/>
-            <a:endParaRPr lang="en-US">
-              <a:solidFill>
-                <a:schemeClr val="tx1"/>
-              </a:solidFill>
-            </a:endParaRPr>
-          </a:p>
-        </p:txBody>
-      </p:sp>
-      <p:sp>
-        <p:nvSpPr>
-          <p:cNvPr id="2" name="CuadroTexto 1">
-            <a:extLst>
-              <a:ext uri="{FF2B5EF4-FFF2-40B4-BE49-F238E27FC236}">
-                <a16:creationId xmlns:a16="http://schemas.microsoft.com/office/drawing/2014/main" id="{2ED7D00C-0029-A804-E23C-632FB9FA4253}"/>
-              </a:ext>
-            </a:extLst>
-          </p:cNvPr>
-          <p:cNvSpPr txBox="1"/>
-          <p:nvPr/>
-        </p:nvSpPr>
-        <p:spPr>
-          <a:xfrm>
-            <a:off x="341191" y="1132909"/>
-            <a:ext cx="11289270" cy="3754874"/>
-          </a:xfrm>
-          <a:prstGeom prst="rect">
-            <a:avLst/>
-          </a:prstGeom>
-          <a:noFill/>
-        </p:spPr>
-        <p:txBody>
-          <a:bodyPr wrap="square" rtlCol="0">
-            <a:spAutoFit/>
-          </a:bodyPr>
-          <a:lstStyle/>
-          <a:p>
-            <a:r>
-              <a:rPr lang="es-MX" sz="2200" b="1" dirty="0">
-                <a:solidFill>
-                  <a:srgbClr val="FFFF00"/>
-                </a:solidFill>
-                <a:latin typeface="Raleway Black" pitchFamily="2" charset="0"/>
-                <a:ea typeface="Open Sans SemiBold" panose="020B0706030804020204" pitchFamily="34" charset="0"/>
-                <a:cs typeface="Open Sans SemiBold" panose="020B0706030804020204" pitchFamily="34" charset="0"/>
-              </a:rPr>
-              <a:t>Sistema Generador de CSS</a:t>
-            </a:r>
-          </a:p>
-          <a:p>
-            <a:endParaRPr lang="es-MX" b="1" dirty="0">
-              <a:solidFill>
-                <a:schemeClr val="bg1"/>
-              </a:solidFill>
-              <a:latin typeface="Raleway Black" pitchFamily="2" charset="0"/>
-              <a:ea typeface="Open Sans SemiBold" panose="020B0706030804020204" pitchFamily="34" charset="0"/>
-              <a:cs typeface="Open Sans SemiBold" panose="020B0706030804020204" pitchFamily="34" charset="0"/>
-            </a:endParaRPr>
-          </a:p>
-          <a:p>
-            <a:pPr algn="just"/>
-            <a:r>
-              <a:rPr lang="es-MX" b="1" dirty="0">
-                <a:solidFill>
-                  <a:schemeClr val="bg1"/>
-                </a:solidFill>
-                <a:latin typeface="Raleway Black" pitchFamily="2" charset="0"/>
-                <a:ea typeface="Open Sans SemiBold" panose="020B0706030804020204" pitchFamily="34" charset="0"/>
-                <a:cs typeface="Open Sans SemiBold" panose="020B0706030804020204" pitchFamily="34" charset="0"/>
-              </a:rPr>
-              <a:t>Una vez que el Modelo ha sido entrenado cumpliendo con la precisión esperada, y se implementó una API para enviar peticiones al Modelo para generar código CSS, se desarrolló un sistema generador de código CSS que utiliza la API y el Modelo generador de código CSS.</a:t>
-            </a:r>
-          </a:p>
-          <a:p>
-            <a:endParaRPr lang="es-MX" b="1" dirty="0">
-              <a:solidFill>
-                <a:schemeClr val="bg1"/>
-              </a:solidFill>
-              <a:latin typeface="Raleway Black" pitchFamily="2" charset="0"/>
-              <a:ea typeface="Open Sans SemiBold" panose="020B0706030804020204" pitchFamily="34" charset="0"/>
-              <a:cs typeface="Open Sans SemiBold" panose="020B0706030804020204" pitchFamily="34" charset="0"/>
-            </a:endParaRPr>
-          </a:p>
-          <a:p>
-            <a:r>
-              <a:rPr lang="es-MX" b="1" dirty="0">
-                <a:solidFill>
-                  <a:srgbClr val="FFFF00"/>
-                </a:solidFill>
-                <a:latin typeface="Raleway Black" pitchFamily="2" charset="0"/>
-                <a:ea typeface="Open Sans SemiBold" panose="020B0706030804020204" pitchFamily="34" charset="0"/>
-                <a:cs typeface="Open Sans SemiBold" panose="020B0706030804020204" pitchFamily="34" charset="0"/>
-              </a:rPr>
-              <a:t>Se implemento diversos componentes en el Sistema generador de CSS los cuales son: </a:t>
-            </a:r>
-          </a:p>
-          <a:p>
-            <a:endParaRPr lang="es-MX" b="1" dirty="0">
-              <a:solidFill>
-                <a:schemeClr val="bg1"/>
-              </a:solidFill>
-              <a:latin typeface="Raleway Black" pitchFamily="2" charset="0"/>
-              <a:ea typeface="Open Sans SemiBold" panose="020B0706030804020204" pitchFamily="34" charset="0"/>
-              <a:cs typeface="Open Sans SemiBold" panose="020B0706030804020204" pitchFamily="34" charset="0"/>
-            </a:endParaRPr>
-          </a:p>
-          <a:p>
-            <a:pPr marL="3486150" lvl="7" indent="-285750">
-              <a:buFont typeface="Arial" panose="020B0604020202020204" pitchFamily="34" charset="0"/>
-              <a:buChar char="•"/>
-            </a:pPr>
-            <a:r>
-              <a:rPr lang="es-MX" b="1" dirty="0">
-                <a:solidFill>
-                  <a:schemeClr val="bg1"/>
-                </a:solidFill>
-                <a:latin typeface="Raleway Black" pitchFamily="2" charset="0"/>
-                <a:ea typeface="Open Sans SemiBold" panose="020B0706030804020204" pitchFamily="34" charset="0"/>
-                <a:cs typeface="Open Sans SemiBold" panose="020B0706030804020204" pitchFamily="34" charset="0"/>
-              </a:rPr>
-              <a:t>Barra de navegación vertical </a:t>
-            </a:r>
-          </a:p>
-          <a:p>
-            <a:pPr marL="3486150" lvl="7" indent="-285750">
-              <a:buFont typeface="Arial" panose="020B0604020202020204" pitchFamily="34" charset="0"/>
-              <a:buChar char="•"/>
-            </a:pPr>
-            <a:r>
-              <a:rPr lang="es-MX" b="1" dirty="0">
-                <a:solidFill>
-                  <a:schemeClr val="bg1"/>
-                </a:solidFill>
-                <a:latin typeface="Raleway Black" pitchFamily="2" charset="0"/>
-                <a:ea typeface="Open Sans SemiBold" panose="020B0706030804020204" pitchFamily="34" charset="0"/>
-                <a:cs typeface="Open Sans SemiBold" panose="020B0706030804020204" pitchFamily="34" charset="0"/>
-              </a:rPr>
-              <a:t>Visualizador </a:t>
-            </a:r>
-          </a:p>
-          <a:p>
-            <a:pPr marL="3486150" lvl="7" indent="-285750">
-              <a:buFont typeface="Arial" panose="020B0604020202020204" pitchFamily="34" charset="0"/>
-              <a:buChar char="•"/>
-            </a:pPr>
-            <a:r>
-              <a:rPr lang="es-MX" b="1" dirty="0">
-                <a:solidFill>
-                  <a:schemeClr val="bg1"/>
-                </a:solidFill>
-                <a:latin typeface="Raleway Black" pitchFamily="2" charset="0"/>
-                <a:ea typeface="Open Sans SemiBold" panose="020B0706030804020204" pitchFamily="34" charset="0"/>
-                <a:cs typeface="Open Sans SemiBold" panose="020B0706030804020204" pitchFamily="34" charset="0"/>
-              </a:rPr>
-              <a:t>Inicio de sesión </a:t>
-            </a:r>
-          </a:p>
-          <a:p>
-            <a:pPr marL="3486150" lvl="7" indent="-285750">
-              <a:buFont typeface="Arial" panose="020B0604020202020204" pitchFamily="34" charset="0"/>
-              <a:buChar char="•"/>
-            </a:pPr>
-            <a:r>
-              <a:rPr lang="es-MX" b="1" dirty="0">
-                <a:solidFill>
-                  <a:schemeClr val="bg1"/>
-                </a:solidFill>
-                <a:latin typeface="Raleway Black" pitchFamily="2" charset="0"/>
-                <a:ea typeface="Open Sans SemiBold" panose="020B0706030804020204" pitchFamily="34" charset="0"/>
-                <a:cs typeface="Open Sans SemiBold" panose="020B0706030804020204" pitchFamily="34" charset="0"/>
-              </a:rPr>
-              <a:t>Historial</a:t>
-            </a:r>
-          </a:p>
-          <a:p>
-            <a:endParaRPr lang="es-MX" b="1" dirty="0">
-              <a:solidFill>
-                <a:schemeClr val="bg1"/>
-              </a:solidFill>
-              <a:latin typeface="Raleway Black" pitchFamily="2" charset="0"/>
-              <a:ea typeface="Open Sans SemiBold" panose="020B0706030804020204" pitchFamily="34" charset="0"/>
-              <a:cs typeface="Open Sans SemiBold" panose="020B0706030804020204" pitchFamily="34" charset="0"/>
-            </a:endParaRPr>
-          </a:p>
-        </p:txBody>
-      </p:sp>
-      <p:sp>
-        <p:nvSpPr>
-          <p:cNvPr id="5" name="Rectangle 3">
-            <a:extLst>
-              <a:ext uri="{FF2B5EF4-FFF2-40B4-BE49-F238E27FC236}">
-                <a16:creationId xmlns:a16="http://schemas.microsoft.com/office/drawing/2014/main" id="{B46411D0-ABD2-9593-C95A-5D800F65A7FD}"/>
-              </a:ext>
-            </a:extLst>
-          </p:cNvPr>
-          <p:cNvSpPr>
-            <a:spLocks noChangeArrowheads="1"/>
-          </p:cNvSpPr>
-          <p:nvPr/>
-        </p:nvSpPr>
-        <p:spPr bwMode="auto">
-          <a:xfrm>
-            <a:off x="1194386" y="6055423"/>
-            <a:ext cx="12192000" cy="0"/>
-          </a:xfrm>
-          <a:prstGeom prst="rect">
-            <a:avLst/>
-          </a:prstGeom>
-          <a:noFill/>
-          <a:ln>
-            <a:noFill/>
-          </a:ln>
-          <a:effectLst/>
-          <a:extLst>
-            <a:ext uri="{909E8E84-426E-40DD-AFC4-6F175D3DCCD1}">
-              <a14:hiddenFill xmlns:a14="http://schemas.microsoft.com/office/drawing/2010/main">
-                <a:solidFill>
-                  <a:schemeClr val="accent1"/>
-                </a:solidFill>
-              </a14:hiddenFill>
-            </a:ext>
-            <a:ext uri="{91240B29-F687-4F45-9708-019B960494DF}">
-              <a14:hiddenLine xmlns:a14="http://schemas.microsoft.com/office/drawing/2010/main" w="9525">
-                <a:solidFill>
-                  <a:schemeClr val="tx1"/>
-                </a:solidFill>
-                <a:miter lim="800000"/>
-                <a:headEnd/>
-                <a:tailEnd/>
-              </a14:hiddenLine>
-            </a:ext>
-            <a:ext uri="{AF507438-7753-43E0-B8FC-AC1667EBCBE1}">
-              <a14:hiddenEffects xmlns:a14="http://schemas.microsoft.com/office/drawing/2010/main">
-                <a:effectLst>
-                  <a:outerShdw dist="35921" dir="2700000" algn="ctr" rotWithShape="0">
-                    <a:schemeClr val="bg2"/>
-                  </a:outerShdw>
-                </a:effectLst>
-              </a14:hiddenEffects>
-            </a:ext>
-          </a:extLst>
-        </p:spPr>
-        <p:txBody>
-          <a:bodyPr vert="horz" wrap="none" lIns="91440" tIns="45720" rIns="91440" bIns="45720" numCol="1" anchor="ctr" anchorCtr="0" compatLnSpc="1">
-            <a:prstTxWarp prst="textNoShape">
-              <a:avLst/>
-            </a:prstTxWarp>
-            <a:spAutoFit/>
-          </a:bodyPr>
-          <a:lstStyle/>
-          <a:p>
-            <a:endParaRPr lang="es-ES"/>
-          </a:p>
-        </p:txBody>
-      </p:sp>
-    </p:spTree>
-    <p:extLst>
-      <p:ext uri="{BB962C8B-B14F-4D97-AF65-F5344CB8AC3E}">
-        <p14:creationId xmlns:p14="http://schemas.microsoft.com/office/powerpoint/2010/main" val="2430271893"/>
-      </p:ext>
-    </p:extLst>
-  </p:cSld>
-  <p:clrMapOvr>
-    <a:masterClrMapping/>
-  </p:clrMapOvr>
-  <mc:AlternateContent xmlns:mc="http://schemas.openxmlformats.org/markup-compatibility/2006" xmlns:p159="http://schemas.microsoft.com/office/powerpoint/2015/09/main">
-    <mc:Choice Requires="p159">
-      <p:transition xmlns:p14="http://schemas.microsoft.com/office/powerpoint/2010/main" spd="slow" p14:dur="2000">
-        <p159:morph option="byObject"/>
-      </p:transition>
-    </mc:Choice>
-    <mc:Fallback xmlns="">
-      <p:transition spd="slow">
-        <p:fade/>
-      </p:transition>
-    </mc:Fallback>
-  </mc:AlternateContent>
-</p:sld>
-</file>
-
-<file path=ppt/slides/slide43.xml><?xml version="1.0" encoding="utf-8"?>
-<p:sld xmlns:a="http://schemas.openxmlformats.org/drawingml/2006/main" xmlns:r="http://schemas.openxmlformats.org/officeDocument/2006/relationships" xmlns:p="http://schemas.openxmlformats.org/presentationml/2006/main">
-  <p:cSld>
-    <p:spTree>
-      <p:nvGrpSpPr>
-        <p:cNvPr id="1" name=""/>
-        <p:cNvGrpSpPr/>
-        <p:nvPr/>
-      </p:nvGrpSpPr>
-      <p:grpSpPr>
-        <a:xfrm>
-          <a:off x="0" y="0"/>
-          <a:ext cx="0" cy="0"/>
-          <a:chOff x="0" y="0"/>
-          <a:chExt cx="0" cy="0"/>
-        </a:xfrm>
-      </p:grpSpPr>
-      <p:sp>
-        <p:nvSpPr>
           <p:cNvPr id="6" name="Marco 5">
             <a:extLst>
               <a:ext uri="{FF2B5EF4-FFF2-40B4-BE49-F238E27FC236}">
@@ -36340,7 +35649,7 @@
 </p:sld>
 </file>
 
-<file path=ppt/slides/slide44.xml><?xml version="1.0" encoding="utf-8"?>
+<file path=ppt/slides/slide43.xml><?xml version="1.0" encoding="utf-8"?>
 <p:sld xmlns:a="http://schemas.openxmlformats.org/drawingml/2006/main" xmlns:r="http://schemas.openxmlformats.org/officeDocument/2006/relationships" xmlns:p="http://schemas.openxmlformats.org/presentationml/2006/main">
   <p:cSld>
     <p:spTree>
@@ -36395,7 +35704,7 @@
                 <a:ea typeface="Open Sans SemiBold" panose="020B0706030804020204" pitchFamily="34" charset="0"/>
                 <a:cs typeface="Open Sans SemiBold" panose="020B0706030804020204" pitchFamily="34" charset="0"/>
               </a:rPr>
-              <a:t>El análisis bibliográfico ha proporcionado una base teórica sólida para el desarrollo de un modelo de inteligencia artificial que genera código CSS mediante procesamiento del lenguaje natural. Se diseñó un modelo que traduce etiquetas HTML en estilos CSS coherentes, reduciendo código repetitivo también se implemento, un prototipo de aplicación web permite a los usuarios ver vistas generadas en tiempo real al introducir etiquetas HTML, facilitando el diseño de páginas web. La aplicación presenta una interfaz intuitiva, permitiendo interacción sencilla sin conocimientos profundos de CSS. </a:t>
+              <a:t>El análisis bibliográfico ha proporcionado una base teórica sólida para el desarrollo de un modelo de inteligencia artificial que genera código CSS mediante procesamiento del lenguaje natural. Se diseñó un modelo que traduce etiquetas HTML en estilos CSS coherentes, también se implemento, un prototipo de aplicación web permite a los usuarios ver vistas generadas en tiempo real al introducir etiquetas HTML y un color, facilitando el diseño de páginas web. La aplicación presenta una interfaz intuitiva, permitiendo interacción sencilla sin conocimientos profundos de CSS. </a:t>
             </a:r>
           </a:p>
         </p:txBody>
@@ -36819,6 +36128,528 @@
     <p:extLst>
       <p:ext uri="{BB962C8B-B14F-4D97-AF65-F5344CB8AC3E}">
         <p14:creationId xmlns:p14="http://schemas.microsoft.com/office/powerpoint/2010/main" val="3610692895"/>
+      </p:ext>
+    </p:extLst>
+  </p:cSld>
+  <p:clrMapOvr>
+    <a:masterClrMapping/>
+  </p:clrMapOvr>
+  <mc:AlternateContent xmlns:mc="http://schemas.openxmlformats.org/markup-compatibility/2006" xmlns:p159="http://schemas.microsoft.com/office/powerpoint/2015/09/main">
+    <mc:Choice Requires="p159">
+      <p:transition xmlns:p14="http://schemas.microsoft.com/office/powerpoint/2010/main" spd="slow" p14:dur="2000">
+        <p159:morph option="byObject"/>
+      </p:transition>
+    </mc:Choice>
+    <mc:Fallback xmlns="">
+      <p:transition spd="slow">
+        <p:fade/>
+      </p:transition>
+    </mc:Fallback>
+  </mc:AlternateContent>
+</p:sld>
+</file>
+
+<file path=ppt/slides/slide44.xml><?xml version="1.0" encoding="utf-8"?>
+<p:sld xmlns:a="http://schemas.openxmlformats.org/drawingml/2006/main" xmlns:r="http://schemas.openxmlformats.org/officeDocument/2006/relationships" xmlns:p="http://schemas.openxmlformats.org/presentationml/2006/main">
+  <p:cSld>
+    <p:spTree>
+      <p:nvGrpSpPr>
+        <p:cNvPr id="1" name=""/>
+        <p:cNvGrpSpPr/>
+        <p:nvPr/>
+      </p:nvGrpSpPr>
+      <p:grpSpPr>
+        <a:xfrm>
+          <a:off x="0" y="0"/>
+          <a:ext cx="0" cy="0"/>
+          <a:chOff x="0" y="0"/>
+          <a:chExt cx="0" cy="0"/>
+        </a:xfrm>
+      </p:grpSpPr>
+      <p:sp>
+        <p:nvSpPr>
+          <p:cNvPr id="11" name="CuadroTexto 10">
+            <a:extLst>
+              <a:ext uri="{FF2B5EF4-FFF2-40B4-BE49-F238E27FC236}">
+                <a16:creationId xmlns:a16="http://schemas.microsoft.com/office/drawing/2014/main" id="{E6364B03-8BE8-6ED5-4CCE-26078AB0B956}"/>
+              </a:ext>
+            </a:extLst>
+          </p:cNvPr>
+          <p:cNvSpPr txBox="1"/>
+          <p:nvPr/>
+        </p:nvSpPr>
+        <p:spPr>
+          <a:xfrm>
+            <a:off x="1383435" y="1214047"/>
+            <a:ext cx="9425129" cy="2862322"/>
+          </a:xfrm>
+          <a:prstGeom prst="rect">
+            <a:avLst/>
+          </a:prstGeom>
+          <a:noFill/>
+        </p:spPr>
+        <p:txBody>
+          <a:bodyPr wrap="square" rtlCol="0">
+            <a:spAutoFit/>
+          </a:bodyPr>
+          <a:lstStyle/>
+          <a:p>
+            <a:pPr algn="just"/>
+            <a:r>
+              <a:rPr lang="es-MX" sz="2000" dirty="0">
+                <a:solidFill>
+                  <a:schemeClr val="bg1"/>
+                </a:solidFill>
+                <a:latin typeface="Raleway Black" pitchFamily="2" charset="0"/>
+                <a:ea typeface="Open Sans SemiBold" panose="020B0706030804020204" pitchFamily="34" charset="0"/>
+                <a:cs typeface="Open Sans SemiBold" panose="020B0706030804020204" pitchFamily="34" charset="0"/>
+              </a:rPr>
+              <a:t>Se recomienda mejorar el entrenamiento del modelo generador de código CSS para que generalice mejor y optimice su rendimiento, permitiendo su empaquetado y uso por otros ingenieros de software. Además, futuras versiones del software deberían generar múltiples alternativas de estilos CSS, enriqueciendo la experiencia del usuario y aumentando la flexibilidad del diseño. La iniciativa del proyecto debería replicarse en diversas tecnologías actuales, y se recomienda experimentar con diferentes modelos </a:t>
+            </a:r>
+            <a:r>
+              <a:rPr lang="es-MX" sz="2000" dirty="0" err="1">
+                <a:solidFill>
+                  <a:schemeClr val="bg1"/>
+                </a:solidFill>
+                <a:latin typeface="Raleway Black" pitchFamily="2" charset="0"/>
+                <a:ea typeface="Open Sans SemiBold" panose="020B0706030804020204" pitchFamily="34" charset="0"/>
+                <a:cs typeface="Open Sans SemiBold" panose="020B0706030804020204" pitchFamily="34" charset="0"/>
+              </a:rPr>
+              <a:t>pre-entrenados</a:t>
+            </a:r>
+            <a:r>
+              <a:rPr lang="es-MX" sz="2000" dirty="0">
+                <a:solidFill>
+                  <a:schemeClr val="bg1"/>
+                </a:solidFill>
+                <a:latin typeface="Raleway Black" pitchFamily="2" charset="0"/>
+                <a:ea typeface="Open Sans SemiBold" panose="020B0706030804020204" pitchFamily="34" charset="0"/>
+                <a:cs typeface="Open Sans SemiBold" panose="020B0706030804020204" pitchFamily="34" charset="0"/>
+              </a:rPr>
+              <a:t> para mejorar los generadores de código.</a:t>
+            </a:r>
+          </a:p>
+        </p:txBody>
+      </p:sp>
+      <p:sp>
+        <p:nvSpPr>
+          <p:cNvPr id="27" name="CuadroTexto 26">
+            <a:extLst>
+              <a:ext uri="{FF2B5EF4-FFF2-40B4-BE49-F238E27FC236}">
+                <a16:creationId xmlns:a16="http://schemas.microsoft.com/office/drawing/2014/main" id="{87B13D7A-39B9-23F1-8BBE-7195185A6185}"/>
+              </a:ext>
+            </a:extLst>
+          </p:cNvPr>
+          <p:cNvSpPr txBox="1"/>
+          <p:nvPr/>
+        </p:nvSpPr>
+        <p:spPr>
+          <a:xfrm>
+            <a:off x="4056764" y="472935"/>
+            <a:ext cx="3794629" cy="523220"/>
+          </a:xfrm>
+          <a:prstGeom prst="rect">
+            <a:avLst/>
+          </a:prstGeom>
+          <a:noFill/>
+        </p:spPr>
+        <p:txBody>
+          <a:bodyPr wrap="none" rtlCol="0">
+            <a:spAutoFit/>
+          </a:bodyPr>
+          <a:lstStyle/>
+          <a:p>
+            <a:r>
+              <a:rPr lang="es-CO" sz="2800" dirty="0">
+                <a:solidFill>
+                  <a:srgbClr val="F03CED"/>
+                </a:solidFill>
+                <a:latin typeface="Raleway Black" pitchFamily="2" charset="0"/>
+                <a:ea typeface="Open Sans SemiBold" panose="020B0706030804020204" pitchFamily="34" charset="0"/>
+                <a:cs typeface="Open Sans SemiBold" panose="020B0706030804020204" pitchFamily="34" charset="0"/>
+              </a:rPr>
+              <a:t>RECOMENDACIONES</a:t>
+            </a:r>
+            <a:endParaRPr lang="en-US" sz="2800" dirty="0">
+              <a:solidFill>
+                <a:srgbClr val="F03CED"/>
+              </a:solidFill>
+              <a:latin typeface="Raleway Black" pitchFamily="2" charset="0"/>
+              <a:ea typeface="Open Sans SemiBold" panose="020B0706030804020204" pitchFamily="34" charset="0"/>
+              <a:cs typeface="Open Sans SemiBold" panose="020B0706030804020204" pitchFamily="34" charset="0"/>
+            </a:endParaRPr>
+          </a:p>
+        </p:txBody>
+      </p:sp>
+      <p:pic>
+        <p:nvPicPr>
+          <p:cNvPr id="19" name="Imagen 18">
+            <a:extLst>
+              <a:ext uri="{FF2B5EF4-FFF2-40B4-BE49-F238E27FC236}">
+                <a16:creationId xmlns:a16="http://schemas.microsoft.com/office/drawing/2014/main" id="{9CFCF00A-BC29-624E-C884-59E3760894F7}"/>
+              </a:ext>
+            </a:extLst>
+          </p:cNvPr>
+          <p:cNvPicPr>
+            <a:picLocks noChangeAspect="1"/>
+          </p:cNvPicPr>
+          <p:nvPr/>
+        </p:nvPicPr>
+        <p:blipFill>
+          <a:blip r:embed="rId2" cstate="print">
+            <a:extLst>
+              <a:ext uri="{28A0092B-C50C-407E-A947-70E740481C1C}">
+                <a14:useLocalDpi xmlns:a14="http://schemas.microsoft.com/office/drawing/2010/main" val="0"/>
+              </a:ext>
+            </a:extLst>
+          </a:blip>
+          <a:srcRect/>
+          <a:stretch>
+            <a:fillRect/>
+          </a:stretch>
+        </p:blipFill>
+        <p:spPr bwMode="auto">
+          <a:xfrm>
+            <a:off x="275769" y="141153"/>
+            <a:ext cx="571538" cy="725117"/>
+          </a:xfrm>
+          <a:prstGeom prst="rect">
+            <a:avLst/>
+          </a:prstGeom>
+          <a:noFill/>
+          <a:ln>
+            <a:noFill/>
+          </a:ln>
+        </p:spPr>
+      </p:pic>
+      <p:sp>
+        <p:nvSpPr>
+          <p:cNvPr id="20" name="CuadroTexto 19">
+            <a:extLst>
+              <a:ext uri="{FF2B5EF4-FFF2-40B4-BE49-F238E27FC236}">
+                <a16:creationId xmlns:a16="http://schemas.microsoft.com/office/drawing/2014/main" id="{862420DE-757B-6285-AF97-EA1907B94B71}"/>
+              </a:ext>
+            </a:extLst>
+          </p:cNvPr>
+          <p:cNvSpPr txBox="1"/>
+          <p:nvPr/>
+        </p:nvSpPr>
+        <p:spPr>
+          <a:xfrm>
+            <a:off x="834865" y="272880"/>
+            <a:ext cx="914033" cy="461665"/>
+          </a:xfrm>
+          <a:prstGeom prst="rect">
+            <a:avLst/>
+          </a:prstGeom>
+          <a:noFill/>
+        </p:spPr>
+        <p:txBody>
+          <a:bodyPr wrap="none" rtlCol="0">
+            <a:spAutoFit/>
+          </a:bodyPr>
+          <a:lstStyle/>
+          <a:p>
+            <a:r>
+              <a:rPr lang="es-CO" sz="2400" dirty="0" err="1">
+                <a:solidFill>
+                  <a:schemeClr val="bg1"/>
+                </a:solidFill>
+                <a:latin typeface="Open Sans" panose="020B0606030504020204" pitchFamily="34" charset="0"/>
+                <a:ea typeface="Open Sans" panose="020B0606030504020204" pitchFamily="34" charset="0"/>
+                <a:cs typeface="Open Sans" panose="020B0606030504020204" pitchFamily="34" charset="0"/>
+              </a:rPr>
+              <a:t>USFX</a:t>
+            </a:r>
+            <a:endParaRPr lang="en-US" sz="2400" dirty="0">
+              <a:solidFill>
+                <a:schemeClr val="bg1"/>
+              </a:solidFill>
+              <a:latin typeface="Open Sans" panose="020B0606030504020204" pitchFamily="34" charset="0"/>
+              <a:ea typeface="Open Sans" panose="020B0606030504020204" pitchFamily="34" charset="0"/>
+              <a:cs typeface="Open Sans" panose="020B0606030504020204" pitchFamily="34" charset="0"/>
+            </a:endParaRPr>
+          </a:p>
+        </p:txBody>
+      </p:sp>
+      <p:sp>
+        <p:nvSpPr>
+          <p:cNvPr id="2" name="Marco 1">
+            <a:extLst>
+              <a:ext uri="{FF2B5EF4-FFF2-40B4-BE49-F238E27FC236}">
+                <a16:creationId xmlns:a16="http://schemas.microsoft.com/office/drawing/2014/main" id="{9EE11A52-29B0-7E53-2BDB-6888EDB42876}"/>
+              </a:ext>
+            </a:extLst>
+          </p:cNvPr>
+          <p:cNvSpPr/>
+          <p:nvPr/>
+        </p:nvSpPr>
+        <p:spPr>
+          <a:xfrm rot="1015177">
+            <a:off x="157215" y="5626784"/>
+            <a:ext cx="1298862" cy="1266716"/>
+          </a:xfrm>
+          <a:prstGeom prst="frame">
+            <a:avLst>
+              <a:gd name="adj1" fmla="val 50000"/>
+            </a:avLst>
+          </a:prstGeom>
+          <a:noFill/>
+          <a:ln w="12700">
+            <a:solidFill>
+              <a:srgbClr val="E10DFF"/>
+            </a:solidFill>
+          </a:ln>
+          <a:effectLst>
+            <a:glow rad="228600">
+              <a:srgbClr val="8A14EC"/>
+            </a:glow>
+          </a:effectLst>
+          <a:scene3d>
+            <a:camera prst="isometricTopUp">
+              <a:rot lat="19476219" lon="18883143" rev="909743"/>
+            </a:camera>
+            <a:lightRig rig="twoPt" dir="t">
+              <a:rot lat="0" lon="0" rev="2400000"/>
+            </a:lightRig>
+          </a:scene3d>
+          <a:sp3d prstMaterial="matte">
+            <a:bevelT w="0" h="577850"/>
+            <a:bevelB w="0" h="0"/>
+          </a:sp3d>
+        </p:spPr>
+        <p:style>
+          <a:lnRef idx="2">
+            <a:schemeClr val="accent1">
+              <a:shade val="50000"/>
+            </a:schemeClr>
+          </a:lnRef>
+          <a:fillRef idx="1">
+            <a:schemeClr val="accent1"/>
+          </a:fillRef>
+          <a:effectRef idx="0">
+            <a:schemeClr val="accent1"/>
+          </a:effectRef>
+          <a:fontRef idx="minor">
+            <a:schemeClr val="lt1"/>
+          </a:fontRef>
+        </p:style>
+        <p:txBody>
+          <a:bodyPr rtlCol="0" anchor="ctr"/>
+          <a:lstStyle/>
+          <a:p>
+            <a:pPr algn="ctr"/>
+            <a:endParaRPr lang="en-US">
+              <a:solidFill>
+                <a:schemeClr val="tx1"/>
+              </a:solidFill>
+            </a:endParaRPr>
+          </a:p>
+        </p:txBody>
+      </p:sp>
+      <p:sp>
+        <p:nvSpPr>
+          <p:cNvPr id="3" name="Marco 2">
+            <a:extLst>
+              <a:ext uri="{FF2B5EF4-FFF2-40B4-BE49-F238E27FC236}">
+                <a16:creationId xmlns:a16="http://schemas.microsoft.com/office/drawing/2014/main" id="{F0AA8EC3-B8EF-0325-CF91-DF3376E835ED}"/>
+              </a:ext>
+            </a:extLst>
+          </p:cNvPr>
+          <p:cNvSpPr/>
+          <p:nvPr/>
+        </p:nvSpPr>
+        <p:spPr>
+          <a:xfrm rot="18693024">
+            <a:off x="5549963" y="6317924"/>
+            <a:ext cx="1298862" cy="1266716"/>
+          </a:xfrm>
+          <a:prstGeom prst="frame">
+            <a:avLst>
+              <a:gd name="adj1" fmla="val 50000"/>
+            </a:avLst>
+          </a:prstGeom>
+          <a:noFill/>
+          <a:ln w="12700">
+            <a:solidFill>
+              <a:srgbClr val="E10DFF"/>
+            </a:solidFill>
+          </a:ln>
+          <a:effectLst>
+            <a:glow rad="228600">
+              <a:srgbClr val="8A14EC"/>
+            </a:glow>
+          </a:effectLst>
+          <a:scene3d>
+            <a:camera prst="isometricTopUp">
+              <a:rot lat="19476219" lon="18883143" rev="909743"/>
+            </a:camera>
+            <a:lightRig rig="twoPt" dir="t">
+              <a:rot lat="0" lon="0" rev="2400000"/>
+            </a:lightRig>
+          </a:scene3d>
+          <a:sp3d prstMaterial="matte">
+            <a:bevelT w="0" h="577850"/>
+            <a:bevelB w="0" h="0"/>
+          </a:sp3d>
+        </p:spPr>
+        <p:style>
+          <a:lnRef idx="2">
+            <a:schemeClr val="accent1">
+              <a:shade val="50000"/>
+            </a:schemeClr>
+          </a:lnRef>
+          <a:fillRef idx="1">
+            <a:schemeClr val="accent1"/>
+          </a:fillRef>
+          <a:effectRef idx="0">
+            <a:schemeClr val="accent1"/>
+          </a:effectRef>
+          <a:fontRef idx="minor">
+            <a:schemeClr val="lt1"/>
+          </a:fontRef>
+        </p:style>
+        <p:txBody>
+          <a:bodyPr rtlCol="0" anchor="ctr"/>
+          <a:lstStyle/>
+          <a:p>
+            <a:pPr algn="ctr"/>
+            <a:endParaRPr lang="en-US">
+              <a:solidFill>
+                <a:schemeClr val="tx1"/>
+              </a:solidFill>
+            </a:endParaRPr>
+          </a:p>
+        </p:txBody>
+      </p:sp>
+      <p:sp>
+        <p:nvSpPr>
+          <p:cNvPr id="6" name="Marco 5">
+            <a:extLst>
+              <a:ext uri="{FF2B5EF4-FFF2-40B4-BE49-F238E27FC236}">
+                <a16:creationId xmlns:a16="http://schemas.microsoft.com/office/drawing/2014/main" id="{01B69663-0226-41F2-F178-6601FE0CE422}"/>
+              </a:ext>
+            </a:extLst>
+          </p:cNvPr>
+          <p:cNvSpPr/>
+          <p:nvPr/>
+        </p:nvSpPr>
+        <p:spPr>
+          <a:xfrm rot="17445565">
+            <a:off x="10980109" y="5626783"/>
+            <a:ext cx="1298862" cy="1266716"/>
+          </a:xfrm>
+          <a:prstGeom prst="frame">
+            <a:avLst>
+              <a:gd name="adj1" fmla="val 50000"/>
+            </a:avLst>
+          </a:prstGeom>
+          <a:noFill/>
+          <a:ln w="12700">
+            <a:solidFill>
+              <a:srgbClr val="E10DFF"/>
+            </a:solidFill>
+          </a:ln>
+          <a:effectLst>
+            <a:glow rad="228600">
+              <a:srgbClr val="8A14EC"/>
+            </a:glow>
+          </a:effectLst>
+          <a:scene3d>
+            <a:camera prst="isometricTopUp">
+              <a:rot lat="19476219" lon="18883143" rev="909743"/>
+            </a:camera>
+            <a:lightRig rig="twoPt" dir="t">
+              <a:rot lat="0" lon="0" rev="2400000"/>
+            </a:lightRig>
+          </a:scene3d>
+          <a:sp3d prstMaterial="matte">
+            <a:bevelT w="0" h="577850"/>
+            <a:bevelB w="0" h="0"/>
+          </a:sp3d>
+        </p:spPr>
+        <p:style>
+          <a:lnRef idx="2">
+            <a:schemeClr val="accent1">
+              <a:shade val="50000"/>
+            </a:schemeClr>
+          </a:lnRef>
+          <a:fillRef idx="1">
+            <a:schemeClr val="accent1"/>
+          </a:fillRef>
+          <a:effectRef idx="0">
+            <a:schemeClr val="accent1"/>
+          </a:effectRef>
+          <a:fontRef idx="minor">
+            <a:schemeClr val="lt1"/>
+          </a:fontRef>
+        </p:style>
+        <p:txBody>
+          <a:bodyPr rtlCol="0" anchor="ctr"/>
+          <a:lstStyle/>
+          <a:p>
+            <a:pPr algn="ctr"/>
+            <a:endParaRPr lang="en-US" dirty="0">
+              <a:solidFill>
+                <a:schemeClr val="tx1"/>
+              </a:solidFill>
+            </a:endParaRPr>
+          </a:p>
+        </p:txBody>
+      </p:sp>
+      <p:sp>
+        <p:nvSpPr>
+          <p:cNvPr id="9" name="CuadroTexto 8">
+            <a:extLst>
+              <a:ext uri="{FF2B5EF4-FFF2-40B4-BE49-F238E27FC236}">
+                <a16:creationId xmlns:a16="http://schemas.microsoft.com/office/drawing/2014/main" id="{7E34B77F-32EA-90BF-1AA8-420BC5726BF4}"/>
+              </a:ext>
+            </a:extLst>
+          </p:cNvPr>
+          <p:cNvSpPr txBox="1"/>
+          <p:nvPr/>
+        </p:nvSpPr>
+        <p:spPr>
+          <a:xfrm>
+            <a:off x="1149150" y="1113212"/>
+            <a:ext cx="184731" cy="769441"/>
+          </a:xfrm>
+          <a:prstGeom prst="rect">
+            <a:avLst/>
+          </a:prstGeom>
+          <a:noFill/>
+        </p:spPr>
+        <p:txBody>
+          <a:bodyPr wrap="none" rtlCol="0">
+            <a:spAutoFit/>
+          </a:bodyPr>
+          <a:lstStyle/>
+          <a:p>
+            <a:endParaRPr lang="es-CO" sz="2200" dirty="0">
+              <a:solidFill>
+                <a:srgbClr val="F03CED"/>
+              </a:solidFill>
+              <a:latin typeface="Raleway Black" pitchFamily="2" charset="0"/>
+              <a:ea typeface="Open Sans SemiBold" panose="020B0706030804020204" pitchFamily="34" charset="0"/>
+              <a:cs typeface="Open Sans SemiBold" panose="020B0706030804020204" pitchFamily="34" charset="0"/>
+            </a:endParaRPr>
+          </a:p>
+          <a:p>
+            <a:endParaRPr lang="en-US" sz="2200" dirty="0">
+              <a:solidFill>
+                <a:srgbClr val="F03CED"/>
+              </a:solidFill>
+              <a:latin typeface="Raleway Black" pitchFamily="2" charset="0"/>
+              <a:ea typeface="Open Sans SemiBold" panose="020B0706030804020204" pitchFamily="34" charset="0"/>
+              <a:cs typeface="Open Sans SemiBold" panose="020B0706030804020204" pitchFamily="34" charset="0"/>
+            </a:endParaRPr>
+          </a:p>
+        </p:txBody>
+      </p:sp>
+    </p:spTree>
+    <p:extLst>
+      <p:ext uri="{BB962C8B-B14F-4D97-AF65-F5344CB8AC3E}">
+        <p14:creationId xmlns:p14="http://schemas.microsoft.com/office/powerpoint/2010/main" val="2665606798"/>
       </p:ext>
     </p:extLst>
   </p:cSld>
@@ -36857,528 +36688,6 @@
           <a:chExt cx="0" cy="0"/>
         </a:xfrm>
       </p:grpSpPr>
-      <p:sp>
-        <p:nvSpPr>
-          <p:cNvPr id="11" name="CuadroTexto 10">
-            <a:extLst>
-              <a:ext uri="{FF2B5EF4-FFF2-40B4-BE49-F238E27FC236}">
-                <a16:creationId xmlns:a16="http://schemas.microsoft.com/office/drawing/2014/main" id="{E6364B03-8BE8-6ED5-4CCE-26078AB0B956}"/>
-              </a:ext>
-            </a:extLst>
-          </p:cNvPr>
-          <p:cNvSpPr txBox="1"/>
-          <p:nvPr/>
-        </p:nvSpPr>
-        <p:spPr>
-          <a:xfrm>
-            <a:off x="1383435" y="1214047"/>
-            <a:ext cx="9425129" cy="2862322"/>
-          </a:xfrm>
-          <a:prstGeom prst="rect">
-            <a:avLst/>
-          </a:prstGeom>
-          <a:noFill/>
-        </p:spPr>
-        <p:txBody>
-          <a:bodyPr wrap="square" rtlCol="0">
-            <a:spAutoFit/>
-          </a:bodyPr>
-          <a:lstStyle/>
-          <a:p>
-            <a:pPr algn="just"/>
-            <a:r>
-              <a:rPr lang="es-MX" sz="2000" dirty="0">
-                <a:solidFill>
-                  <a:schemeClr val="bg1"/>
-                </a:solidFill>
-                <a:latin typeface="Raleway Black" pitchFamily="2" charset="0"/>
-                <a:ea typeface="Open Sans SemiBold" panose="020B0706030804020204" pitchFamily="34" charset="0"/>
-                <a:cs typeface="Open Sans SemiBold" panose="020B0706030804020204" pitchFamily="34" charset="0"/>
-              </a:rPr>
-              <a:t>Se recomienda mejorar el entrenamiento del modelo generador de código CSS para que generalice mejor y optimice su rendimiento, permitiendo su empaquetado y uso por otros ingenieros de software. Además, futuras versiones del software deberían generar múltiples alternativas de estilos CSS, enriqueciendo la experiencia del usuario y aumentando la flexibilidad del diseño. La iniciativa del proyecto debería replicarse en diversas tecnologías actuales, y se recomienda experimentar con diferentes modelos </a:t>
-            </a:r>
-            <a:r>
-              <a:rPr lang="es-MX" sz="2000" dirty="0" err="1">
-                <a:solidFill>
-                  <a:schemeClr val="bg1"/>
-                </a:solidFill>
-                <a:latin typeface="Raleway Black" pitchFamily="2" charset="0"/>
-                <a:ea typeface="Open Sans SemiBold" panose="020B0706030804020204" pitchFamily="34" charset="0"/>
-                <a:cs typeface="Open Sans SemiBold" panose="020B0706030804020204" pitchFamily="34" charset="0"/>
-              </a:rPr>
-              <a:t>pre-entrenados</a:t>
-            </a:r>
-            <a:r>
-              <a:rPr lang="es-MX" sz="2000" dirty="0">
-                <a:solidFill>
-                  <a:schemeClr val="bg1"/>
-                </a:solidFill>
-                <a:latin typeface="Raleway Black" pitchFamily="2" charset="0"/>
-                <a:ea typeface="Open Sans SemiBold" panose="020B0706030804020204" pitchFamily="34" charset="0"/>
-                <a:cs typeface="Open Sans SemiBold" panose="020B0706030804020204" pitchFamily="34" charset="0"/>
-              </a:rPr>
-              <a:t> para mejorar los generadores de código.</a:t>
-            </a:r>
-          </a:p>
-        </p:txBody>
-      </p:sp>
-      <p:sp>
-        <p:nvSpPr>
-          <p:cNvPr id="27" name="CuadroTexto 26">
-            <a:extLst>
-              <a:ext uri="{FF2B5EF4-FFF2-40B4-BE49-F238E27FC236}">
-                <a16:creationId xmlns:a16="http://schemas.microsoft.com/office/drawing/2014/main" id="{87B13D7A-39B9-23F1-8BBE-7195185A6185}"/>
-              </a:ext>
-            </a:extLst>
-          </p:cNvPr>
-          <p:cNvSpPr txBox="1"/>
-          <p:nvPr/>
-        </p:nvSpPr>
-        <p:spPr>
-          <a:xfrm>
-            <a:off x="4056764" y="472935"/>
-            <a:ext cx="3794629" cy="523220"/>
-          </a:xfrm>
-          <a:prstGeom prst="rect">
-            <a:avLst/>
-          </a:prstGeom>
-          <a:noFill/>
-        </p:spPr>
-        <p:txBody>
-          <a:bodyPr wrap="none" rtlCol="0">
-            <a:spAutoFit/>
-          </a:bodyPr>
-          <a:lstStyle/>
-          <a:p>
-            <a:r>
-              <a:rPr lang="es-CO" sz="2800" dirty="0">
-                <a:solidFill>
-                  <a:srgbClr val="F03CED"/>
-                </a:solidFill>
-                <a:latin typeface="Raleway Black" pitchFamily="2" charset="0"/>
-                <a:ea typeface="Open Sans SemiBold" panose="020B0706030804020204" pitchFamily="34" charset="0"/>
-                <a:cs typeface="Open Sans SemiBold" panose="020B0706030804020204" pitchFamily="34" charset="0"/>
-              </a:rPr>
-              <a:t>RECOMENDACIONES</a:t>
-            </a:r>
-            <a:endParaRPr lang="en-US" sz="2800" dirty="0">
-              <a:solidFill>
-                <a:srgbClr val="F03CED"/>
-              </a:solidFill>
-              <a:latin typeface="Raleway Black" pitchFamily="2" charset="0"/>
-              <a:ea typeface="Open Sans SemiBold" panose="020B0706030804020204" pitchFamily="34" charset="0"/>
-              <a:cs typeface="Open Sans SemiBold" panose="020B0706030804020204" pitchFamily="34" charset="0"/>
-            </a:endParaRPr>
-          </a:p>
-        </p:txBody>
-      </p:sp>
-      <p:pic>
-        <p:nvPicPr>
-          <p:cNvPr id="19" name="Imagen 18">
-            <a:extLst>
-              <a:ext uri="{FF2B5EF4-FFF2-40B4-BE49-F238E27FC236}">
-                <a16:creationId xmlns:a16="http://schemas.microsoft.com/office/drawing/2014/main" id="{9CFCF00A-BC29-624E-C884-59E3760894F7}"/>
-              </a:ext>
-            </a:extLst>
-          </p:cNvPr>
-          <p:cNvPicPr>
-            <a:picLocks noChangeAspect="1"/>
-          </p:cNvPicPr>
-          <p:nvPr/>
-        </p:nvPicPr>
-        <p:blipFill>
-          <a:blip r:embed="rId2" cstate="print">
-            <a:extLst>
-              <a:ext uri="{28A0092B-C50C-407E-A947-70E740481C1C}">
-                <a14:useLocalDpi xmlns:a14="http://schemas.microsoft.com/office/drawing/2010/main" val="0"/>
-              </a:ext>
-            </a:extLst>
-          </a:blip>
-          <a:srcRect/>
-          <a:stretch>
-            <a:fillRect/>
-          </a:stretch>
-        </p:blipFill>
-        <p:spPr bwMode="auto">
-          <a:xfrm>
-            <a:off x="275769" y="141153"/>
-            <a:ext cx="571538" cy="725117"/>
-          </a:xfrm>
-          <a:prstGeom prst="rect">
-            <a:avLst/>
-          </a:prstGeom>
-          <a:noFill/>
-          <a:ln>
-            <a:noFill/>
-          </a:ln>
-        </p:spPr>
-      </p:pic>
-      <p:sp>
-        <p:nvSpPr>
-          <p:cNvPr id="20" name="CuadroTexto 19">
-            <a:extLst>
-              <a:ext uri="{FF2B5EF4-FFF2-40B4-BE49-F238E27FC236}">
-                <a16:creationId xmlns:a16="http://schemas.microsoft.com/office/drawing/2014/main" id="{862420DE-757B-6285-AF97-EA1907B94B71}"/>
-              </a:ext>
-            </a:extLst>
-          </p:cNvPr>
-          <p:cNvSpPr txBox="1"/>
-          <p:nvPr/>
-        </p:nvSpPr>
-        <p:spPr>
-          <a:xfrm>
-            <a:off x="834865" y="272880"/>
-            <a:ext cx="914033" cy="461665"/>
-          </a:xfrm>
-          <a:prstGeom prst="rect">
-            <a:avLst/>
-          </a:prstGeom>
-          <a:noFill/>
-        </p:spPr>
-        <p:txBody>
-          <a:bodyPr wrap="none" rtlCol="0">
-            <a:spAutoFit/>
-          </a:bodyPr>
-          <a:lstStyle/>
-          <a:p>
-            <a:r>
-              <a:rPr lang="es-CO" sz="2400" dirty="0" err="1">
-                <a:solidFill>
-                  <a:schemeClr val="bg1"/>
-                </a:solidFill>
-                <a:latin typeface="Open Sans" panose="020B0606030504020204" pitchFamily="34" charset="0"/>
-                <a:ea typeface="Open Sans" panose="020B0606030504020204" pitchFamily="34" charset="0"/>
-                <a:cs typeface="Open Sans" panose="020B0606030504020204" pitchFamily="34" charset="0"/>
-              </a:rPr>
-              <a:t>USFX</a:t>
-            </a:r>
-            <a:endParaRPr lang="en-US" sz="2400" dirty="0">
-              <a:solidFill>
-                <a:schemeClr val="bg1"/>
-              </a:solidFill>
-              <a:latin typeface="Open Sans" panose="020B0606030504020204" pitchFamily="34" charset="0"/>
-              <a:ea typeface="Open Sans" panose="020B0606030504020204" pitchFamily="34" charset="0"/>
-              <a:cs typeface="Open Sans" panose="020B0606030504020204" pitchFamily="34" charset="0"/>
-            </a:endParaRPr>
-          </a:p>
-        </p:txBody>
-      </p:sp>
-      <p:sp>
-        <p:nvSpPr>
-          <p:cNvPr id="2" name="Marco 1">
-            <a:extLst>
-              <a:ext uri="{FF2B5EF4-FFF2-40B4-BE49-F238E27FC236}">
-                <a16:creationId xmlns:a16="http://schemas.microsoft.com/office/drawing/2014/main" id="{9EE11A52-29B0-7E53-2BDB-6888EDB42876}"/>
-              </a:ext>
-            </a:extLst>
-          </p:cNvPr>
-          <p:cNvSpPr/>
-          <p:nvPr/>
-        </p:nvSpPr>
-        <p:spPr>
-          <a:xfrm rot="1015177">
-            <a:off x="157215" y="5626784"/>
-            <a:ext cx="1298862" cy="1266716"/>
-          </a:xfrm>
-          <a:prstGeom prst="frame">
-            <a:avLst>
-              <a:gd name="adj1" fmla="val 50000"/>
-            </a:avLst>
-          </a:prstGeom>
-          <a:noFill/>
-          <a:ln w="12700">
-            <a:solidFill>
-              <a:srgbClr val="E10DFF"/>
-            </a:solidFill>
-          </a:ln>
-          <a:effectLst>
-            <a:glow rad="228600">
-              <a:srgbClr val="8A14EC"/>
-            </a:glow>
-          </a:effectLst>
-          <a:scene3d>
-            <a:camera prst="isometricTopUp">
-              <a:rot lat="19476219" lon="18883143" rev="909743"/>
-            </a:camera>
-            <a:lightRig rig="twoPt" dir="t">
-              <a:rot lat="0" lon="0" rev="2400000"/>
-            </a:lightRig>
-          </a:scene3d>
-          <a:sp3d prstMaterial="matte">
-            <a:bevelT w="0" h="577850"/>
-            <a:bevelB w="0" h="0"/>
-          </a:sp3d>
-        </p:spPr>
-        <p:style>
-          <a:lnRef idx="2">
-            <a:schemeClr val="accent1">
-              <a:shade val="50000"/>
-            </a:schemeClr>
-          </a:lnRef>
-          <a:fillRef idx="1">
-            <a:schemeClr val="accent1"/>
-          </a:fillRef>
-          <a:effectRef idx="0">
-            <a:schemeClr val="accent1"/>
-          </a:effectRef>
-          <a:fontRef idx="minor">
-            <a:schemeClr val="lt1"/>
-          </a:fontRef>
-        </p:style>
-        <p:txBody>
-          <a:bodyPr rtlCol="0" anchor="ctr"/>
-          <a:lstStyle/>
-          <a:p>
-            <a:pPr algn="ctr"/>
-            <a:endParaRPr lang="en-US">
-              <a:solidFill>
-                <a:schemeClr val="tx1"/>
-              </a:solidFill>
-            </a:endParaRPr>
-          </a:p>
-        </p:txBody>
-      </p:sp>
-      <p:sp>
-        <p:nvSpPr>
-          <p:cNvPr id="3" name="Marco 2">
-            <a:extLst>
-              <a:ext uri="{FF2B5EF4-FFF2-40B4-BE49-F238E27FC236}">
-                <a16:creationId xmlns:a16="http://schemas.microsoft.com/office/drawing/2014/main" id="{F0AA8EC3-B8EF-0325-CF91-DF3376E835ED}"/>
-              </a:ext>
-            </a:extLst>
-          </p:cNvPr>
-          <p:cNvSpPr/>
-          <p:nvPr/>
-        </p:nvSpPr>
-        <p:spPr>
-          <a:xfrm rot="18693024">
-            <a:off x="5549963" y="6317924"/>
-            <a:ext cx="1298862" cy="1266716"/>
-          </a:xfrm>
-          <a:prstGeom prst="frame">
-            <a:avLst>
-              <a:gd name="adj1" fmla="val 50000"/>
-            </a:avLst>
-          </a:prstGeom>
-          <a:noFill/>
-          <a:ln w="12700">
-            <a:solidFill>
-              <a:srgbClr val="E10DFF"/>
-            </a:solidFill>
-          </a:ln>
-          <a:effectLst>
-            <a:glow rad="228600">
-              <a:srgbClr val="8A14EC"/>
-            </a:glow>
-          </a:effectLst>
-          <a:scene3d>
-            <a:camera prst="isometricTopUp">
-              <a:rot lat="19476219" lon="18883143" rev="909743"/>
-            </a:camera>
-            <a:lightRig rig="twoPt" dir="t">
-              <a:rot lat="0" lon="0" rev="2400000"/>
-            </a:lightRig>
-          </a:scene3d>
-          <a:sp3d prstMaterial="matte">
-            <a:bevelT w="0" h="577850"/>
-            <a:bevelB w="0" h="0"/>
-          </a:sp3d>
-        </p:spPr>
-        <p:style>
-          <a:lnRef idx="2">
-            <a:schemeClr val="accent1">
-              <a:shade val="50000"/>
-            </a:schemeClr>
-          </a:lnRef>
-          <a:fillRef idx="1">
-            <a:schemeClr val="accent1"/>
-          </a:fillRef>
-          <a:effectRef idx="0">
-            <a:schemeClr val="accent1"/>
-          </a:effectRef>
-          <a:fontRef idx="minor">
-            <a:schemeClr val="lt1"/>
-          </a:fontRef>
-        </p:style>
-        <p:txBody>
-          <a:bodyPr rtlCol="0" anchor="ctr"/>
-          <a:lstStyle/>
-          <a:p>
-            <a:pPr algn="ctr"/>
-            <a:endParaRPr lang="en-US">
-              <a:solidFill>
-                <a:schemeClr val="tx1"/>
-              </a:solidFill>
-            </a:endParaRPr>
-          </a:p>
-        </p:txBody>
-      </p:sp>
-      <p:sp>
-        <p:nvSpPr>
-          <p:cNvPr id="6" name="Marco 5">
-            <a:extLst>
-              <a:ext uri="{FF2B5EF4-FFF2-40B4-BE49-F238E27FC236}">
-                <a16:creationId xmlns:a16="http://schemas.microsoft.com/office/drawing/2014/main" id="{01B69663-0226-41F2-F178-6601FE0CE422}"/>
-              </a:ext>
-            </a:extLst>
-          </p:cNvPr>
-          <p:cNvSpPr/>
-          <p:nvPr/>
-        </p:nvSpPr>
-        <p:spPr>
-          <a:xfrm rot="17445565">
-            <a:off x="10980109" y="5626783"/>
-            <a:ext cx="1298862" cy="1266716"/>
-          </a:xfrm>
-          <a:prstGeom prst="frame">
-            <a:avLst>
-              <a:gd name="adj1" fmla="val 50000"/>
-            </a:avLst>
-          </a:prstGeom>
-          <a:noFill/>
-          <a:ln w="12700">
-            <a:solidFill>
-              <a:srgbClr val="E10DFF"/>
-            </a:solidFill>
-          </a:ln>
-          <a:effectLst>
-            <a:glow rad="228600">
-              <a:srgbClr val="8A14EC"/>
-            </a:glow>
-          </a:effectLst>
-          <a:scene3d>
-            <a:camera prst="isometricTopUp">
-              <a:rot lat="19476219" lon="18883143" rev="909743"/>
-            </a:camera>
-            <a:lightRig rig="twoPt" dir="t">
-              <a:rot lat="0" lon="0" rev="2400000"/>
-            </a:lightRig>
-          </a:scene3d>
-          <a:sp3d prstMaterial="matte">
-            <a:bevelT w="0" h="577850"/>
-            <a:bevelB w="0" h="0"/>
-          </a:sp3d>
-        </p:spPr>
-        <p:style>
-          <a:lnRef idx="2">
-            <a:schemeClr val="accent1">
-              <a:shade val="50000"/>
-            </a:schemeClr>
-          </a:lnRef>
-          <a:fillRef idx="1">
-            <a:schemeClr val="accent1"/>
-          </a:fillRef>
-          <a:effectRef idx="0">
-            <a:schemeClr val="accent1"/>
-          </a:effectRef>
-          <a:fontRef idx="minor">
-            <a:schemeClr val="lt1"/>
-          </a:fontRef>
-        </p:style>
-        <p:txBody>
-          <a:bodyPr rtlCol="0" anchor="ctr"/>
-          <a:lstStyle/>
-          <a:p>
-            <a:pPr algn="ctr"/>
-            <a:endParaRPr lang="en-US" dirty="0">
-              <a:solidFill>
-                <a:schemeClr val="tx1"/>
-              </a:solidFill>
-            </a:endParaRPr>
-          </a:p>
-        </p:txBody>
-      </p:sp>
-      <p:sp>
-        <p:nvSpPr>
-          <p:cNvPr id="9" name="CuadroTexto 8">
-            <a:extLst>
-              <a:ext uri="{FF2B5EF4-FFF2-40B4-BE49-F238E27FC236}">
-                <a16:creationId xmlns:a16="http://schemas.microsoft.com/office/drawing/2014/main" id="{7E34B77F-32EA-90BF-1AA8-420BC5726BF4}"/>
-              </a:ext>
-            </a:extLst>
-          </p:cNvPr>
-          <p:cNvSpPr txBox="1"/>
-          <p:nvPr/>
-        </p:nvSpPr>
-        <p:spPr>
-          <a:xfrm>
-            <a:off x="1149150" y="1113212"/>
-            <a:ext cx="184731" cy="769441"/>
-          </a:xfrm>
-          <a:prstGeom prst="rect">
-            <a:avLst/>
-          </a:prstGeom>
-          <a:noFill/>
-        </p:spPr>
-        <p:txBody>
-          <a:bodyPr wrap="none" rtlCol="0">
-            <a:spAutoFit/>
-          </a:bodyPr>
-          <a:lstStyle/>
-          <a:p>
-            <a:endParaRPr lang="es-CO" sz="2200" dirty="0">
-              <a:solidFill>
-                <a:srgbClr val="F03CED"/>
-              </a:solidFill>
-              <a:latin typeface="Raleway Black" pitchFamily="2" charset="0"/>
-              <a:ea typeface="Open Sans SemiBold" panose="020B0706030804020204" pitchFamily="34" charset="0"/>
-              <a:cs typeface="Open Sans SemiBold" panose="020B0706030804020204" pitchFamily="34" charset="0"/>
-            </a:endParaRPr>
-          </a:p>
-          <a:p>
-            <a:endParaRPr lang="en-US" sz="2200" dirty="0">
-              <a:solidFill>
-                <a:srgbClr val="F03CED"/>
-              </a:solidFill>
-              <a:latin typeface="Raleway Black" pitchFamily="2" charset="0"/>
-              <a:ea typeface="Open Sans SemiBold" panose="020B0706030804020204" pitchFamily="34" charset="0"/>
-              <a:cs typeface="Open Sans SemiBold" panose="020B0706030804020204" pitchFamily="34" charset="0"/>
-            </a:endParaRPr>
-          </a:p>
-        </p:txBody>
-      </p:sp>
-    </p:spTree>
-    <p:extLst>
-      <p:ext uri="{BB962C8B-B14F-4D97-AF65-F5344CB8AC3E}">
-        <p14:creationId xmlns:p14="http://schemas.microsoft.com/office/powerpoint/2010/main" val="2665606798"/>
-      </p:ext>
-    </p:extLst>
-  </p:cSld>
-  <p:clrMapOvr>
-    <a:masterClrMapping/>
-  </p:clrMapOvr>
-  <mc:AlternateContent xmlns:mc="http://schemas.openxmlformats.org/markup-compatibility/2006" xmlns:p159="http://schemas.microsoft.com/office/powerpoint/2015/09/main">
-    <mc:Choice Requires="p159">
-      <p:transition xmlns:p14="http://schemas.microsoft.com/office/powerpoint/2010/main" spd="slow" p14:dur="2000">
-        <p159:morph option="byObject"/>
-      </p:transition>
-    </mc:Choice>
-    <mc:Fallback xmlns="">
-      <p:transition spd="slow">
-        <p:fade/>
-      </p:transition>
-    </mc:Fallback>
-  </mc:AlternateContent>
-</p:sld>
-</file>
-
-<file path=ppt/slides/slide46.xml><?xml version="1.0" encoding="utf-8"?>
-<p:sld xmlns:a="http://schemas.openxmlformats.org/drawingml/2006/main" xmlns:r="http://schemas.openxmlformats.org/officeDocument/2006/relationships" xmlns:p="http://schemas.openxmlformats.org/presentationml/2006/main">
-  <p:cSld>
-    <p:spTree>
-      <p:nvGrpSpPr>
-        <p:cNvPr id="1" name=""/>
-        <p:cNvGrpSpPr/>
-        <p:nvPr/>
-      </p:nvGrpSpPr>
-      <p:grpSpPr>
-        <a:xfrm>
-          <a:off x="0" y="0"/>
-          <a:ext cx="0" cy="0"/>
-          <a:chOff x="0" y="0"/>
-          <a:chExt cx="0" cy="0"/>
-        </a:xfrm>
-      </p:grpSpPr>
       <p:pic>
         <p:nvPicPr>
           <p:cNvPr id="7" name="Imagen 6">
@@ -37573,7 +36882,7 @@
 </p:sld>
 </file>
 
-<file path=ppt/slides/slide47.xml><?xml version="1.0" encoding="utf-8"?>
+<file path=ppt/slides/slide46.xml><?xml version="1.0" encoding="utf-8"?>
 <p:sld xmlns:a="http://schemas.openxmlformats.org/drawingml/2006/main" xmlns:r="http://schemas.openxmlformats.org/officeDocument/2006/relationships" xmlns:p="http://schemas.openxmlformats.org/presentationml/2006/main">
   <p:cSld>
     <p:spTree>

</xml_diff>

<commit_message>
docs(v0.7.4): add final changes in presentation
</commit_message>
<xml_diff>
--- a/documents/Presentación de Perfil - Modelo Generador CSS.pptx
+++ b/documents/Presentación de Perfil - Modelo Generador CSS.pptx
@@ -28509,7 +28509,7 @@
                 <a:ea typeface="Open Sans SemiBold" panose="020B0706030804020204" pitchFamily="34" charset="0"/>
                 <a:cs typeface="Open Sans SemiBold" panose="020B0706030804020204" pitchFamily="34" charset="0"/>
               </a:rPr>
-              <a:t>Implementamos de Modelo </a:t>
+              <a:t>Implementamos el Modelo </a:t>
             </a:r>
             <a:r>
               <a:rPr lang="es-MX" sz="2200" b="1" dirty="0" err="1">
@@ -33210,7 +33210,7 @@
         <p:spPr>
           <a:xfrm>
             <a:off x="1241515" y="1428880"/>
-            <a:ext cx="9565599" cy="2862322"/>
+            <a:ext cx="9565599" cy="2554545"/>
           </a:xfrm>
           <a:prstGeom prst="rect">
             <a:avLst/>
@@ -33233,7 +33233,29 @@
                 <a:ea typeface="Open Sans SemiBold" panose="020B0706030804020204" pitchFamily="34" charset="0"/>
                 <a:cs typeface="Open Sans SemiBold" panose="020B0706030804020204" pitchFamily="34" charset="0"/>
               </a:rPr>
-              <a:t>El análisis bibliográfico ha proporcionado una base teórica sólida para el desarrollo de un modelo de inteligencia artificial que genera código CSS mediante procesamiento del lenguaje natural. Se diseñó un modelo que traduce etiquetas HTML en estilos CSS coherentes, también se implemento, un prototipo de aplicación web permite a los usuarios ver vistas generadas en tiempo real al introducir etiquetas HTML y un color, facilitando el diseño de páginas web. La aplicación presenta una interfaz intuitiva, permitiendo interacción sencilla sin conocimientos profundos de CSS. </a:t>
+              <a:t>El análisis bibliográfico ha proporcionado una base teórica sólida para el desarrollo de un modelo de inteligencia artificial que genera código CSS mediante la arquitectura </a:t>
+            </a:r>
+            <a:r>
+              <a:rPr lang="es-MX" sz="2000" dirty="0" err="1">
+                <a:solidFill>
+                  <a:schemeClr val="bg1"/>
+                </a:solidFill>
+                <a:latin typeface="Raleway Black" pitchFamily="2" charset="0"/>
+                <a:ea typeface="Open Sans SemiBold" panose="020B0706030804020204" pitchFamily="34" charset="0"/>
+                <a:cs typeface="Open Sans SemiBold" panose="020B0706030804020204" pitchFamily="34" charset="0"/>
+              </a:rPr>
+              <a:t>transformer</a:t>
+            </a:r>
+            <a:r>
+              <a:rPr lang="es-MX" sz="2000" dirty="0">
+                <a:solidFill>
+                  <a:schemeClr val="bg1"/>
+                </a:solidFill>
+                <a:latin typeface="Raleway Black" pitchFamily="2" charset="0"/>
+                <a:ea typeface="Open Sans SemiBold" panose="020B0706030804020204" pitchFamily="34" charset="0"/>
+                <a:cs typeface="Open Sans SemiBold" panose="020B0706030804020204" pitchFamily="34" charset="0"/>
+              </a:rPr>
+              <a:t>. Se diseñó un modelo que traduce etiquetas HTML en estilos CSS coherentes, también se implemento, un prototipo de aplicación web permite a los usuarios ver vistas generadas en tiempo real al introducir etiquetas HTML y un color, facilitando el diseño de páginas web. La aplicación presenta una interfaz intuitiva, permitiendo interacción sencilla sin conocimientos profundos de CSS. </a:t>
             </a:r>
           </a:p>
         </p:txBody>
@@ -33755,7 +33777,29 @@
                 <a:ea typeface="Open Sans SemiBold" panose="020B0706030804020204" pitchFamily="34" charset="0"/>
                 <a:cs typeface="Open Sans SemiBold" panose="020B0706030804020204" pitchFamily="34" charset="0"/>
               </a:rPr>
-              <a:t> para mejorar los generadores de código.</a:t>
+              <a:t> para mejorar las generación de </a:t>
+            </a:r>
+            <a:r>
+              <a:rPr lang="es-MX" sz="2000" dirty="0" err="1">
+                <a:solidFill>
+                  <a:schemeClr val="bg1"/>
+                </a:solidFill>
+                <a:latin typeface="Raleway Black" pitchFamily="2" charset="0"/>
+                <a:ea typeface="Open Sans SemiBold" panose="020B0706030804020204" pitchFamily="34" charset="0"/>
+                <a:cs typeface="Open Sans SemiBold" panose="020B0706030804020204" pitchFamily="34" charset="0"/>
+              </a:rPr>
+              <a:t>codigo</a:t>
+            </a:r>
+            <a:r>
+              <a:rPr lang="es-MX" sz="2000" dirty="0">
+                <a:solidFill>
+                  <a:schemeClr val="bg1"/>
+                </a:solidFill>
+                <a:latin typeface="Raleway Black" pitchFamily="2" charset="0"/>
+                <a:ea typeface="Open Sans SemiBold" panose="020B0706030804020204" pitchFamily="34" charset="0"/>
+                <a:cs typeface="Open Sans SemiBold" panose="020B0706030804020204" pitchFamily="34" charset="0"/>
+              </a:rPr>
+              <a:t>.</a:t>
             </a:r>
           </a:p>
         </p:txBody>

</xml_diff>